<commit_message>
Mon Jun 20 09:36:57 PDT 2022
</commit_message>
<xml_diff>
--- a/docs/presentation.pptx
+++ b/docs/presentation.pptx
@@ -26,6 +26,16 @@
     <p:sldId id="274" r:id="rId20"/>
     <p:sldId id="275" r:id="rId21"/>
     <p:sldId id="276" r:id="rId22"/>
+    <p:sldId id="277" r:id="rId23"/>
+    <p:sldId id="278" r:id="rId24"/>
+    <p:sldId id="279" r:id="rId25"/>
+    <p:sldId id="280" r:id="rId26"/>
+    <p:sldId id="281" r:id="rId27"/>
+    <p:sldId id="282" r:id="rId28"/>
+    <p:sldId id="283" r:id="rId29"/>
+    <p:sldId id="284" r:id="rId30"/>
+    <p:sldId id="285" r:id="rId31"/>
+    <p:sldId id="286" r:id="rId32"/>
   </p:sldIdLst>
   <p:sldSz cx="9144000" cy="5143500" type="screen16x9"/>
   <p:notesSz cx="6858000" cy="9144000"/>
@@ -6793,38 +6803,14 @@
           </a:p>
           <a:p>
             <a:pPr lvl="0" indent="0" marL="0">
+              <a:spcBef>
+                <a:spcPts val="3000"/>
+              </a:spcBef>
               <a:buNone/>
             </a:pPr>
             <a:r>
-              <a:rPr/>
-              <a:t>#| output: asis</a:t>
-            </a:r>
-          </a:p>
-          <a:p>
-            <a:pPr lvl="0" indent="0" marL="0">
-              <a:buNone/>
-            </a:pPr>
-            <a:r>
-              <a:rPr/>
-              <a:t>df_dr = pd.read_csv(“data/dr.csv.gz”, compression=“gzip”) df_pop = pd.read_csv(“data/pop_brackets.csv.gz”, compression=“gzip”)</a:t>
-            </a:r>
-          </a:p>
-          <a:p>
-            <a:pPr lvl="0" indent="0" marL="0">
-              <a:buNone/>
-            </a:pPr>
-            <a:r>
-              <a:rPr/>
-              <a:t>years = [2000, 2025, 2050, 2075, 2100] regions = [“Belgium”, “China”, “Brazil”, “India”, “Japan”, “Nigeria”]</a:t>
-            </a:r>
-          </a:p>
-          <a:p>
-            <a:pPr lvl="0" indent="0" marL="0">
-              <a:buNone/>
-            </a:pPr>
-            <a:r>
-              <a:rPr/>
-              <a:t>for name in regions: display(Markdown(f”## Age and Population Pyramids for {name}“)) display(Markdown(f’</a:t>
+              <a:rPr b="1"/>
+              <a:t>Age and Population Pyramids for Belgium</a:t>
             </a:r>
           </a:p>
         </p:txBody>
@@ -6851,67 +6837,66 @@
           <a:chExt cx="0" cy="0"/>
         </a:xfrm>
       </p:grpSpPr>
-      <p:sp>
-        <p:nvSpPr>
-          <p:cNvPr id="3" name="Content Placeholder 2"/>
-          <p:cNvSpPr>
-            <a:spLocks noGrp="1"/>
-          </p:cNvSpPr>
-          <p:nvPr>
-            <p:ph idx="1"/>
-          </p:nvPr>
-        </p:nvSpPr>
-        <p:spPr/>
-        <p:txBody>
-          <a:bodyPr/>
-          <a:lstStyle/>
-          <a:p>
-            <a:pPr lvl="0" indent="0" marL="0">
-              <a:buNone/>
-            </a:pPr>
-            <a:r>
-              <a:rPr/>
-              <a:t>‘)) display(Markdown(f’</a:t>
-            </a:r>
-          </a:p>
-          <a:p>
-            <a:pPr lvl="0" indent="0" marL="0">
-              <a:buNone/>
-            </a:pPr>
-            <a:r>
-              <a:rPr/>
-              <a:t>‘)) plot_dependency_ratio(df_dr[df_dr.Location == name]) display(Markdown(f’</a:t>
-            </a:r>
-          </a:p>
-          <a:p>
-            <a:pPr lvl="0" indent="0" marL="0">
-              <a:buNone/>
-            </a:pPr>
-            <a:r>
-              <a:rPr/>
-              <a:t>‘)) display(Markdown(f’</a:t>
-            </a:r>
-          </a:p>
-          <a:p>
-            <a:pPr lvl="0" indent="0" marL="0">
-              <a:buNone/>
-            </a:pPr>
-            <a:r>
-              <a:rPr/>
-              <a:t>‘)) plot_population_pyramid_series(df_pop[df_pop[“Location”]==name], years) display(Markdown(f’</a:t>
-            </a:r>
-          </a:p>
-          <a:p>
-            <a:pPr lvl="0" indent="0" marL="0">
-              <a:buNone/>
-            </a:pPr>
-            <a:r>
-              <a:rPr/>
-              <a:t>‘)) display(Markdown(f’</a:t>
-            </a:r>
-          </a:p>
-        </p:txBody>
-      </p:sp>
+      <p:pic>
+        <p:nvPicPr>
+          <p:cNvPr descr="presentation_files/figure-pptx/cell-10-output-4.png" id="0" name="Picture 1"/>
+          <p:cNvPicPr>
+            <a:picLocks noGrp="1" noChangeAspect="1"/>
+          </p:cNvPicPr>
+          <p:nvPr/>
+        </p:nvPicPr>
+        <p:blipFill>
+          <a:blip r:embed="rId2"/>
+          <a:stretch>
+            <a:fillRect/>
+          </a:stretch>
+        </p:blipFill>
+        <p:spPr bwMode="auto">
+          <a:xfrm>
+            <a:off x="457200" y="1524000"/>
+            <a:ext cx="4038600" cy="2730500"/>
+          </a:xfrm>
+          <a:prstGeom prst="rect">
+            <a:avLst/>
+          </a:prstGeom>
+          <a:noFill/>
+          <a:ln w="9525">
+            <a:noFill/>
+            <a:headEnd/>
+            <a:tailEnd/>
+          </a:ln>
+        </p:spPr>
+      </p:pic>
+      <p:pic>
+        <p:nvPicPr>
+          <p:cNvPr descr="presentation_files/figure-pptx/cell-10-output-7.png" id="0" name="Picture 1"/>
+          <p:cNvPicPr>
+            <a:picLocks noGrp="1" noChangeAspect="1"/>
+          </p:cNvPicPr>
+          <p:nvPr/>
+        </p:nvPicPr>
+        <p:blipFill>
+          <a:blip r:embed="rId3"/>
+          <a:stretch>
+            <a:fillRect/>
+          </a:stretch>
+        </p:blipFill>
+        <p:spPr bwMode="auto">
+          <a:xfrm>
+            <a:off x="4648200" y="1549400"/>
+            <a:ext cx="4038600" cy="2679700"/>
+          </a:xfrm>
+          <a:prstGeom prst="rect">
+            <a:avLst/>
+          </a:prstGeom>
+          <a:noFill/>
+          <a:ln w="9525">
+            <a:noFill/>
+            <a:headEnd/>
+            <a:tailEnd/>
+          </a:ln>
+        </p:spPr>
+      </p:pic>
     </p:spTree>
   </p:cSld>
 </p:sld>
@@ -6936,12 +6921,12 @@
       </p:grpSpPr>
       <p:sp>
         <p:nvSpPr>
-          <p:cNvPr id="4" name="Text Placeholder 3"/>
-          <p:cNvSpPr>
-            <a:spLocks noGrp="1"/>
-          </p:cNvSpPr>
-          <p:nvPr>
-            <p:ph idx="2" sz="half" type="body"/>
+          <p:cNvPr id="3" name="Content Placeholder 2"/>
+          <p:cNvSpPr>
+            <a:spLocks noGrp="1"/>
+          </p:cNvSpPr>
+          <p:nvPr>
+            <p:ph idx="1"/>
           </p:nvPr>
         </p:nvSpPr>
         <p:spPr/>
@@ -6950,11 +6935,785 @@
           <a:lstStyle/>
           <a:p>
             <a:pPr lvl="0" indent="0" marL="0">
+              <a:spcBef>
+                <a:spcPts val="3000"/>
+              </a:spcBef>
               <a:buNone/>
             </a:pPr>
             <a:r>
+              <a:rPr b="1"/>
+              <a:t>Age and Population Pyramids for China</a:t>
+            </a:r>
+          </a:p>
+        </p:txBody>
+      </p:sp>
+    </p:spTree>
+  </p:cSld>
+</p:sld>
+</file>
+
+<file path=ppt/slides/slide2.xml><?xml version="1.0" encoding="utf-8"?>
+<p:sld xmlns:a="http://schemas.openxmlformats.org/drawingml/2006/main" xmlns:r="http://schemas.openxmlformats.org/officeDocument/2006/relationships" xmlns:p="http://schemas.openxmlformats.org/presentationml/2006/main">
+  <p:cSld>
+    <p:spTree>
+      <p:nvGrpSpPr>
+        <p:cNvPr id="1" name=""/>
+        <p:cNvGrpSpPr/>
+        <p:nvPr/>
+      </p:nvGrpSpPr>
+      <p:grpSpPr>
+        <a:xfrm>
+          <a:off x="0" y="0"/>
+          <a:ext cx="0" cy="0"/>
+          <a:chOff x="0" y="0"/>
+          <a:chExt cx="0" cy="0"/>
+        </a:xfrm>
+      </p:grpSpPr>
+      <p:sp>
+        <p:nvSpPr>
+          <p:cNvPr id="2" name="Title 1"/>
+          <p:cNvSpPr>
+            <a:spLocks noGrp="1"/>
+          </p:cNvSpPr>
+          <p:nvPr>
+            <p:ph type="title"/>
+          </p:nvPr>
+        </p:nvSpPr>
+        <p:spPr/>
+        <p:txBody>
+          <a:bodyPr/>
+          <a:lstStyle/>
+          <a:p>
+            <a:pPr lvl="0" indent="0" marL="0">
+              <a:buNone/>
+            </a:pPr>
+            <a:r>
               <a:rPr/>
-              <a:t>’))</a:t>
+              <a:t>Why Quarto</a:t>
+            </a:r>
+          </a:p>
+        </p:txBody>
+      </p:sp>
+      <p:sp>
+        <p:nvSpPr>
+          <p:cNvPr id="3" name="Content Placeholder 2"/>
+          <p:cNvSpPr>
+            <a:spLocks noGrp="1"/>
+          </p:cNvSpPr>
+          <p:nvPr>
+            <p:ph idx="1"/>
+          </p:nvPr>
+        </p:nvSpPr>
+        <p:spPr/>
+        <p:txBody>
+          <a:bodyPr/>
+          <a:lstStyle/>
+          <a:p>
+            <a:pPr lvl="0" indent="0" marL="0">
+              <a:spcBef>
+                <a:spcPts val="3000"/>
+              </a:spcBef>
+              <a:buNone/>
+            </a:pPr>
+            <a:r>
+              <a:rPr b="1"/>
+              <a:t>Quarto helps with the content value chain</a:t>
+            </a:r>
+          </a:p>
+        </p:txBody>
+      </p:sp>
+    </p:spTree>
+  </p:cSld>
+</p:sld>
+</file>
+
+<file path=ppt/slides/slide20.xml><?xml version="1.0" encoding="utf-8"?>
+<p:sld xmlns:a="http://schemas.openxmlformats.org/drawingml/2006/main" xmlns:r="http://schemas.openxmlformats.org/officeDocument/2006/relationships" xmlns:p="http://schemas.openxmlformats.org/presentationml/2006/main">
+  <p:cSld>
+    <p:spTree>
+      <p:nvGrpSpPr>
+        <p:cNvPr id="1" name=""/>
+        <p:cNvGrpSpPr/>
+        <p:nvPr/>
+      </p:nvGrpSpPr>
+      <p:grpSpPr>
+        <a:xfrm>
+          <a:off x="0" y="0"/>
+          <a:ext cx="0" cy="0"/>
+          <a:chOff x="0" y="0"/>
+          <a:chExt cx="0" cy="0"/>
+        </a:xfrm>
+      </p:grpSpPr>
+      <p:pic>
+        <p:nvPicPr>
+          <p:cNvPr descr="presentation_files/figure-pptx/cell-10-output-13.png" id="0" name="Picture 1"/>
+          <p:cNvPicPr>
+            <a:picLocks noGrp="1" noChangeAspect="1"/>
+          </p:cNvPicPr>
+          <p:nvPr/>
+        </p:nvPicPr>
+        <p:blipFill>
+          <a:blip r:embed="rId2"/>
+          <a:stretch>
+            <a:fillRect/>
+          </a:stretch>
+        </p:blipFill>
+        <p:spPr bwMode="auto">
+          <a:xfrm>
+            <a:off x="457200" y="1524000"/>
+            <a:ext cx="4038600" cy="2730500"/>
+          </a:xfrm>
+          <a:prstGeom prst="rect">
+            <a:avLst/>
+          </a:prstGeom>
+          <a:noFill/>
+          <a:ln w="9525">
+            <a:noFill/>
+            <a:headEnd/>
+            <a:tailEnd/>
+          </a:ln>
+        </p:spPr>
+      </p:pic>
+      <p:pic>
+        <p:nvPicPr>
+          <p:cNvPr descr="presentation_files/figure-pptx/cell-10-output-16.png" id="0" name="Picture 1"/>
+          <p:cNvPicPr>
+            <a:picLocks noGrp="1" noChangeAspect="1"/>
+          </p:cNvPicPr>
+          <p:nvPr/>
+        </p:nvPicPr>
+        <p:blipFill>
+          <a:blip r:embed="rId3"/>
+          <a:stretch>
+            <a:fillRect/>
+          </a:stretch>
+        </p:blipFill>
+        <p:spPr bwMode="auto">
+          <a:xfrm>
+            <a:off x="4648200" y="1549400"/>
+            <a:ext cx="4038600" cy="2679700"/>
+          </a:xfrm>
+          <a:prstGeom prst="rect">
+            <a:avLst/>
+          </a:prstGeom>
+          <a:noFill/>
+          <a:ln w="9525">
+            <a:noFill/>
+            <a:headEnd/>
+            <a:tailEnd/>
+          </a:ln>
+        </p:spPr>
+      </p:pic>
+    </p:spTree>
+  </p:cSld>
+</p:sld>
+</file>
+
+<file path=ppt/slides/slide21.xml><?xml version="1.0" encoding="utf-8"?>
+<p:sld xmlns:a="http://schemas.openxmlformats.org/drawingml/2006/main" xmlns:r="http://schemas.openxmlformats.org/officeDocument/2006/relationships" xmlns:p="http://schemas.openxmlformats.org/presentationml/2006/main">
+  <p:cSld>
+    <p:spTree>
+      <p:nvGrpSpPr>
+        <p:cNvPr id="1" name=""/>
+        <p:cNvGrpSpPr/>
+        <p:nvPr/>
+      </p:nvGrpSpPr>
+      <p:grpSpPr>
+        <a:xfrm>
+          <a:off x="0" y="0"/>
+          <a:ext cx="0" cy="0"/>
+          <a:chOff x="0" y="0"/>
+          <a:chExt cx="0" cy="0"/>
+        </a:xfrm>
+      </p:grpSpPr>
+      <p:sp>
+        <p:nvSpPr>
+          <p:cNvPr id="3" name="Content Placeholder 2"/>
+          <p:cNvSpPr>
+            <a:spLocks noGrp="1"/>
+          </p:cNvSpPr>
+          <p:nvPr>
+            <p:ph idx="1"/>
+          </p:nvPr>
+        </p:nvSpPr>
+        <p:spPr/>
+        <p:txBody>
+          <a:bodyPr/>
+          <a:lstStyle/>
+          <a:p>
+            <a:pPr lvl="0" indent="0" marL="0">
+              <a:spcBef>
+                <a:spcPts val="3000"/>
+              </a:spcBef>
+              <a:buNone/>
+            </a:pPr>
+            <a:r>
+              <a:rPr b="1"/>
+              <a:t>Age and Population Pyramids for Brazil</a:t>
+            </a:r>
+          </a:p>
+        </p:txBody>
+      </p:sp>
+    </p:spTree>
+  </p:cSld>
+</p:sld>
+</file>
+
+<file path=ppt/slides/slide22.xml><?xml version="1.0" encoding="utf-8"?>
+<p:sld xmlns:a="http://schemas.openxmlformats.org/drawingml/2006/main" xmlns:r="http://schemas.openxmlformats.org/officeDocument/2006/relationships" xmlns:p="http://schemas.openxmlformats.org/presentationml/2006/main">
+  <p:cSld>
+    <p:spTree>
+      <p:nvGrpSpPr>
+        <p:cNvPr id="1" name=""/>
+        <p:cNvGrpSpPr/>
+        <p:nvPr/>
+      </p:nvGrpSpPr>
+      <p:grpSpPr>
+        <a:xfrm>
+          <a:off x="0" y="0"/>
+          <a:ext cx="0" cy="0"/>
+          <a:chOff x="0" y="0"/>
+          <a:chExt cx="0" cy="0"/>
+        </a:xfrm>
+      </p:grpSpPr>
+      <p:pic>
+        <p:nvPicPr>
+          <p:cNvPr descr="presentation_files/figure-pptx/cell-10-output-22.png" id="0" name="Picture 1"/>
+          <p:cNvPicPr>
+            <a:picLocks noGrp="1" noChangeAspect="1"/>
+          </p:cNvPicPr>
+          <p:nvPr/>
+        </p:nvPicPr>
+        <p:blipFill>
+          <a:blip r:embed="rId2"/>
+          <a:stretch>
+            <a:fillRect/>
+          </a:stretch>
+        </p:blipFill>
+        <p:spPr bwMode="auto">
+          <a:xfrm>
+            <a:off x="457200" y="1524000"/>
+            <a:ext cx="4038600" cy="2730500"/>
+          </a:xfrm>
+          <a:prstGeom prst="rect">
+            <a:avLst/>
+          </a:prstGeom>
+          <a:noFill/>
+          <a:ln w="9525">
+            <a:noFill/>
+            <a:headEnd/>
+            <a:tailEnd/>
+          </a:ln>
+        </p:spPr>
+      </p:pic>
+      <p:pic>
+        <p:nvPicPr>
+          <p:cNvPr descr="presentation_files/figure-pptx/cell-10-output-25.png" id="0" name="Picture 1"/>
+          <p:cNvPicPr>
+            <a:picLocks noGrp="1" noChangeAspect="1"/>
+          </p:cNvPicPr>
+          <p:nvPr/>
+        </p:nvPicPr>
+        <p:blipFill>
+          <a:blip r:embed="rId3"/>
+          <a:stretch>
+            <a:fillRect/>
+          </a:stretch>
+        </p:blipFill>
+        <p:spPr bwMode="auto">
+          <a:xfrm>
+            <a:off x="4648200" y="1549400"/>
+            <a:ext cx="4038600" cy="2679700"/>
+          </a:xfrm>
+          <a:prstGeom prst="rect">
+            <a:avLst/>
+          </a:prstGeom>
+          <a:noFill/>
+          <a:ln w="9525">
+            <a:noFill/>
+            <a:headEnd/>
+            <a:tailEnd/>
+          </a:ln>
+        </p:spPr>
+      </p:pic>
+    </p:spTree>
+  </p:cSld>
+</p:sld>
+</file>
+
+<file path=ppt/slides/slide23.xml><?xml version="1.0" encoding="utf-8"?>
+<p:sld xmlns:a="http://schemas.openxmlformats.org/drawingml/2006/main" xmlns:r="http://schemas.openxmlformats.org/officeDocument/2006/relationships" xmlns:p="http://schemas.openxmlformats.org/presentationml/2006/main">
+  <p:cSld>
+    <p:spTree>
+      <p:nvGrpSpPr>
+        <p:cNvPr id="1" name=""/>
+        <p:cNvGrpSpPr/>
+        <p:nvPr/>
+      </p:nvGrpSpPr>
+      <p:grpSpPr>
+        <a:xfrm>
+          <a:off x="0" y="0"/>
+          <a:ext cx="0" cy="0"/>
+          <a:chOff x="0" y="0"/>
+          <a:chExt cx="0" cy="0"/>
+        </a:xfrm>
+      </p:grpSpPr>
+      <p:sp>
+        <p:nvSpPr>
+          <p:cNvPr id="3" name="Content Placeholder 2"/>
+          <p:cNvSpPr>
+            <a:spLocks noGrp="1"/>
+          </p:cNvSpPr>
+          <p:nvPr>
+            <p:ph idx="1"/>
+          </p:nvPr>
+        </p:nvSpPr>
+        <p:spPr/>
+        <p:txBody>
+          <a:bodyPr/>
+          <a:lstStyle/>
+          <a:p>
+            <a:pPr lvl="0" indent="0" marL="0">
+              <a:spcBef>
+                <a:spcPts val="3000"/>
+              </a:spcBef>
+              <a:buNone/>
+            </a:pPr>
+            <a:r>
+              <a:rPr b="1"/>
+              <a:t>Age and Population Pyramids for India</a:t>
+            </a:r>
+          </a:p>
+        </p:txBody>
+      </p:sp>
+    </p:spTree>
+  </p:cSld>
+</p:sld>
+</file>
+
+<file path=ppt/slides/slide24.xml><?xml version="1.0" encoding="utf-8"?>
+<p:sld xmlns:a="http://schemas.openxmlformats.org/drawingml/2006/main" xmlns:r="http://schemas.openxmlformats.org/officeDocument/2006/relationships" xmlns:p="http://schemas.openxmlformats.org/presentationml/2006/main">
+  <p:cSld>
+    <p:spTree>
+      <p:nvGrpSpPr>
+        <p:cNvPr id="1" name=""/>
+        <p:cNvGrpSpPr/>
+        <p:nvPr/>
+      </p:nvGrpSpPr>
+      <p:grpSpPr>
+        <a:xfrm>
+          <a:off x="0" y="0"/>
+          <a:ext cx="0" cy="0"/>
+          <a:chOff x="0" y="0"/>
+          <a:chExt cx="0" cy="0"/>
+        </a:xfrm>
+      </p:grpSpPr>
+      <p:pic>
+        <p:nvPicPr>
+          <p:cNvPr descr="presentation_files/figure-pptx/cell-10-output-31.png" id="0" name="Picture 1"/>
+          <p:cNvPicPr>
+            <a:picLocks noGrp="1" noChangeAspect="1"/>
+          </p:cNvPicPr>
+          <p:nvPr/>
+        </p:nvPicPr>
+        <p:blipFill>
+          <a:blip r:embed="rId2"/>
+          <a:stretch>
+            <a:fillRect/>
+          </a:stretch>
+        </p:blipFill>
+        <p:spPr bwMode="auto">
+          <a:xfrm>
+            <a:off x="457200" y="1524000"/>
+            <a:ext cx="4038600" cy="2730500"/>
+          </a:xfrm>
+          <a:prstGeom prst="rect">
+            <a:avLst/>
+          </a:prstGeom>
+          <a:noFill/>
+          <a:ln w="9525">
+            <a:noFill/>
+            <a:headEnd/>
+            <a:tailEnd/>
+          </a:ln>
+        </p:spPr>
+      </p:pic>
+      <p:pic>
+        <p:nvPicPr>
+          <p:cNvPr descr="presentation_files/figure-pptx/cell-10-output-34.png" id="0" name="Picture 1"/>
+          <p:cNvPicPr>
+            <a:picLocks noGrp="1" noChangeAspect="1"/>
+          </p:cNvPicPr>
+          <p:nvPr/>
+        </p:nvPicPr>
+        <p:blipFill>
+          <a:blip r:embed="rId3"/>
+          <a:stretch>
+            <a:fillRect/>
+          </a:stretch>
+        </p:blipFill>
+        <p:spPr bwMode="auto">
+          <a:xfrm>
+            <a:off x="4648200" y="1562100"/>
+            <a:ext cx="4038600" cy="2654300"/>
+          </a:xfrm>
+          <a:prstGeom prst="rect">
+            <a:avLst/>
+          </a:prstGeom>
+          <a:noFill/>
+          <a:ln w="9525">
+            <a:noFill/>
+            <a:headEnd/>
+            <a:tailEnd/>
+          </a:ln>
+        </p:spPr>
+      </p:pic>
+    </p:spTree>
+  </p:cSld>
+</p:sld>
+</file>
+
+<file path=ppt/slides/slide25.xml><?xml version="1.0" encoding="utf-8"?>
+<p:sld xmlns:a="http://schemas.openxmlformats.org/drawingml/2006/main" xmlns:r="http://schemas.openxmlformats.org/officeDocument/2006/relationships" xmlns:p="http://schemas.openxmlformats.org/presentationml/2006/main">
+  <p:cSld>
+    <p:spTree>
+      <p:nvGrpSpPr>
+        <p:cNvPr id="1" name=""/>
+        <p:cNvGrpSpPr/>
+        <p:nvPr/>
+      </p:nvGrpSpPr>
+      <p:grpSpPr>
+        <a:xfrm>
+          <a:off x="0" y="0"/>
+          <a:ext cx="0" cy="0"/>
+          <a:chOff x="0" y="0"/>
+          <a:chExt cx="0" cy="0"/>
+        </a:xfrm>
+      </p:grpSpPr>
+      <p:sp>
+        <p:nvSpPr>
+          <p:cNvPr id="3" name="Content Placeholder 2"/>
+          <p:cNvSpPr>
+            <a:spLocks noGrp="1"/>
+          </p:cNvSpPr>
+          <p:nvPr>
+            <p:ph idx="1"/>
+          </p:nvPr>
+        </p:nvSpPr>
+        <p:spPr/>
+        <p:txBody>
+          <a:bodyPr/>
+          <a:lstStyle/>
+          <a:p>
+            <a:pPr lvl="0" indent="0" marL="0">
+              <a:spcBef>
+                <a:spcPts val="3000"/>
+              </a:spcBef>
+              <a:buNone/>
+            </a:pPr>
+            <a:r>
+              <a:rPr b="1"/>
+              <a:t>Age and Population Pyramids for Japan</a:t>
+            </a:r>
+          </a:p>
+        </p:txBody>
+      </p:sp>
+    </p:spTree>
+  </p:cSld>
+</p:sld>
+</file>
+
+<file path=ppt/slides/slide26.xml><?xml version="1.0" encoding="utf-8"?>
+<p:sld xmlns:a="http://schemas.openxmlformats.org/drawingml/2006/main" xmlns:r="http://schemas.openxmlformats.org/officeDocument/2006/relationships" xmlns:p="http://schemas.openxmlformats.org/presentationml/2006/main">
+  <p:cSld>
+    <p:spTree>
+      <p:nvGrpSpPr>
+        <p:cNvPr id="1" name=""/>
+        <p:cNvGrpSpPr/>
+        <p:nvPr/>
+      </p:nvGrpSpPr>
+      <p:grpSpPr>
+        <a:xfrm>
+          <a:off x="0" y="0"/>
+          <a:ext cx="0" cy="0"/>
+          <a:chOff x="0" y="0"/>
+          <a:chExt cx="0" cy="0"/>
+        </a:xfrm>
+      </p:grpSpPr>
+      <p:pic>
+        <p:nvPicPr>
+          <p:cNvPr descr="presentation_files/figure-pptx/cell-10-output-40.png" id="0" name="Picture 1"/>
+          <p:cNvPicPr>
+            <a:picLocks noGrp="1" noChangeAspect="1"/>
+          </p:cNvPicPr>
+          <p:nvPr/>
+        </p:nvPicPr>
+        <p:blipFill>
+          <a:blip r:embed="rId2"/>
+          <a:stretch>
+            <a:fillRect/>
+          </a:stretch>
+        </p:blipFill>
+        <p:spPr bwMode="auto">
+          <a:xfrm>
+            <a:off x="457200" y="1524000"/>
+            <a:ext cx="4038600" cy="2730500"/>
+          </a:xfrm>
+          <a:prstGeom prst="rect">
+            <a:avLst/>
+          </a:prstGeom>
+          <a:noFill/>
+          <a:ln w="9525">
+            <a:noFill/>
+            <a:headEnd/>
+            <a:tailEnd/>
+          </a:ln>
+        </p:spPr>
+      </p:pic>
+      <p:pic>
+        <p:nvPicPr>
+          <p:cNvPr descr="presentation_files/figure-pptx/cell-10-output-43.png" id="0" name="Picture 1"/>
+          <p:cNvPicPr>
+            <a:picLocks noGrp="1" noChangeAspect="1"/>
+          </p:cNvPicPr>
+          <p:nvPr/>
+        </p:nvPicPr>
+        <p:blipFill>
+          <a:blip r:embed="rId3"/>
+          <a:stretch>
+            <a:fillRect/>
+          </a:stretch>
+        </p:blipFill>
+        <p:spPr bwMode="auto">
+          <a:xfrm>
+            <a:off x="4648200" y="1549400"/>
+            <a:ext cx="4038600" cy="2679700"/>
+          </a:xfrm>
+          <a:prstGeom prst="rect">
+            <a:avLst/>
+          </a:prstGeom>
+          <a:noFill/>
+          <a:ln w="9525">
+            <a:noFill/>
+            <a:headEnd/>
+            <a:tailEnd/>
+          </a:ln>
+        </p:spPr>
+      </p:pic>
+    </p:spTree>
+  </p:cSld>
+</p:sld>
+</file>
+
+<file path=ppt/slides/slide27.xml><?xml version="1.0" encoding="utf-8"?>
+<p:sld xmlns:a="http://schemas.openxmlformats.org/drawingml/2006/main" xmlns:r="http://schemas.openxmlformats.org/officeDocument/2006/relationships" xmlns:p="http://schemas.openxmlformats.org/presentationml/2006/main">
+  <p:cSld>
+    <p:spTree>
+      <p:nvGrpSpPr>
+        <p:cNvPr id="1" name=""/>
+        <p:cNvGrpSpPr/>
+        <p:nvPr/>
+      </p:nvGrpSpPr>
+      <p:grpSpPr>
+        <a:xfrm>
+          <a:off x="0" y="0"/>
+          <a:ext cx="0" cy="0"/>
+          <a:chOff x="0" y="0"/>
+          <a:chExt cx="0" cy="0"/>
+        </a:xfrm>
+      </p:grpSpPr>
+      <p:sp>
+        <p:nvSpPr>
+          <p:cNvPr id="3" name="Content Placeholder 2"/>
+          <p:cNvSpPr>
+            <a:spLocks noGrp="1"/>
+          </p:cNvSpPr>
+          <p:nvPr>
+            <p:ph idx="1"/>
+          </p:nvPr>
+        </p:nvSpPr>
+        <p:spPr/>
+        <p:txBody>
+          <a:bodyPr/>
+          <a:lstStyle/>
+          <a:p>
+            <a:pPr lvl="0" indent="0" marL="0">
+              <a:spcBef>
+                <a:spcPts val="3000"/>
+              </a:spcBef>
+              <a:buNone/>
+            </a:pPr>
+            <a:r>
+              <a:rPr b="1"/>
+              <a:t>Age and Population Pyramids for Nigeria</a:t>
+            </a:r>
+          </a:p>
+        </p:txBody>
+      </p:sp>
+    </p:spTree>
+  </p:cSld>
+</p:sld>
+</file>
+
+<file path=ppt/slides/slide28.xml><?xml version="1.0" encoding="utf-8"?>
+<p:sld xmlns:a="http://schemas.openxmlformats.org/drawingml/2006/main" xmlns:r="http://schemas.openxmlformats.org/officeDocument/2006/relationships" xmlns:p="http://schemas.openxmlformats.org/presentationml/2006/main">
+  <p:cSld>
+    <p:spTree>
+      <p:nvGrpSpPr>
+        <p:cNvPr id="1" name=""/>
+        <p:cNvGrpSpPr/>
+        <p:nvPr/>
+      </p:nvGrpSpPr>
+      <p:grpSpPr>
+        <a:xfrm>
+          <a:off x="0" y="0"/>
+          <a:ext cx="0" cy="0"/>
+          <a:chOff x="0" y="0"/>
+          <a:chExt cx="0" cy="0"/>
+        </a:xfrm>
+      </p:grpSpPr>
+      <p:pic>
+        <p:nvPicPr>
+          <p:cNvPr descr="presentation_files/figure-pptx/cell-10-output-49.png" id="0" name="Picture 1"/>
+          <p:cNvPicPr>
+            <a:picLocks noGrp="1" noChangeAspect="1"/>
+          </p:cNvPicPr>
+          <p:nvPr/>
+        </p:nvPicPr>
+        <p:blipFill>
+          <a:blip r:embed="rId2"/>
+          <a:stretch>
+            <a:fillRect/>
+          </a:stretch>
+        </p:blipFill>
+        <p:spPr bwMode="auto">
+          <a:xfrm>
+            <a:off x="457200" y="1524000"/>
+            <a:ext cx="4038600" cy="2730500"/>
+          </a:xfrm>
+          <a:prstGeom prst="rect">
+            <a:avLst/>
+          </a:prstGeom>
+          <a:noFill/>
+          <a:ln w="9525">
+            <a:noFill/>
+            <a:headEnd/>
+            <a:tailEnd/>
+          </a:ln>
+        </p:spPr>
+      </p:pic>
+      <p:pic>
+        <p:nvPicPr>
+          <p:cNvPr descr="presentation_files/figure-pptx/cell-10-output-52.png" id="0" name="Picture 1"/>
+          <p:cNvPicPr>
+            <a:picLocks noGrp="1" noChangeAspect="1"/>
+          </p:cNvPicPr>
+          <p:nvPr/>
+        </p:nvPicPr>
+        <p:blipFill>
+          <a:blip r:embed="rId3"/>
+          <a:stretch>
+            <a:fillRect/>
+          </a:stretch>
+        </p:blipFill>
+        <p:spPr bwMode="auto">
+          <a:xfrm>
+            <a:off x="4648200" y="1587500"/>
+            <a:ext cx="4038600" cy="2590800"/>
+          </a:xfrm>
+          <a:prstGeom prst="rect">
+            <a:avLst/>
+          </a:prstGeom>
+          <a:noFill/>
+          <a:ln w="9525">
+            <a:noFill/>
+            <a:headEnd/>
+            <a:tailEnd/>
+          </a:ln>
+        </p:spPr>
+      </p:pic>
+    </p:spTree>
+  </p:cSld>
+</p:sld>
+</file>
+
+<file path=ppt/slides/slide29.xml><?xml version="1.0" encoding="utf-8"?>
+<p:sld xmlns:a="http://schemas.openxmlformats.org/drawingml/2006/main" xmlns:r="http://schemas.openxmlformats.org/officeDocument/2006/relationships" xmlns:p="http://schemas.openxmlformats.org/presentationml/2006/main">
+  <p:cSld>
+    <p:spTree>
+      <p:nvGrpSpPr>
+        <p:cNvPr id="1" name=""/>
+        <p:cNvGrpSpPr/>
+        <p:nvPr/>
+      </p:nvGrpSpPr>
+      <p:grpSpPr>
+        <a:xfrm>
+          <a:off x="0" y="0"/>
+          <a:ext cx="0" cy="0"/>
+          <a:chOff x="0" y="0"/>
+          <a:chExt cx="0" cy="0"/>
+        </a:xfrm>
+      </p:grpSpPr>
+      <p:sp>
+        <p:nvSpPr>
+          <p:cNvPr id="9" name="Title 1">
+            <a:extLst>
+              <a:ext uri="{FF2B5EF4-FFF2-40B4-BE49-F238E27FC236}">
+                <a16:creationId xmlns:a16="http://schemas.microsoft.com/office/drawing/2014/main" id="{039B6DB2-D068-C680-F293-31EEF2D13404}"/>
+              </a:ext>
+            </a:extLst>
+          </p:cNvPr>
+          <p:cNvSpPr>
+            <a:spLocks noGrp="1"/>
+          </p:cNvSpPr>
+          <p:nvPr>
+            <p:ph type="title"/>
+          </p:nvPr>
+        </p:nvSpPr>
+        <p:spPr>
+          <a:xfrm>
+            <a:off x="457200" y="205979"/>
+            <a:ext cx="8229600" cy="857250"/>
+          </a:xfrm>
+        </p:spPr>
+        <p:txBody>
+          <a:bodyPr/>
+          <a:lstStyle/>
+          <a:p>
+            <a:pPr lvl="0" indent="0" marL="0">
+              <a:buNone/>
+            </a:pPr>
+            <a:r>
+              <a:rPr/>
+              <a:t>Websites</a:t>
+            </a:r>
+          </a:p>
+        </p:txBody>
+      </p:sp>
+      <p:sp>
+        <p:nvSpPr>
+          <p:cNvPr id="4" name="Text Placeholder 3"/>
+          <p:cNvSpPr>
+            <a:spLocks noGrp="1"/>
+          </p:cNvSpPr>
+          <p:nvPr>
+            <p:ph idx="2" sz="half" type="body"/>
+          </p:nvPr>
+        </p:nvSpPr>
+        <p:spPr/>
+        <p:txBody>
+          <a:bodyPr/>
+          <a:lstStyle/>
+          <a:p>
+            <a:pPr lvl="0" indent="0" marL="0">
+              <a:spcBef>
+                <a:spcPts val="3000"/>
+              </a:spcBef>
+              <a:buNone/>
+            </a:pPr>
+            <a:r>
+              <a:rPr b="1"/>
+              <a:t>What I get by just changing the format in YAML</a:t>
             </a:r>
           </a:p>
           <a:p>
@@ -6963,25 +7722,214 @@
             </a:pPr>
             <a:r>
               <a:rPr>
-                <a:latin typeface="Consolas"/>
-              </a:rPr>
-              <a:t>
-# Websites
-## What I get by just changing the format in YAML
-```{.yaml code-line-numbers="3"}
----
-title: "Using Quarto for everything"
-format: html
-    # revealjs:
-    #     incremental: false
-    #     theme: [simple, revealjs-customizations.scss]
-    #     title-slide-attributes:
-    #         data-background-image: images/data-viz-bg.jpg
-    #         data-background-size: contain
-    #         data-background-position: right
-author: Lucas A. Meyer
-date: 2022-07-14
----</a:t>
+                <a:solidFill>
+                  <a:srgbClr val="AD0000"/>
+                </a:solidFill>
+                <a:latin typeface="Consolas"/>
+              </a:rPr>
+              <a:t>---</a:t>
+            </a:r>
+            <a:br/>
+            <a:r>
+              <a:rPr>
+                <a:solidFill>
+                  <a:srgbClr val="4758AB"/>
+                </a:solidFill>
+                <a:latin typeface="Consolas"/>
+              </a:rPr>
+              <a:t>title</a:t>
+            </a:r>
+            <a:r>
+              <a:rPr>
+                <a:solidFill>
+                  <a:srgbClr val="003B4F"/>
+                </a:solidFill>
+                <a:latin typeface="Consolas"/>
+              </a:rPr>
+              <a:t>:</a:t>
+            </a:r>
+            <a:r>
+              <a:rPr>
+                <a:solidFill>
+                  <a:srgbClr val="657422"/>
+                </a:solidFill>
+                <a:latin typeface="Consolas"/>
+              </a:rPr>
+              <a:t> </a:t>
+            </a:r>
+            <a:r>
+              <a:rPr>
+                <a:solidFill>
+                  <a:srgbClr val="20794D"/>
+                </a:solidFill>
+                <a:latin typeface="Consolas"/>
+              </a:rPr>
+              <a:t>"Using Quarto for everything"</a:t>
+            </a:r>
+            <a:br/>
+            <a:r>
+              <a:rPr>
+                <a:solidFill>
+                  <a:srgbClr val="4758AB"/>
+                </a:solidFill>
+                <a:latin typeface="Consolas"/>
+              </a:rPr>
+              <a:t>format</a:t>
+            </a:r>
+            <a:r>
+              <a:rPr>
+                <a:solidFill>
+                  <a:srgbClr val="003B4F"/>
+                </a:solidFill>
+                <a:latin typeface="Consolas"/>
+              </a:rPr>
+              <a:t>:</a:t>
+            </a:r>
+            <a:r>
+              <a:rPr>
+                <a:solidFill>
+                  <a:srgbClr val="657422"/>
+                </a:solidFill>
+                <a:latin typeface="Consolas"/>
+              </a:rPr>
+              <a:t> html</a:t>
+            </a:r>
+            <a:br/>
+            <a:r>
+              <a:rPr>
+                <a:solidFill>
+                  <a:srgbClr val="5E5E5E"/>
+                </a:solidFill>
+                <a:latin typeface="Consolas"/>
+              </a:rPr>
+              <a:t>    # revealjs:</a:t>
+            </a:r>
+            <a:br/>
+            <a:r>
+              <a:rPr>
+                <a:solidFill>
+                  <a:srgbClr val="5E5E5E"/>
+                </a:solidFill>
+                <a:latin typeface="Consolas"/>
+              </a:rPr>
+              <a:t>    #     incremental: false</a:t>
+            </a:r>
+            <a:br/>
+            <a:r>
+              <a:rPr>
+                <a:solidFill>
+                  <a:srgbClr val="5E5E5E"/>
+                </a:solidFill>
+                <a:latin typeface="Consolas"/>
+              </a:rPr>
+              <a:t>    #     theme: [simple, revealjs-customizations.scss]</a:t>
+            </a:r>
+            <a:br/>
+            <a:r>
+              <a:rPr>
+                <a:solidFill>
+                  <a:srgbClr val="5E5E5E"/>
+                </a:solidFill>
+                <a:latin typeface="Consolas"/>
+              </a:rPr>
+              <a:t>    #     title-slide-attributes:</a:t>
+            </a:r>
+            <a:br/>
+            <a:r>
+              <a:rPr>
+                <a:solidFill>
+                  <a:srgbClr val="5E5E5E"/>
+                </a:solidFill>
+                <a:latin typeface="Consolas"/>
+              </a:rPr>
+              <a:t>    #         data-background-image: images/data-viz-bg.jpg</a:t>
+            </a:r>
+            <a:br/>
+            <a:r>
+              <a:rPr>
+                <a:solidFill>
+                  <a:srgbClr val="5E5E5E"/>
+                </a:solidFill>
+                <a:latin typeface="Consolas"/>
+              </a:rPr>
+              <a:t>    #         data-background-size: contain</a:t>
+            </a:r>
+            <a:br/>
+            <a:r>
+              <a:rPr>
+                <a:solidFill>
+                  <a:srgbClr val="5E5E5E"/>
+                </a:solidFill>
+                <a:latin typeface="Consolas"/>
+              </a:rPr>
+              <a:t>    #         data-background-position: right</a:t>
+            </a:r>
+            <a:br/>
+            <a:br/>
+            <a:r>
+              <a:rPr>
+                <a:solidFill>
+                  <a:srgbClr val="4758AB"/>
+                </a:solidFill>
+                <a:latin typeface="Consolas"/>
+              </a:rPr>
+              <a:t>author</a:t>
+            </a:r>
+            <a:r>
+              <a:rPr>
+                <a:solidFill>
+                  <a:srgbClr val="003B4F"/>
+                </a:solidFill>
+                <a:latin typeface="Consolas"/>
+              </a:rPr>
+              <a:t>:</a:t>
+            </a:r>
+            <a:r>
+              <a:rPr>
+                <a:solidFill>
+                  <a:srgbClr val="657422"/>
+                </a:solidFill>
+                <a:latin typeface="Consolas"/>
+              </a:rPr>
+              <a:t> Lucas A. Meyer</a:t>
+            </a:r>
+            <a:br/>
+            <a:r>
+              <a:rPr>
+                <a:solidFill>
+                  <a:srgbClr val="4758AB"/>
+                </a:solidFill>
+                <a:latin typeface="Consolas"/>
+              </a:rPr>
+              <a:t>date</a:t>
+            </a:r>
+            <a:r>
+              <a:rPr>
+                <a:solidFill>
+                  <a:srgbClr val="003B4F"/>
+                </a:solidFill>
+                <a:latin typeface="Consolas"/>
+              </a:rPr>
+              <a:t>:</a:t>
+            </a:r>
+            <a:r>
+              <a:rPr>
+                <a:solidFill>
+                  <a:srgbClr val="657422"/>
+                </a:solidFill>
+                <a:latin typeface="Consolas"/>
+              </a:rPr>
+              <a:t> 2022-07-14</a:t>
+            </a:r>
+            <a:br/>
+            <a:r>
+              <a:rPr>
+                <a:solidFill>
+                  <a:srgbClr val="AD0000"/>
+                </a:solidFill>
+                <a:latin typeface="Consolas"/>
+              </a:rPr>
+              <a:t>---</a:t>
             </a:r>
           </a:p>
           <a:p>
@@ -7061,200 +8009,6 @@
           </a:ln>
         </p:spPr>
       </p:pic>
-    </p:spTree>
-  </p:cSld>
-</p:sld>
-</file>
-
-<file path=ppt/slides/slide2.xml><?xml version="1.0" encoding="utf-8"?>
-<p:sld xmlns:a="http://schemas.openxmlformats.org/drawingml/2006/main" xmlns:r="http://schemas.openxmlformats.org/officeDocument/2006/relationships" xmlns:p="http://schemas.openxmlformats.org/presentationml/2006/main">
-  <p:cSld>
-    <p:spTree>
-      <p:nvGrpSpPr>
-        <p:cNvPr id="1" name=""/>
-        <p:cNvGrpSpPr/>
-        <p:nvPr/>
-      </p:nvGrpSpPr>
-      <p:grpSpPr>
-        <a:xfrm>
-          <a:off x="0" y="0"/>
-          <a:ext cx="0" cy="0"/>
-          <a:chOff x="0" y="0"/>
-          <a:chExt cx="0" cy="0"/>
-        </a:xfrm>
-      </p:grpSpPr>
-      <p:sp>
-        <p:nvSpPr>
-          <p:cNvPr id="2" name="Title 1"/>
-          <p:cNvSpPr>
-            <a:spLocks noGrp="1"/>
-          </p:cNvSpPr>
-          <p:nvPr>
-            <p:ph type="title"/>
-          </p:nvPr>
-        </p:nvSpPr>
-        <p:spPr/>
-        <p:txBody>
-          <a:bodyPr/>
-          <a:lstStyle/>
-          <a:p>
-            <a:pPr lvl="0" indent="0" marL="0">
-              <a:buNone/>
-            </a:pPr>
-            <a:r>
-              <a:rPr/>
-              <a:t>Why Quarto</a:t>
-            </a:r>
-          </a:p>
-        </p:txBody>
-      </p:sp>
-      <p:sp>
-        <p:nvSpPr>
-          <p:cNvPr id="3" name="Content Placeholder 2"/>
-          <p:cNvSpPr>
-            <a:spLocks noGrp="1"/>
-          </p:cNvSpPr>
-          <p:nvPr>
-            <p:ph idx="1"/>
-          </p:nvPr>
-        </p:nvSpPr>
-        <p:spPr/>
-        <p:txBody>
-          <a:bodyPr/>
-          <a:lstStyle/>
-          <a:p>
-            <a:pPr lvl="0" indent="0" marL="0">
-              <a:spcBef>
-                <a:spcPts val="3000"/>
-              </a:spcBef>
-              <a:buNone/>
-            </a:pPr>
-            <a:r>
-              <a:rPr b="1"/>
-              <a:t>Quarto helps with the content value chain</a:t>
-            </a:r>
-          </a:p>
-        </p:txBody>
-      </p:sp>
-    </p:spTree>
-  </p:cSld>
-</p:sld>
-</file>
-
-<file path=ppt/slides/slide20.xml><?xml version="1.0" encoding="utf-8"?>
-<p:sld xmlns:a="http://schemas.openxmlformats.org/drawingml/2006/main" xmlns:r="http://schemas.openxmlformats.org/officeDocument/2006/relationships" xmlns:p="http://schemas.openxmlformats.org/presentationml/2006/main">
-  <p:cSld>
-    <p:spTree>
-      <p:nvGrpSpPr>
-        <p:cNvPr id="1" name=""/>
-        <p:cNvGrpSpPr/>
-        <p:nvPr/>
-      </p:nvGrpSpPr>
-      <p:grpSpPr>
-        <a:xfrm>
-          <a:off x="0" y="0"/>
-          <a:ext cx="0" cy="0"/>
-          <a:chOff x="0" y="0"/>
-          <a:chExt cx="0" cy="0"/>
-        </a:xfrm>
-      </p:grpSpPr>
-      <p:sp>
-        <p:nvSpPr>
-          <p:cNvPr id="2" name="Title 1"/>
-          <p:cNvSpPr>
-            <a:spLocks noGrp="1"/>
-          </p:cNvSpPr>
-          <p:nvPr>
-            <p:ph type="title"/>
-          </p:nvPr>
-        </p:nvSpPr>
-        <p:spPr/>
-        <p:txBody>
-          <a:bodyPr/>
-          <a:lstStyle/>
-          <a:p>
-            <a:pPr lvl="0" indent="0" marL="0">
-              <a:buNone/>
-            </a:pPr>
-            <a:r>
-              <a:rPr/>
-              <a:t>Articles</a:t>
-            </a:r>
-          </a:p>
-        </p:txBody>
-      </p:sp>
-    </p:spTree>
-  </p:cSld>
-</p:sld>
-</file>
-
-<file path=ppt/slides/slide21.xml><?xml version="1.0" encoding="utf-8"?>
-<p:sld xmlns:a="http://schemas.openxmlformats.org/drawingml/2006/main" xmlns:r="http://schemas.openxmlformats.org/officeDocument/2006/relationships" xmlns:p="http://schemas.openxmlformats.org/presentationml/2006/main">
-  <p:cSld>
-    <p:spTree>
-      <p:nvGrpSpPr>
-        <p:cNvPr id="1" name=""/>
-        <p:cNvGrpSpPr/>
-        <p:nvPr/>
-      </p:nvGrpSpPr>
-      <p:grpSpPr>
-        <a:xfrm>
-          <a:off x="0" y="0"/>
-          <a:ext cx="0" cy="0"/>
-          <a:chOff x="0" y="0"/>
-          <a:chExt cx="0" cy="0"/>
-        </a:xfrm>
-      </p:grpSpPr>
-      <p:sp>
-        <p:nvSpPr>
-          <p:cNvPr id="2" name="Title 1"/>
-          <p:cNvSpPr>
-            <a:spLocks noGrp="1"/>
-          </p:cNvSpPr>
-          <p:nvPr>
-            <p:ph type="title"/>
-          </p:nvPr>
-        </p:nvSpPr>
-        <p:spPr/>
-        <p:txBody>
-          <a:bodyPr/>
-          <a:lstStyle/>
-          <a:p>
-            <a:pPr lvl="0" indent="0" marL="0">
-              <a:buNone/>
-            </a:pPr>
-            <a:r>
-              <a:rPr/>
-              <a:t>Projects</a:t>
-            </a:r>
-          </a:p>
-        </p:txBody>
-      </p:sp>
-      <p:sp>
-        <p:nvSpPr>
-          <p:cNvPr id="3" name="Content Placeholder 2"/>
-          <p:cNvSpPr>
-            <a:spLocks noGrp="1"/>
-          </p:cNvSpPr>
-          <p:nvPr>
-            <p:ph idx="1"/>
-          </p:nvPr>
-        </p:nvSpPr>
-        <p:spPr/>
-        <p:txBody>
-          <a:bodyPr/>
-          <a:lstStyle/>
-          <a:p>
-            <a:pPr lvl="0" indent="0" marL="0">
-              <a:buNone/>
-            </a:pPr>
-            <a:r>
-              <a:rPr/>
-              <a:t>You can use Quarto to generate the whole shebang!</a:t>
-            </a:r>
-          </a:p>
-        </p:txBody>
-      </p:sp>
     </p:spTree>
   </p:cSld>
 </p:sld>
@@ -7840,6 +8594,125 @@
       <p:bldP spid="4" grpId="0" uiExpand="1" build="p"/>
     </p:bldLst>
   </p:timing>
+</p:sld>
+</file>
+
+<file path=ppt/slides/slide30.xml><?xml version="1.0" encoding="utf-8"?>
+<p:sld xmlns:a="http://schemas.openxmlformats.org/drawingml/2006/main" xmlns:r="http://schemas.openxmlformats.org/officeDocument/2006/relationships" xmlns:p="http://schemas.openxmlformats.org/presentationml/2006/main">
+  <p:cSld>
+    <p:spTree>
+      <p:nvGrpSpPr>
+        <p:cNvPr id="1" name=""/>
+        <p:cNvGrpSpPr/>
+        <p:nvPr/>
+      </p:nvGrpSpPr>
+      <p:grpSpPr>
+        <a:xfrm>
+          <a:off x="0" y="0"/>
+          <a:ext cx="0" cy="0"/>
+          <a:chOff x="0" y="0"/>
+          <a:chExt cx="0" cy="0"/>
+        </a:xfrm>
+      </p:grpSpPr>
+      <p:sp>
+        <p:nvSpPr>
+          <p:cNvPr id="2" name="Title 1"/>
+          <p:cNvSpPr>
+            <a:spLocks noGrp="1"/>
+          </p:cNvSpPr>
+          <p:nvPr>
+            <p:ph type="title"/>
+          </p:nvPr>
+        </p:nvSpPr>
+        <p:spPr/>
+        <p:txBody>
+          <a:bodyPr/>
+          <a:lstStyle/>
+          <a:p>
+            <a:pPr lvl="0" indent="0" marL="0">
+              <a:buNone/>
+            </a:pPr>
+            <a:r>
+              <a:rPr/>
+              <a:t>Articles</a:t>
+            </a:r>
+          </a:p>
+        </p:txBody>
+      </p:sp>
+    </p:spTree>
+  </p:cSld>
+</p:sld>
+</file>
+
+<file path=ppt/slides/slide31.xml><?xml version="1.0" encoding="utf-8"?>
+<p:sld xmlns:a="http://schemas.openxmlformats.org/drawingml/2006/main" xmlns:r="http://schemas.openxmlformats.org/officeDocument/2006/relationships" xmlns:p="http://schemas.openxmlformats.org/presentationml/2006/main">
+  <p:cSld>
+    <p:spTree>
+      <p:nvGrpSpPr>
+        <p:cNvPr id="1" name=""/>
+        <p:cNvGrpSpPr/>
+        <p:nvPr/>
+      </p:nvGrpSpPr>
+      <p:grpSpPr>
+        <a:xfrm>
+          <a:off x="0" y="0"/>
+          <a:ext cx="0" cy="0"/>
+          <a:chOff x="0" y="0"/>
+          <a:chExt cx="0" cy="0"/>
+        </a:xfrm>
+      </p:grpSpPr>
+      <p:sp>
+        <p:nvSpPr>
+          <p:cNvPr id="2" name="Title 1"/>
+          <p:cNvSpPr>
+            <a:spLocks noGrp="1"/>
+          </p:cNvSpPr>
+          <p:nvPr>
+            <p:ph type="title"/>
+          </p:nvPr>
+        </p:nvSpPr>
+        <p:spPr/>
+        <p:txBody>
+          <a:bodyPr/>
+          <a:lstStyle/>
+          <a:p>
+            <a:pPr lvl="0" indent="0" marL="0">
+              <a:buNone/>
+            </a:pPr>
+            <a:r>
+              <a:rPr/>
+              <a:t>Projects</a:t>
+            </a:r>
+          </a:p>
+        </p:txBody>
+      </p:sp>
+      <p:sp>
+        <p:nvSpPr>
+          <p:cNvPr id="3" name="Content Placeholder 2"/>
+          <p:cNvSpPr>
+            <a:spLocks noGrp="1"/>
+          </p:cNvSpPr>
+          <p:nvPr>
+            <p:ph idx="1"/>
+          </p:nvPr>
+        </p:nvSpPr>
+        <p:spPr/>
+        <p:txBody>
+          <a:bodyPr/>
+          <a:lstStyle/>
+          <a:p>
+            <a:pPr lvl="0" indent="0" marL="0">
+              <a:buNone/>
+            </a:pPr>
+            <a:r>
+              <a:rPr/>
+              <a:t>You can use Quarto to generate the whole shebang!</a:t>
+            </a:r>
+          </a:p>
+        </p:txBody>
+      </p:sp>
+    </p:spTree>
+  </p:cSld>
 </p:sld>
 </file>
 

</xml_diff>

<commit_message>
Work done by Fri Jul  1 12:54:50 PDT 2022
</commit_message>
<xml_diff>
--- a/docs/presentation.pptx
+++ b/docs/presentation.pptx
@@ -6839,7 +6839,7 @@
       </p:sp>
       <p:pic>
         <p:nvPicPr>
-          <p:cNvPr descr="presentation_files/figure-pptx/cell-16-output-4.png" id="0" name="Picture 1"/>
+          <p:cNvPr descr="presentation_files/figure-pptx/cell-10-output-4.png" id="0" name="Picture 1"/>
           <p:cNvPicPr>
             <a:picLocks noGrp="1" noChangeAspect="1"/>
           </p:cNvPicPr>
@@ -6869,7 +6869,7 @@
       </p:pic>
       <p:pic>
         <p:nvPicPr>
-          <p:cNvPr descr="presentation_files/figure-pptx/cell-16-output-7.png" id="0" name="Picture 1"/>
+          <p:cNvPr descr="presentation_files/figure-pptx/cell-10-output-7.png" id="0" name="Picture 1"/>
           <p:cNvPicPr>
             <a:picLocks noGrp="1" noChangeAspect="1"/>
           </p:cNvPicPr>
@@ -6946,7 +6946,7 @@
       </p:sp>
       <p:pic>
         <p:nvPicPr>
-          <p:cNvPr descr="presentation_files/figure-pptx/cell-16-output-13.png" id="0" name="Picture 1"/>
+          <p:cNvPr descr="presentation_files/figure-pptx/cell-10-output-13.png" id="0" name="Picture 1"/>
           <p:cNvPicPr>
             <a:picLocks noGrp="1" noChangeAspect="1"/>
           </p:cNvPicPr>
@@ -6976,7 +6976,7 @@
       </p:pic>
       <p:pic>
         <p:nvPicPr>
-          <p:cNvPr descr="presentation_files/figure-pptx/cell-16-output-16.png" id="0" name="Picture 1"/>
+          <p:cNvPr descr="presentation_files/figure-pptx/cell-10-output-16.png" id="0" name="Picture 1"/>
           <p:cNvPicPr>
             <a:picLocks noGrp="1" noChangeAspect="1"/>
           </p:cNvPicPr>
@@ -7053,7 +7053,7 @@
       </p:sp>
       <p:pic>
         <p:nvPicPr>
-          <p:cNvPr descr="presentation_files/figure-pptx/cell-16-output-22.png" id="0" name="Picture 1"/>
+          <p:cNvPr descr="presentation_files/figure-pptx/cell-10-output-22.png" id="0" name="Picture 1"/>
           <p:cNvPicPr>
             <a:picLocks noGrp="1" noChangeAspect="1"/>
           </p:cNvPicPr>
@@ -7083,7 +7083,7 @@
       </p:pic>
       <p:pic>
         <p:nvPicPr>
-          <p:cNvPr descr="presentation_files/figure-pptx/cell-16-output-25.png" id="0" name="Picture 1"/>
+          <p:cNvPr descr="presentation_files/figure-pptx/cell-10-output-25.png" id="0" name="Picture 1"/>
           <p:cNvPicPr>
             <a:picLocks noGrp="1" noChangeAspect="1"/>
           </p:cNvPicPr>
@@ -7160,7 +7160,7 @@
       </p:sp>
       <p:pic>
         <p:nvPicPr>
-          <p:cNvPr descr="presentation_files/figure-pptx/cell-16-output-31.png" id="0" name="Picture 1"/>
+          <p:cNvPr descr="presentation_files/figure-pptx/cell-10-output-31.png" id="0" name="Picture 1"/>
           <p:cNvPicPr>
             <a:picLocks noGrp="1" noChangeAspect="1"/>
           </p:cNvPicPr>
@@ -7190,7 +7190,7 @@
       </p:pic>
       <p:pic>
         <p:nvPicPr>
-          <p:cNvPr descr="presentation_files/figure-pptx/cell-16-output-34.png" id="0" name="Picture 1"/>
+          <p:cNvPr descr="presentation_files/figure-pptx/cell-10-output-34.png" id="0" name="Picture 1"/>
           <p:cNvPicPr>
             <a:picLocks noGrp="1" noChangeAspect="1"/>
           </p:cNvPicPr>
@@ -7319,7 +7319,7 @@
       </p:sp>
       <p:pic>
         <p:nvPicPr>
-          <p:cNvPr descr="presentation_files/figure-pptx/cell-16-output-40.png" id="0" name="Picture 1"/>
+          <p:cNvPr descr="presentation_files/figure-pptx/cell-10-output-40.png" id="0" name="Picture 1"/>
           <p:cNvPicPr>
             <a:picLocks noGrp="1" noChangeAspect="1"/>
           </p:cNvPicPr>
@@ -7349,7 +7349,7 @@
       </p:pic>
       <p:pic>
         <p:nvPicPr>
-          <p:cNvPr descr="presentation_files/figure-pptx/cell-16-output-43.png" id="0" name="Picture 1"/>
+          <p:cNvPr descr="presentation_files/figure-pptx/cell-10-output-43.png" id="0" name="Picture 1"/>
           <p:cNvPicPr>
             <a:picLocks noGrp="1" noChangeAspect="1"/>
           </p:cNvPicPr>
@@ -7426,7 +7426,7 @@
       </p:sp>
       <p:pic>
         <p:nvPicPr>
-          <p:cNvPr descr="presentation_files/figure-pptx/cell-16-output-49.png" id="0" name="Picture 1"/>
+          <p:cNvPr descr="presentation_files/figure-pptx/cell-10-output-49.png" id="0" name="Picture 1"/>
           <p:cNvPicPr>
             <a:picLocks noGrp="1" noChangeAspect="1"/>
           </p:cNvPicPr>
@@ -7456,7 +7456,7 @@
       </p:pic>
       <p:pic>
         <p:nvPicPr>
-          <p:cNvPr descr="presentation_files/figure-pptx/cell-16-output-52.png" id="0" name="Picture 1"/>
+          <p:cNvPr descr="presentation_files/figure-pptx/cell-10-output-52.png" id="0" name="Picture 1"/>
           <p:cNvPicPr>
             <a:picLocks noGrp="1" noChangeAspect="1"/>
           </p:cNvPicPr>

</xml_diff>

<commit_message>
Work done by Fri Jul  1 13:00:19 PDT 2022
</commit_message>
<xml_diff>
--- a/docs/presentation.pptx
+++ b/docs/presentation.pptx
@@ -4162,7 +4162,7 @@
               <a:t>Whether you use Quarto from </a:t>
             </a:r>
             <a:r>
-              <a:rPr>
+              <a:rPr sz="1200">
                 <a:latin typeface="Consolas"/>
               </a:rPr>
               <a:t>.qmd</a:t>
@@ -4172,7 +4172,7 @@
               <a:t>, </a:t>
             </a:r>
             <a:r>
-              <a:rPr>
+              <a:rPr sz="1200">
                 <a:latin typeface="Consolas"/>
               </a:rPr>
               <a:t>.ipynb</a:t>
@@ -4182,7 +4182,7 @@
               <a:t>, or </a:t>
             </a:r>
             <a:r>
-              <a:rPr>
+              <a:rPr sz="1200">
                 <a:latin typeface="Consolas"/>
               </a:rPr>
               <a:t>.Rmd</a:t>
@@ -4201,7 +4201,7 @@
               <a:t>The YAML configuration determines what’s the output format of your document. A few popular output options are </a:t>
             </a:r>
             <a:r>
-              <a:rPr>
+              <a:rPr sz="1200">
                 <a:latin typeface="Consolas"/>
               </a:rPr>
               <a:t>html</a:t>
@@ -4211,7 +4211,7 @@
               <a:t>, </a:t>
             </a:r>
             <a:r>
-              <a:rPr>
+              <a:rPr sz="1200">
                 <a:latin typeface="Consolas"/>
               </a:rPr>
               <a:t>pptx</a:t>
@@ -4221,7 +4221,7 @@
               <a:t>, </a:t>
             </a:r>
             <a:r>
-              <a:rPr>
+              <a:rPr sz="1200">
                 <a:latin typeface="Consolas"/>
               </a:rPr>
               <a:t>docx</a:t>
@@ -4231,7 +4231,7 @@
               <a:t>, and </a:t>
             </a:r>
             <a:r>
-              <a:rPr>
+              <a:rPr sz="1200">
                 <a:latin typeface="Consolas"/>
               </a:rPr>
               <a:t>pdf</a:t>
@@ -4280,7 +4280,7 @@
               <a:buNone/>
             </a:pPr>
             <a:r>
-              <a:rPr>
+              <a:rPr sz="1200">
                 <a:solidFill>
                   <a:srgbClr val="AD0000"/>
                 </a:solidFill>
@@ -4290,7 +4290,7 @@
             </a:r>
             <a:br/>
             <a:r>
-              <a:rPr>
+              <a:rPr sz="1200">
                 <a:solidFill>
                   <a:srgbClr val="4758AB"/>
                 </a:solidFill>
@@ -4299,7 +4299,7 @@
               <a:t>title</a:t>
             </a:r>
             <a:r>
-              <a:rPr>
+              <a:rPr sz="1200">
                 <a:solidFill>
                   <a:srgbClr val="003B4F"/>
                 </a:solidFill>
@@ -4308,7 +4308,7 @@
               <a:t>:</a:t>
             </a:r>
             <a:r>
-              <a:rPr>
+              <a:rPr sz="1200">
                 <a:solidFill>
                   <a:srgbClr val="657422"/>
                 </a:solidFill>
@@ -4317,7 +4317,7 @@
               <a:t> </a:t>
             </a:r>
             <a:r>
-              <a:rPr>
+              <a:rPr sz="1200">
                 <a:solidFill>
                   <a:srgbClr val="20794D"/>
                 </a:solidFill>
@@ -4327,7 +4327,7 @@
             </a:r>
             <a:br/>
             <a:r>
-              <a:rPr>
+              <a:rPr sz="1200">
                 <a:solidFill>
                   <a:srgbClr val="4758AB"/>
                 </a:solidFill>
@@ -4336,7 +4336,7 @@
               <a:t>format</a:t>
             </a:r>
             <a:r>
-              <a:rPr>
+              <a:rPr sz="1200">
                 <a:solidFill>
                   <a:srgbClr val="003B4F"/>
                 </a:solidFill>
@@ -4345,7 +4345,7 @@
               <a:t>:</a:t>
             </a:r>
             <a:r>
-              <a:rPr>
+              <a:rPr sz="1200">
                 <a:solidFill>
                   <a:srgbClr val="657422"/>
                 </a:solidFill>
@@ -4355,7 +4355,7 @@
             </a:r>
             <a:br/>
             <a:r>
-              <a:rPr>
+              <a:rPr sz="1200">
                 <a:solidFill>
                   <a:srgbClr val="657422"/>
                 </a:solidFill>
@@ -4364,7 +4364,7 @@
               <a:t>    </a:t>
             </a:r>
             <a:r>
-              <a:rPr>
+              <a:rPr sz="1200">
                 <a:solidFill>
                   <a:srgbClr val="4758AB"/>
                 </a:solidFill>
@@ -4373,7 +4373,7 @@
               <a:t>pptx</a:t>
             </a:r>
             <a:r>
-              <a:rPr>
+              <a:rPr sz="1200">
                 <a:solidFill>
                   <a:srgbClr val="003B4F"/>
                 </a:solidFill>
@@ -4383,7 +4383,7 @@
             </a:r>
             <a:br/>
             <a:r>
-              <a:rPr>
+              <a:rPr sz="1200">
                 <a:solidFill>
                   <a:srgbClr val="657422"/>
                 </a:solidFill>
@@ -4392,7 +4392,7 @@
               <a:t>        </a:t>
             </a:r>
             <a:r>
-              <a:rPr>
+              <a:rPr sz="1200">
                 <a:solidFill>
                   <a:srgbClr val="4758AB"/>
                 </a:solidFill>
@@ -4401,7 +4401,7 @@
               <a:t>reference-doc</a:t>
             </a:r>
             <a:r>
-              <a:rPr>
+              <a:rPr sz="1200">
                 <a:solidFill>
                   <a:srgbClr val="003B4F"/>
                 </a:solidFill>
@@ -4410,7 +4410,7 @@
               <a:t>:</a:t>
             </a:r>
             <a:r>
-              <a:rPr>
+              <a:rPr sz="1200">
                 <a:solidFill>
                   <a:srgbClr val="657422"/>
                 </a:solidFill>
@@ -4420,7 +4420,7 @@
             </a:r>
             <a:br/>
             <a:r>
-              <a:rPr>
+              <a:rPr sz="1200">
                 <a:solidFill>
                   <a:srgbClr val="657422"/>
                 </a:solidFill>
@@ -4429,7 +4429,7 @@
               <a:t>    </a:t>
             </a:r>
             <a:r>
-              <a:rPr>
+              <a:rPr sz="1200">
                 <a:solidFill>
                   <a:srgbClr val="4758AB"/>
                 </a:solidFill>
@@ -4438,7 +4438,7 @@
               <a:t>revealjs</a:t>
             </a:r>
             <a:r>
-              <a:rPr>
+              <a:rPr sz="1200">
                 <a:solidFill>
                   <a:srgbClr val="003B4F"/>
                 </a:solidFill>
@@ -4448,7 +4448,7 @@
             </a:r>
             <a:br/>
             <a:r>
-              <a:rPr>
+              <a:rPr sz="1200">
                 <a:solidFill>
                   <a:srgbClr val="657422"/>
                 </a:solidFill>
@@ -4457,7 +4457,7 @@
               <a:t>        </a:t>
             </a:r>
             <a:r>
-              <a:rPr>
+              <a:rPr sz="1200">
                 <a:solidFill>
                   <a:srgbClr val="4758AB"/>
                 </a:solidFill>
@@ -4466,7 +4466,7 @@
               <a:t>incremental</a:t>
             </a:r>
             <a:r>
-              <a:rPr>
+              <a:rPr sz="1200">
                 <a:solidFill>
                   <a:srgbClr val="003B4F"/>
                 </a:solidFill>
@@ -4475,7 +4475,7 @@
               <a:t>:</a:t>
             </a:r>
             <a:r>
-              <a:rPr>
+              <a:rPr sz="1200">
                 <a:solidFill>
                   <a:srgbClr val="657422"/>
                 </a:solidFill>
@@ -4484,7 +4484,7 @@
               <a:t> </a:t>
             </a:r>
             <a:r>
-              <a:rPr>
+              <a:rPr sz="1200">
                 <a:solidFill>
                   <a:srgbClr val="20794D"/>
                 </a:solidFill>
@@ -4494,7 +4494,7 @@
             </a:r>
             <a:br/>
             <a:r>
-              <a:rPr>
+              <a:rPr sz="1200">
                 <a:solidFill>
                   <a:srgbClr val="657422"/>
                 </a:solidFill>
@@ -4503,7 +4503,7 @@
               <a:t>        </a:t>
             </a:r>
             <a:r>
-              <a:rPr>
+              <a:rPr sz="1200">
                 <a:solidFill>
                   <a:srgbClr val="4758AB"/>
                 </a:solidFill>
@@ -4512,7 +4512,7 @@
               <a:t>theme</a:t>
             </a:r>
             <a:r>
-              <a:rPr>
+              <a:rPr sz="1200">
                 <a:solidFill>
                   <a:srgbClr val="003B4F"/>
                 </a:solidFill>
@@ -4521,7 +4521,7 @@
               <a:t>:</a:t>
             </a:r>
             <a:r>
-              <a:rPr>
+              <a:rPr sz="1200">
                 <a:solidFill>
                   <a:srgbClr val="657422"/>
                 </a:solidFill>
@@ -4532,7 +4532,7 @@
             <a:br/>
             <a:br/>
             <a:r>
-              <a:rPr>
+              <a:rPr sz="1200">
                 <a:solidFill>
                   <a:srgbClr val="4758AB"/>
                 </a:solidFill>
@@ -4541,7 +4541,7 @@
               <a:t>author</a:t>
             </a:r>
             <a:r>
-              <a:rPr>
+              <a:rPr sz="1200">
                 <a:solidFill>
                   <a:srgbClr val="003B4F"/>
                 </a:solidFill>
@@ -4550,7 +4550,7 @@
               <a:t>:</a:t>
             </a:r>
             <a:r>
-              <a:rPr>
+              <a:rPr sz="1200">
                 <a:solidFill>
                   <a:srgbClr val="657422"/>
                 </a:solidFill>
@@ -4560,7 +4560,7 @@
             </a:r>
             <a:br/>
             <a:r>
-              <a:rPr>
+              <a:rPr sz="1200">
                 <a:solidFill>
                   <a:srgbClr val="4758AB"/>
                 </a:solidFill>
@@ -4569,7 +4569,7 @@
               <a:t>date</a:t>
             </a:r>
             <a:r>
-              <a:rPr>
+              <a:rPr sz="1200">
                 <a:solidFill>
                   <a:srgbClr val="003B4F"/>
                 </a:solidFill>
@@ -4578,7 +4578,7 @@
               <a:t>:</a:t>
             </a:r>
             <a:r>
-              <a:rPr>
+              <a:rPr sz="1200">
                 <a:solidFill>
                   <a:srgbClr val="657422"/>
                 </a:solidFill>
@@ -4588,7 +4588,7 @@
             </a:r>
             <a:br/>
             <a:r>
-              <a:rPr>
+              <a:rPr sz="1200">
                 <a:solidFill>
                   <a:srgbClr val="AD0000"/>
                 </a:solidFill>
@@ -4665,7 +4665,7 @@
               <a:buNone/>
             </a:pPr>
             <a:r>
-              <a:rPr>
+              <a:rPr sz="1200">
                 <a:solidFill>
                   <a:srgbClr val="4758AB"/>
                 </a:solidFill>
@@ -4676,7 +4676,7 @@
             <a:br/>
             <a:br/>
             <a:r>
-              <a:rPr>
+              <a:rPr sz="1200">
                 <a:solidFill>
                   <a:srgbClr val="003B4F"/>
                 </a:solidFill>
@@ -4685,7 +4685,7 @@
               <a:t>Most writing in Quarto is done in </a:t>
             </a:r>
             <a:r>
-              <a:rPr>
+              <a:rPr sz="1200">
                 <a:solidFill>
                   <a:srgbClr val="5E5E5E"/>
                 </a:solidFill>
@@ -4694,7 +4694,7 @@
               <a:t>[</a:t>
             </a:r>
             <a:r>
-              <a:rPr>
+              <a:rPr sz="1200">
                 <a:solidFill>
                   <a:srgbClr val="003B4F"/>
                 </a:solidFill>
@@ -4703,7 +4703,7 @@
               <a:t>Markdown</a:t>
             </a:r>
             <a:r>
-              <a:rPr>
+              <a:rPr sz="1200">
                 <a:solidFill>
                   <a:srgbClr val="5E5E5E"/>
                 </a:solidFill>
@@ -4712,7 +4712,7 @@
               <a:t>]</a:t>
             </a:r>
             <a:r>
-              <a:rPr>
+              <a:rPr sz="1200">
                 <a:solidFill>
                   <a:srgbClr val="003B4F"/>
                 </a:solidFill>
@@ -4723,7 +4723,7 @@
             <a:br/>
             <a:br/>
             <a:r>
-              <a:rPr>
+              <a:rPr sz="1200">
                 <a:solidFill>
                   <a:srgbClr val="003B4F"/>
                 </a:solidFill>
@@ -4733,7 +4733,7 @@
             </a:r>
             <a:br/>
             <a:r>
-              <a:rPr>
+              <a:rPr sz="1200">
                 <a:solidFill>
                   <a:srgbClr val="003B4F"/>
                 </a:solidFill>
@@ -4744,7 +4744,7 @@
             <a:br/>
             <a:br/>
             <a:r>
-              <a:rPr>
+              <a:rPr sz="1200">
                 <a:solidFill>
                   <a:srgbClr val="003B4F"/>
                 </a:solidFill>
@@ -4754,7 +4754,7 @@
             </a:r>
             <a:br/>
             <a:r>
-              <a:rPr>
+              <a:rPr sz="1200">
                 <a:solidFill>
                   <a:srgbClr val="003B4F"/>
                 </a:solidFill>
@@ -4763,7 +4763,7 @@
               <a:t>diagrams with </a:t>
             </a:r>
             <a:r>
-              <a:rPr>
+              <a:rPr sz="1200">
                 <a:solidFill>
                   <a:srgbClr val="5E5E5E"/>
                 </a:solidFill>
@@ -4772,7 +4772,7 @@
               <a:t>`mermaid`</a:t>
             </a:r>
             <a:r>
-              <a:rPr>
+              <a:rPr sz="1200">
                 <a:solidFill>
                   <a:srgbClr val="003B4F"/>
                 </a:solidFill>
@@ -4781,7 +4781,7 @@
               <a:t> and </a:t>
             </a:r>
             <a:r>
-              <a:rPr>
+              <a:rPr sz="1200">
                 <a:solidFill>
                   <a:srgbClr val="5E5E5E"/>
                 </a:solidFill>
@@ -4790,7 +4790,7 @@
               <a:t>`GraphViz`</a:t>
             </a:r>
             <a:r>
-              <a:rPr>
+              <a:rPr sz="1200">
                 <a:solidFill>
                   <a:srgbClr val="003B4F"/>
                 </a:solidFill>
@@ -4800,7 +4800,7 @@
             </a:r>
             <a:br/>
             <a:r>
-              <a:rPr>
+              <a:rPr sz="1200">
                 <a:solidFill>
                   <a:srgbClr val="003B4F"/>
                 </a:solidFill>
@@ -4811,7 +4811,7 @@
             <a:br/>
             <a:br/>
             <a:r>
-              <a:rPr>
+              <a:rPr sz="1200">
                 <a:solidFill>
                   <a:srgbClr val="003B4F"/>
                 </a:solidFill>
@@ -4821,7 +4821,7 @@
             </a:r>
             <a:br/>
             <a:r>
-              <a:rPr>
+              <a:rPr sz="1200">
                 <a:solidFill>
                   <a:srgbClr val="003B4F"/>
                 </a:solidFill>
@@ -4831,7 +4831,7 @@
             </a:r>
             <a:br/>
             <a:r>
-              <a:rPr>
+              <a:rPr sz="1200">
                 <a:solidFill>
                   <a:srgbClr val="003B4F"/>
                 </a:solidFill>
@@ -5046,7 +5046,7 @@
             </a:pPr>
             <a:br/>
             <a:r>
-              <a:rPr>
+              <a:rPr sz="1200">
                 <a:solidFill>
                   <a:srgbClr val="00769E"/>
                 </a:solidFill>
@@ -5055,7 +5055,7 @@
               <a:t>import</a:t>
             </a:r>
             <a:r>
-              <a:rPr>
+              <a:rPr sz="1200">
                 <a:solidFill>
                   <a:srgbClr val="003B4F"/>
                 </a:solidFill>
@@ -5064,7 +5064,7 @@
               <a:t> numpy </a:t>
             </a:r>
             <a:r>
-              <a:rPr>
+              <a:rPr sz="1200">
                 <a:solidFill>
                   <a:srgbClr val="00769E"/>
                 </a:solidFill>
@@ -5073,7 +5073,7 @@
               <a:t>as</a:t>
             </a:r>
             <a:r>
-              <a:rPr>
+              <a:rPr sz="1200">
                 <a:solidFill>
                   <a:srgbClr val="003B4F"/>
                 </a:solidFill>
@@ -5083,7 +5083,7 @@
             </a:r>
             <a:br/>
             <a:r>
-              <a:rPr>
+              <a:rPr sz="1200">
                 <a:solidFill>
                   <a:srgbClr val="00769E"/>
                 </a:solidFill>
@@ -5092,7 +5092,7 @@
               <a:t>import</a:t>
             </a:r>
             <a:r>
-              <a:rPr>
+              <a:rPr sz="1200">
                 <a:solidFill>
                   <a:srgbClr val="003B4F"/>
                 </a:solidFill>
@@ -5101,7 +5101,7 @@
               <a:t> matplotlib.pyplot </a:t>
             </a:r>
             <a:r>
-              <a:rPr>
+              <a:rPr sz="1200">
                 <a:solidFill>
                   <a:srgbClr val="00769E"/>
                 </a:solidFill>
@@ -5110,7 +5110,7 @@
               <a:t>as</a:t>
             </a:r>
             <a:r>
-              <a:rPr>
+              <a:rPr sz="1200">
                 <a:solidFill>
                   <a:srgbClr val="003B4F"/>
                 </a:solidFill>
@@ -5121,7 +5121,7 @@
             <a:br/>
             <a:br/>
             <a:r>
-              <a:rPr>
+              <a:rPr sz="1200">
                 <a:solidFill>
                   <a:srgbClr val="003B4F"/>
                 </a:solidFill>
@@ -5130,7 +5130,7 @@
               <a:t>r </a:t>
             </a:r>
             <a:r>
-              <a:rPr>
+              <a:rPr sz="1200">
                 <a:solidFill>
                   <a:srgbClr val="5E5E5E"/>
                 </a:solidFill>
@@ -5139,7 +5139,7 @@
               <a:t>=</a:t>
             </a:r>
             <a:r>
-              <a:rPr>
+              <a:rPr sz="1200">
                 <a:solidFill>
                   <a:srgbClr val="003B4F"/>
                 </a:solidFill>
@@ -5148,7 +5148,7 @@
               <a:t> np.arange(</a:t>
             </a:r>
             <a:r>
-              <a:rPr>
+              <a:rPr sz="1200">
                 <a:solidFill>
                   <a:srgbClr val="AD0000"/>
                 </a:solidFill>
@@ -5157,7 +5157,7 @@
               <a:t>0</a:t>
             </a:r>
             <a:r>
-              <a:rPr>
+              <a:rPr sz="1200">
                 <a:solidFill>
                   <a:srgbClr val="003B4F"/>
                 </a:solidFill>
@@ -5166,7 +5166,7 @@
               <a:t>, </a:t>
             </a:r>
             <a:r>
-              <a:rPr>
+              <a:rPr sz="1200">
                 <a:solidFill>
                   <a:srgbClr val="AD0000"/>
                 </a:solidFill>
@@ -5175,7 +5175,7 @@
               <a:t>2</a:t>
             </a:r>
             <a:r>
-              <a:rPr>
+              <a:rPr sz="1200">
                 <a:solidFill>
                   <a:srgbClr val="003B4F"/>
                 </a:solidFill>
@@ -5184,7 +5184,7 @@
               <a:t>, </a:t>
             </a:r>
             <a:r>
-              <a:rPr>
+              <a:rPr sz="1200">
                 <a:solidFill>
                   <a:srgbClr val="AD0000"/>
                 </a:solidFill>
@@ -5193,7 +5193,7 @@
               <a:t>0.01</a:t>
             </a:r>
             <a:r>
-              <a:rPr>
+              <a:rPr sz="1200">
                 <a:solidFill>
                   <a:srgbClr val="003B4F"/>
                 </a:solidFill>
@@ -5203,7 +5203,7 @@
             </a:r>
             <a:br/>
             <a:r>
-              <a:rPr>
+              <a:rPr sz="1200">
                 <a:solidFill>
                   <a:srgbClr val="003B4F"/>
                 </a:solidFill>
@@ -5212,7 +5212,7 @@
               <a:t>theta </a:t>
             </a:r>
             <a:r>
-              <a:rPr>
+              <a:rPr sz="1200">
                 <a:solidFill>
                   <a:srgbClr val="5E5E5E"/>
                 </a:solidFill>
@@ -5221,7 +5221,7 @@
               <a:t>=</a:t>
             </a:r>
             <a:r>
-              <a:rPr>
+              <a:rPr sz="1200">
                 <a:solidFill>
                   <a:srgbClr val="003B4F"/>
                 </a:solidFill>
@@ -5230,7 +5230,7 @@
               <a:t> </a:t>
             </a:r>
             <a:r>
-              <a:rPr>
+              <a:rPr sz="1200">
                 <a:solidFill>
                   <a:srgbClr val="AD0000"/>
                 </a:solidFill>
@@ -5239,7 +5239,7 @@
               <a:t>2</a:t>
             </a:r>
             <a:r>
-              <a:rPr>
+              <a:rPr sz="1200">
                 <a:solidFill>
                   <a:srgbClr val="003B4F"/>
                 </a:solidFill>
@@ -5248,7 +5248,7 @@
               <a:t> </a:t>
             </a:r>
             <a:r>
-              <a:rPr>
+              <a:rPr sz="1200">
                 <a:solidFill>
                   <a:srgbClr val="5E5E5E"/>
                 </a:solidFill>
@@ -5257,7 +5257,7 @@
               <a:t>*</a:t>
             </a:r>
             <a:r>
-              <a:rPr>
+              <a:rPr sz="1200">
                 <a:solidFill>
                   <a:srgbClr val="003B4F"/>
                 </a:solidFill>
@@ -5266,7 +5266,7 @@
               <a:t> np.pi </a:t>
             </a:r>
             <a:r>
-              <a:rPr>
+              <a:rPr sz="1200">
                 <a:solidFill>
                   <a:srgbClr val="5E5E5E"/>
                 </a:solidFill>
@@ -5275,7 +5275,7 @@
               <a:t>*</a:t>
             </a:r>
             <a:r>
-              <a:rPr>
+              <a:rPr sz="1200">
                 <a:solidFill>
                   <a:srgbClr val="003B4F"/>
                 </a:solidFill>
@@ -5285,7 +5285,7 @@
             </a:r>
             <a:br/>
             <a:r>
-              <a:rPr>
+              <a:rPr sz="1200">
                 <a:solidFill>
                   <a:srgbClr val="003B4F"/>
                 </a:solidFill>
@@ -5294,7 +5294,7 @@
               <a:t>fig, ax </a:t>
             </a:r>
             <a:r>
-              <a:rPr>
+              <a:rPr sz="1200">
                 <a:solidFill>
                   <a:srgbClr val="5E5E5E"/>
                 </a:solidFill>
@@ -5303,7 +5303,7 @@
               <a:t>=</a:t>
             </a:r>
             <a:r>
-              <a:rPr>
+              <a:rPr sz="1200">
                 <a:solidFill>
                   <a:srgbClr val="003B4F"/>
                 </a:solidFill>
@@ -5312,7 +5312,7 @@
               <a:t> plt.subplots(subplot_kw</a:t>
             </a:r>
             <a:r>
-              <a:rPr>
+              <a:rPr sz="1200">
                 <a:solidFill>
                   <a:srgbClr val="5E5E5E"/>
                 </a:solidFill>
@@ -5322,7 +5322,7 @@
             </a:r>
             <a:br/>
             <a:r>
-              <a:rPr>
+              <a:rPr sz="1200">
                 <a:solidFill>
                   <a:srgbClr val="003B4F"/>
                 </a:solidFill>
@@ -5331,7 +5331,7 @@
               <a:t>                {</a:t>
             </a:r>
             <a:r>
-              <a:rPr>
+              <a:rPr sz="1200">
                 <a:solidFill>
                   <a:srgbClr val="20794D"/>
                 </a:solidFill>
@@ -5340,7 +5340,7 @@
               <a:t>'projection'</a:t>
             </a:r>
             <a:r>
-              <a:rPr>
+              <a:rPr sz="1200">
                 <a:solidFill>
                   <a:srgbClr val="003B4F"/>
                 </a:solidFill>
@@ -5349,7 +5349,7 @@
               <a:t>: </a:t>
             </a:r>
             <a:r>
-              <a:rPr>
+              <a:rPr sz="1200">
                 <a:solidFill>
                   <a:srgbClr val="20794D"/>
                 </a:solidFill>
@@ -5358,7 +5358,7 @@
               <a:t>'polar'</a:t>
             </a:r>
             <a:r>
-              <a:rPr>
+              <a:rPr sz="1200">
                 <a:solidFill>
                   <a:srgbClr val="003B4F"/>
                 </a:solidFill>
@@ -5368,7 +5368,7 @@
             </a:r>
             <a:br/>
             <a:r>
-              <a:rPr>
+              <a:rPr sz="1200">
                 <a:solidFill>
                   <a:srgbClr val="003B4F"/>
                 </a:solidFill>
@@ -5378,7 +5378,7 @@
             </a:r>
             <a:br/>
             <a:r>
-              <a:rPr>
+              <a:rPr sz="1200">
                 <a:solidFill>
                   <a:srgbClr val="003B4F"/>
                 </a:solidFill>
@@ -5387,7 +5387,7 @@
               <a:t>ax.set_rticks([</a:t>
             </a:r>
             <a:r>
-              <a:rPr>
+              <a:rPr sz="1200">
                 <a:solidFill>
                   <a:srgbClr val="AD0000"/>
                 </a:solidFill>
@@ -5396,7 +5396,7 @@
               <a:t>0.5</a:t>
             </a:r>
             <a:r>
-              <a:rPr>
+              <a:rPr sz="1200">
                 <a:solidFill>
                   <a:srgbClr val="003B4F"/>
                 </a:solidFill>
@@ -5405,7 +5405,7 @@
               <a:t>, </a:t>
             </a:r>
             <a:r>
-              <a:rPr>
+              <a:rPr sz="1200">
                 <a:solidFill>
                   <a:srgbClr val="AD0000"/>
                 </a:solidFill>
@@ -5414,7 +5414,7 @@
               <a:t>1</a:t>
             </a:r>
             <a:r>
-              <a:rPr>
+              <a:rPr sz="1200">
                 <a:solidFill>
                   <a:srgbClr val="003B4F"/>
                 </a:solidFill>
@@ -5423,7 +5423,7 @@
               <a:t>, </a:t>
             </a:r>
             <a:r>
-              <a:rPr>
+              <a:rPr sz="1200">
                 <a:solidFill>
                   <a:srgbClr val="AD0000"/>
                 </a:solidFill>
@@ -5432,7 +5432,7 @@
               <a:t>1.5</a:t>
             </a:r>
             <a:r>
-              <a:rPr>
+              <a:rPr sz="1200">
                 <a:solidFill>
                   <a:srgbClr val="003B4F"/>
                 </a:solidFill>
@@ -5441,7 +5441,7 @@
               <a:t>, </a:t>
             </a:r>
             <a:r>
-              <a:rPr>
+              <a:rPr sz="1200">
                 <a:solidFill>
                   <a:srgbClr val="AD0000"/>
                 </a:solidFill>
@@ -5450,7 +5450,7 @@
               <a:t>2</a:t>
             </a:r>
             <a:r>
-              <a:rPr>
+              <a:rPr sz="1200">
                 <a:solidFill>
                   <a:srgbClr val="003B4F"/>
                 </a:solidFill>
@@ -5460,7 +5460,7 @@
             </a:r>
             <a:br/>
             <a:r>
-              <a:rPr>
+              <a:rPr sz="1200">
                 <a:solidFill>
                   <a:srgbClr val="003B4F"/>
                 </a:solidFill>
@@ -5469,7 +5469,7 @@
               <a:t>ax.grid(</a:t>
             </a:r>
             <a:r>
-              <a:rPr>
+              <a:rPr sz="1200">
                 <a:solidFill>
                   <a:srgbClr val="111111"/>
                 </a:solidFill>
@@ -5478,7 +5478,7 @@
               <a:t>True</a:t>
             </a:r>
             <a:r>
-              <a:rPr>
+              <a:rPr sz="1200">
                 <a:solidFill>
                   <a:srgbClr val="003B4F"/>
                 </a:solidFill>
@@ -5488,7 +5488,7 @@
             </a:r>
             <a:br/>
             <a:r>
-              <a:rPr>
+              <a:rPr sz="1200">
                 <a:solidFill>
                   <a:srgbClr val="003B4F"/>
                 </a:solidFill>
@@ -5647,7 +5647,7 @@
               <a:buNone/>
             </a:pPr>
             <a:r>
-              <a:rPr>
+              <a:rPr sz="1200">
                 <a:solidFill>
                   <a:srgbClr val="003B4F"/>
                 </a:solidFill>
@@ -5657,7 +5657,7 @@
             </a:r>
             <a:br/>
             <a:r>
-              <a:rPr>
+              <a:rPr sz="1200">
                 <a:solidFill>
                   <a:srgbClr val="003B4F"/>
                 </a:solidFill>
@@ -5666,7 +5666,7 @@
               <a:t>with </a:t>
             </a:r>
             <a:r>
-              <a:rPr>
+              <a:rPr sz="1200">
                 <a:solidFill>
                   <a:srgbClr val="5E5E5E"/>
                 </a:solidFill>
@@ -5675,7 +5675,7 @@
               <a:t>`#`</a:t>
             </a:r>
             <a:r>
-              <a:rPr>
+              <a:rPr sz="1200">
                 <a:solidFill>
                   <a:srgbClr val="003B4F"/>
                 </a:solidFill>
@@ -5684,7 +5684,7 @@
               <a:t>, titles with </a:t>
             </a:r>
             <a:r>
-              <a:rPr>
+              <a:rPr sz="1200">
                 <a:solidFill>
                   <a:srgbClr val="5E5E5E"/>
                 </a:solidFill>
@@ -5693,7 +5693,7 @@
               <a:t>`##`</a:t>
             </a:r>
             <a:r>
-              <a:rPr>
+              <a:rPr sz="1200">
                 <a:solidFill>
                   <a:srgbClr val="003B4F"/>
                 </a:solidFill>
@@ -5703,7 +5703,7 @@
             </a:r>
             <a:br/>
             <a:r>
-              <a:rPr>
+              <a:rPr sz="1200">
                 <a:solidFill>
                   <a:srgbClr val="003B4F"/>
                 </a:solidFill>
@@ -5712,7 +5712,7 @@
               <a:t>with </a:t>
             </a:r>
             <a:r>
-              <a:rPr>
+              <a:rPr sz="1200">
                 <a:solidFill>
                   <a:srgbClr val="5E5E5E"/>
                 </a:solidFill>
@@ -5721,7 +5721,7 @@
               <a:t>`-`</a:t>
             </a:r>
             <a:r>
-              <a:rPr>
+              <a:rPr sz="1200">
                 <a:solidFill>
                   <a:srgbClr val="003B4F"/>
                 </a:solidFill>
@@ -5732,7 +5732,7 @@
             <a:br/>
             <a:br/>
             <a:r>
-              <a:rPr>
+              <a:rPr sz="1200">
                 <a:solidFill>
                   <a:srgbClr val="003B4F"/>
                 </a:solidFill>
@@ -5743,7 +5743,7 @@
             <a:br/>
             <a:br/>
             <a:r>
-              <a:rPr>
+              <a:rPr sz="1200">
                 <a:solidFill>
                   <a:srgbClr val="4758AB"/>
                 </a:solidFill>
@@ -5754,7 +5754,7 @@
             <a:br/>
             <a:br/>
             <a:r>
-              <a:rPr>
+              <a:rPr sz="1200">
                 <a:solidFill>
                   <a:srgbClr val="20794D"/>
                 </a:solidFill>
@@ -5763,7 +5763,7 @@
               <a:t>- </a:t>
             </a:r>
             <a:r>
-              <a:rPr>
+              <a:rPr sz="1200">
                 <a:solidFill>
                   <a:srgbClr val="003B4F"/>
                 </a:solidFill>
@@ -5773,7 +5773,7 @@
             </a:r>
             <a:br/>
             <a:r>
-              <a:rPr>
+              <a:rPr sz="1200">
                 <a:solidFill>
                   <a:srgbClr val="20794D"/>
                 </a:solidFill>
@@ -5782,7 +5782,7 @@
               <a:t>    - </a:t>
             </a:r>
             <a:r>
-              <a:rPr>
+              <a:rPr sz="1200">
                 <a:solidFill>
                   <a:srgbClr val="003B4F"/>
                 </a:solidFill>
@@ -5792,7 +5792,7 @@
             </a:r>
             <a:br/>
             <a:r>
-              <a:rPr>
+              <a:rPr sz="1200">
                 <a:solidFill>
                   <a:srgbClr val="20794D"/>
                 </a:solidFill>
@@ -5801,7 +5801,7 @@
               <a:t>    - </a:t>
             </a:r>
             <a:r>
-              <a:rPr>
+              <a:rPr sz="1200">
                 <a:solidFill>
                   <a:srgbClr val="003B4F"/>
                 </a:solidFill>
@@ -5811,7 +5811,7 @@
             </a:r>
             <a:br/>
             <a:r>
-              <a:rPr>
+              <a:rPr sz="1200">
                 <a:solidFill>
                   <a:srgbClr val="20794D"/>
                 </a:solidFill>
@@ -5820,7 +5820,7 @@
               <a:t>    - </a:t>
             </a:r>
             <a:r>
-              <a:rPr>
+              <a:rPr sz="1200">
                 <a:solidFill>
                   <a:srgbClr val="003B4F"/>
                 </a:solidFill>
@@ -5830,7 +5830,7 @@
             </a:r>
             <a:br/>
             <a:r>
-              <a:rPr>
+              <a:rPr sz="1200">
                 <a:solidFill>
                   <a:srgbClr val="20794D"/>
                 </a:solidFill>
@@ -5839,7 +5839,7 @@
               <a:t>    - </a:t>
             </a:r>
             <a:r>
-              <a:rPr>
+              <a:rPr sz="1200">
                 <a:solidFill>
                   <a:srgbClr val="003B4F"/>
                 </a:solidFill>
@@ -5849,7 +5849,7 @@
             </a:r>
             <a:br/>
             <a:r>
-              <a:rPr>
+              <a:rPr sz="1200">
                 <a:solidFill>
                   <a:srgbClr val="20794D"/>
                 </a:solidFill>
@@ -5858,7 +5858,7 @@
               <a:t>    - </a:t>
             </a:r>
             <a:r>
-              <a:rPr>
+              <a:rPr sz="1200">
                 <a:solidFill>
                   <a:srgbClr val="003B4F"/>
                 </a:solidFill>
@@ -5892,7 +5892,7 @@
               <a:t>To create slides, you create sections with </a:t>
             </a:r>
             <a:r>
-              <a:rPr>
+              <a:rPr sz="1200">
                 <a:latin typeface="Consolas"/>
               </a:rPr>
               <a:t>#</a:t>
@@ -5902,7 +5902,7 @@
               <a:t>, titles with </a:t>
             </a:r>
             <a:r>
-              <a:rPr>
+              <a:rPr sz="1200">
                 <a:latin typeface="Consolas"/>
               </a:rPr>
               <a:t>##</a:t>
@@ -5912,7 +5912,7 @@
               <a:t>, and bullets with </a:t>
             </a:r>
             <a:r>
-              <a:rPr>
+              <a:rPr sz="1200">
                 <a:latin typeface="Consolas"/>
               </a:rPr>
               <a:t>-</a:t>
@@ -6071,7 +6071,7 @@
               <a:buNone/>
             </a:pPr>
             <a:r>
-              <a:rPr>
+              <a:rPr sz="1200">
                 <a:solidFill>
                   <a:srgbClr val="003B4F"/>
                 </a:solidFill>
@@ -6080,7 +6080,7 @@
               <a:t>df_dr </a:t>
             </a:r>
             <a:r>
-              <a:rPr>
+              <a:rPr sz="1200">
                 <a:solidFill>
                   <a:srgbClr val="5E5E5E"/>
                 </a:solidFill>
@@ -6089,7 +6089,7 @@
               <a:t>=</a:t>
             </a:r>
             <a:r>
-              <a:rPr>
+              <a:rPr sz="1200">
                 <a:solidFill>
                   <a:srgbClr val="003B4F"/>
                 </a:solidFill>
@@ -6098,7 +6098,7 @@
               <a:t> pd.read_csv(</a:t>
             </a:r>
             <a:r>
-              <a:rPr>
+              <a:rPr sz="1200">
                 <a:solidFill>
                   <a:srgbClr val="20794D"/>
                 </a:solidFill>
@@ -6107,7 +6107,7 @@
               <a:t>"data/dr.csv.gz"</a:t>
             </a:r>
             <a:r>
-              <a:rPr>
+              <a:rPr sz="1200">
                 <a:solidFill>
                   <a:srgbClr val="003B4F"/>
                 </a:solidFill>
@@ -6116,7 +6116,7 @@
               <a:t>, compression</a:t>
             </a:r>
             <a:r>
-              <a:rPr>
+              <a:rPr sz="1200">
                 <a:solidFill>
                   <a:srgbClr val="5E5E5E"/>
                 </a:solidFill>
@@ -6125,7 +6125,7 @@
               <a:t>=</a:t>
             </a:r>
             <a:r>
-              <a:rPr>
+              <a:rPr sz="1200">
                 <a:solidFill>
                   <a:srgbClr val="20794D"/>
                 </a:solidFill>
@@ -6134,7 +6134,7 @@
               <a:t>"gzip"</a:t>
             </a:r>
             <a:r>
-              <a:rPr>
+              <a:rPr sz="1200">
                 <a:solidFill>
                   <a:srgbClr val="003B4F"/>
                 </a:solidFill>
@@ -6144,7 +6144,7 @@
             </a:r>
             <a:br/>
             <a:r>
-              <a:rPr>
+              <a:rPr sz="1200">
                 <a:solidFill>
                   <a:srgbClr val="003B4F"/>
                 </a:solidFill>
@@ -6153,7 +6153,7 @@
               <a:t>df_pop </a:t>
             </a:r>
             <a:r>
-              <a:rPr>
+              <a:rPr sz="1200">
                 <a:solidFill>
                   <a:srgbClr val="5E5E5E"/>
                 </a:solidFill>
@@ -6162,7 +6162,7 @@
               <a:t>=</a:t>
             </a:r>
             <a:r>
-              <a:rPr>
+              <a:rPr sz="1200">
                 <a:solidFill>
                   <a:srgbClr val="003B4F"/>
                 </a:solidFill>
@@ -6171,7 +6171,7 @@
               <a:t> pd.read_csv(</a:t>
             </a:r>
             <a:r>
-              <a:rPr>
+              <a:rPr sz="1200">
                 <a:solidFill>
                   <a:srgbClr val="20794D"/>
                 </a:solidFill>
@@ -6180,7 +6180,7 @@
               <a:t>"data/pop_brackets.csv.gz"</a:t>
             </a:r>
             <a:r>
-              <a:rPr>
+              <a:rPr sz="1200">
                 <a:solidFill>
                   <a:srgbClr val="003B4F"/>
                 </a:solidFill>
@@ -6189,7 +6189,7 @@
               <a:t>, compression</a:t>
             </a:r>
             <a:r>
-              <a:rPr>
+              <a:rPr sz="1200">
                 <a:solidFill>
                   <a:srgbClr val="5E5E5E"/>
                 </a:solidFill>
@@ -6198,7 +6198,7 @@
               <a:t>=</a:t>
             </a:r>
             <a:r>
-              <a:rPr>
+              <a:rPr sz="1200">
                 <a:solidFill>
                   <a:srgbClr val="20794D"/>
                 </a:solidFill>
@@ -6207,7 +6207,7 @@
               <a:t>"gzip"</a:t>
             </a:r>
             <a:r>
-              <a:rPr>
+              <a:rPr sz="1200">
                 <a:solidFill>
                   <a:srgbClr val="003B4F"/>
                 </a:solidFill>
@@ -6218,7 +6218,7 @@
             <a:br/>
             <a:br/>
             <a:r>
-              <a:rPr>
+              <a:rPr sz="1200">
                 <a:solidFill>
                   <a:srgbClr val="003B4F"/>
                 </a:solidFill>
@@ -6227,7 +6227,7 @@
               <a:t>years </a:t>
             </a:r>
             <a:r>
-              <a:rPr>
+              <a:rPr sz="1200">
                 <a:solidFill>
                   <a:srgbClr val="5E5E5E"/>
                 </a:solidFill>
@@ -6236,7 +6236,7 @@
               <a:t>=</a:t>
             </a:r>
             <a:r>
-              <a:rPr>
+              <a:rPr sz="1200">
                 <a:solidFill>
                   <a:srgbClr val="003B4F"/>
                 </a:solidFill>
@@ -6245,7 +6245,7 @@
               <a:t> [</a:t>
             </a:r>
             <a:r>
-              <a:rPr>
+              <a:rPr sz="1200">
                 <a:solidFill>
                   <a:srgbClr val="AD0000"/>
                 </a:solidFill>
@@ -6254,7 +6254,7 @@
               <a:t>2000</a:t>
             </a:r>
             <a:r>
-              <a:rPr>
+              <a:rPr sz="1200">
                 <a:solidFill>
                   <a:srgbClr val="003B4F"/>
                 </a:solidFill>
@@ -6263,7 +6263,7 @@
               <a:t>, </a:t>
             </a:r>
             <a:r>
-              <a:rPr>
+              <a:rPr sz="1200">
                 <a:solidFill>
                   <a:srgbClr val="AD0000"/>
                 </a:solidFill>
@@ -6272,7 +6272,7 @@
               <a:t>2025</a:t>
             </a:r>
             <a:r>
-              <a:rPr>
+              <a:rPr sz="1200">
                 <a:solidFill>
                   <a:srgbClr val="003B4F"/>
                 </a:solidFill>
@@ -6281,7 +6281,7 @@
               <a:t>, </a:t>
             </a:r>
             <a:r>
-              <a:rPr>
+              <a:rPr sz="1200">
                 <a:solidFill>
                   <a:srgbClr val="AD0000"/>
                 </a:solidFill>
@@ -6290,7 +6290,7 @@
               <a:t>2050</a:t>
             </a:r>
             <a:r>
-              <a:rPr>
+              <a:rPr sz="1200">
                 <a:solidFill>
                   <a:srgbClr val="003B4F"/>
                 </a:solidFill>
@@ -6299,7 +6299,7 @@
               <a:t>, </a:t>
             </a:r>
             <a:r>
-              <a:rPr>
+              <a:rPr sz="1200">
                 <a:solidFill>
                   <a:srgbClr val="AD0000"/>
                 </a:solidFill>
@@ -6308,7 +6308,7 @@
               <a:t>2075</a:t>
             </a:r>
             <a:r>
-              <a:rPr>
+              <a:rPr sz="1200">
                 <a:solidFill>
                   <a:srgbClr val="003B4F"/>
                 </a:solidFill>
@@ -6317,7 +6317,7 @@
               <a:t>, </a:t>
             </a:r>
             <a:r>
-              <a:rPr>
+              <a:rPr sz="1200">
                 <a:solidFill>
                   <a:srgbClr val="AD0000"/>
                 </a:solidFill>
@@ -6326,7 +6326,7 @@
               <a:t>2100</a:t>
             </a:r>
             <a:r>
-              <a:rPr>
+              <a:rPr sz="1200">
                 <a:solidFill>
                   <a:srgbClr val="003B4F"/>
                 </a:solidFill>
@@ -6336,7 +6336,7 @@
             </a:r>
             <a:br/>
             <a:r>
-              <a:rPr>
+              <a:rPr sz="1200">
                 <a:solidFill>
                   <a:srgbClr val="003B4F"/>
                 </a:solidFill>
@@ -6345,7 +6345,7 @@
               <a:t>regions </a:t>
             </a:r>
             <a:r>
-              <a:rPr>
+              <a:rPr sz="1200">
                 <a:solidFill>
                   <a:srgbClr val="5E5E5E"/>
                 </a:solidFill>
@@ -6354,7 +6354,7 @@
               <a:t>=</a:t>
             </a:r>
             <a:r>
-              <a:rPr>
+              <a:rPr sz="1200">
                 <a:solidFill>
                   <a:srgbClr val="003B4F"/>
                 </a:solidFill>
@@ -6363,7 +6363,7 @@
               <a:t> [</a:t>
             </a:r>
             <a:r>
-              <a:rPr>
+              <a:rPr sz="1200">
                 <a:solidFill>
                   <a:srgbClr val="20794D"/>
                 </a:solidFill>
@@ -6372,7 +6372,7 @@
               <a:t>"Belgium"</a:t>
             </a:r>
             <a:r>
-              <a:rPr>
+              <a:rPr sz="1200">
                 <a:solidFill>
                   <a:srgbClr val="003B4F"/>
                 </a:solidFill>
@@ -6381,7 +6381,7 @@
               <a:t>, </a:t>
             </a:r>
             <a:r>
-              <a:rPr>
+              <a:rPr sz="1200">
                 <a:solidFill>
                   <a:srgbClr val="20794D"/>
                 </a:solidFill>
@@ -6390,7 +6390,7 @@
               <a:t>"China"</a:t>
             </a:r>
             <a:r>
-              <a:rPr>
+              <a:rPr sz="1200">
                 <a:solidFill>
                   <a:srgbClr val="003B4F"/>
                 </a:solidFill>
@@ -6399,7 +6399,7 @@
               <a:t>, </a:t>
             </a:r>
             <a:r>
-              <a:rPr>
+              <a:rPr sz="1200">
                 <a:solidFill>
                   <a:srgbClr val="20794D"/>
                 </a:solidFill>
@@ -6408,7 +6408,7 @@
               <a:t>"Brazil"</a:t>
             </a:r>
             <a:r>
-              <a:rPr>
+              <a:rPr sz="1200">
                 <a:solidFill>
                   <a:srgbClr val="003B4F"/>
                 </a:solidFill>
@@ -6417,7 +6417,7 @@
               <a:t>, </a:t>
             </a:r>
             <a:r>
-              <a:rPr>
+              <a:rPr sz="1200">
                 <a:solidFill>
                   <a:srgbClr val="20794D"/>
                 </a:solidFill>
@@ -6426,7 +6426,7 @@
               <a:t>"India"</a:t>
             </a:r>
             <a:r>
-              <a:rPr>
+              <a:rPr sz="1200">
                 <a:solidFill>
                   <a:srgbClr val="003B4F"/>
                 </a:solidFill>
@@ -6435,7 +6435,7 @@
               <a:t>, </a:t>
             </a:r>
             <a:r>
-              <a:rPr>
+              <a:rPr sz="1200">
                 <a:solidFill>
                   <a:srgbClr val="20794D"/>
                 </a:solidFill>
@@ -6444,7 +6444,7 @@
               <a:t>"Japan"</a:t>
             </a:r>
             <a:r>
-              <a:rPr>
+              <a:rPr sz="1200">
                 <a:solidFill>
                   <a:srgbClr val="003B4F"/>
                 </a:solidFill>
@@ -6453,7 +6453,7 @@
               <a:t>, </a:t>
             </a:r>
             <a:r>
-              <a:rPr>
+              <a:rPr sz="1200">
                 <a:solidFill>
                   <a:srgbClr val="20794D"/>
                 </a:solidFill>
@@ -6462,7 +6462,7 @@
               <a:t>"Nigeria"</a:t>
             </a:r>
             <a:r>
-              <a:rPr>
+              <a:rPr sz="1200">
                 <a:solidFill>
                   <a:srgbClr val="003B4F"/>
                 </a:solidFill>
@@ -6473,7 +6473,7 @@
             <a:br/>
             <a:br/>
             <a:r>
-              <a:rPr>
+              <a:rPr sz="1200">
                 <a:solidFill>
                   <a:srgbClr val="003B4F"/>
                 </a:solidFill>
@@ -6483,7 +6483,7 @@
             </a:r>
             <a:br/>
             <a:r>
-              <a:rPr>
+              <a:rPr sz="1200">
                 <a:solidFill>
                   <a:srgbClr val="003B4F"/>
                 </a:solidFill>
@@ -6492,7 +6492,7 @@
               <a:t>    display(Markdown(</a:t>
             </a:r>
             <a:r>
-              <a:rPr>
+              <a:rPr sz="1200">
                 <a:solidFill>
                   <a:srgbClr val="20794D"/>
                 </a:solidFill>
@@ -6501,7 +6501,7 @@
               <a:t>f"## Age and Population Pyramids for </a:t>
             </a:r>
             <a:r>
-              <a:rPr>
+              <a:rPr sz="1200">
                 <a:solidFill>
                   <a:srgbClr val="5E5E5E"/>
                 </a:solidFill>
@@ -6510,7 +6510,7 @@
               <a:t>{</a:t>
             </a:r>
             <a:r>
-              <a:rPr>
+              <a:rPr sz="1200">
                 <a:solidFill>
                   <a:srgbClr val="003B4F"/>
                 </a:solidFill>
@@ -6519,7 +6519,7 @@
               <a:t>name</a:t>
             </a:r>
             <a:r>
-              <a:rPr>
+              <a:rPr sz="1200">
                 <a:solidFill>
                   <a:srgbClr val="5E5E5E"/>
                 </a:solidFill>
@@ -6528,7 +6528,7 @@
               <a:t>}</a:t>
             </a:r>
             <a:r>
-              <a:rPr>
+              <a:rPr sz="1200">
                 <a:solidFill>
                   <a:srgbClr val="20794D"/>
                 </a:solidFill>
@@ -6537,7 +6537,7 @@
               <a:t>"</a:t>
             </a:r>
             <a:r>
-              <a:rPr>
+              <a:rPr sz="1200">
                 <a:solidFill>
                   <a:srgbClr val="003B4F"/>
                 </a:solidFill>
@@ -6547,7 +6547,7 @@
             </a:r>
             <a:br/>
             <a:r>
-              <a:rPr>
+              <a:rPr sz="1200">
                 <a:solidFill>
                   <a:srgbClr val="003B4F"/>
                 </a:solidFill>
@@ -6556,7 +6556,7 @@
               <a:t>    display(Markdown(</a:t>
             </a:r>
             <a:r>
-              <a:rPr>
+              <a:rPr sz="1200">
                 <a:solidFill>
                   <a:srgbClr val="20794D"/>
                 </a:solidFill>
@@ -6565,7 +6565,7 @@
               <a:t>f'&lt;div class="columns"&gt;'</a:t>
             </a:r>
             <a:r>
-              <a:rPr>
+              <a:rPr sz="1200">
                 <a:solidFill>
                   <a:srgbClr val="003B4F"/>
                 </a:solidFill>
@@ -6575,7 +6575,7 @@
             </a:r>
             <a:br/>
             <a:r>
-              <a:rPr>
+              <a:rPr sz="1200">
                 <a:solidFill>
                   <a:srgbClr val="003B4F"/>
                 </a:solidFill>
@@ -6584,7 +6584,7 @@
               <a:t>    display(Markdown(</a:t>
             </a:r>
             <a:r>
-              <a:rPr>
+              <a:rPr sz="1200">
                 <a:solidFill>
                   <a:srgbClr val="20794D"/>
                 </a:solidFill>
@@ -6593,7 +6593,7 @@
               <a:t>f'&lt;div class="column"&gt;'</a:t>
             </a:r>
             <a:r>
-              <a:rPr>
+              <a:rPr sz="1200">
                 <a:solidFill>
                   <a:srgbClr val="003B4F"/>
                 </a:solidFill>
@@ -6603,7 +6603,7 @@
             </a:r>
             <a:br/>
             <a:r>
-              <a:rPr>
+              <a:rPr sz="1200">
                 <a:solidFill>
                   <a:srgbClr val="003B4F"/>
                 </a:solidFill>
@@ -6612,7 +6612,7 @@
               <a:t>    plot_dependency_ratio(df_dr[df_dr.Location </a:t>
             </a:r>
             <a:r>
-              <a:rPr>
+              <a:rPr sz="1200">
                 <a:solidFill>
                   <a:srgbClr val="5E5E5E"/>
                 </a:solidFill>
@@ -6621,7 +6621,7 @@
               <a:t>==</a:t>
             </a:r>
             <a:r>
-              <a:rPr>
+              <a:rPr sz="1200">
                 <a:solidFill>
                   <a:srgbClr val="003B4F"/>
                 </a:solidFill>
@@ -6631,7 +6631,7 @@
             </a:r>
             <a:br/>
             <a:r>
-              <a:rPr>
+              <a:rPr sz="1200">
                 <a:solidFill>
                   <a:srgbClr val="003B4F"/>
                 </a:solidFill>
@@ -6640,7 +6640,7 @@
               <a:t>    display(Markdown(</a:t>
             </a:r>
             <a:r>
-              <a:rPr>
+              <a:rPr sz="1200">
                 <a:solidFill>
                   <a:srgbClr val="20794D"/>
                 </a:solidFill>
@@ -6649,7 +6649,7 @@
               <a:t>f'&lt;/div&gt;'</a:t>
             </a:r>
             <a:r>
-              <a:rPr>
+              <a:rPr sz="1200">
                 <a:solidFill>
                   <a:srgbClr val="003B4F"/>
                 </a:solidFill>
@@ -6659,7 +6659,7 @@
             </a:r>
             <a:br/>
             <a:r>
-              <a:rPr>
+              <a:rPr sz="1200">
                 <a:solidFill>
                   <a:srgbClr val="003B4F"/>
                 </a:solidFill>
@@ -6668,7 +6668,7 @@
               <a:t>    display(Markdown(</a:t>
             </a:r>
             <a:r>
-              <a:rPr>
+              <a:rPr sz="1200">
                 <a:solidFill>
                   <a:srgbClr val="20794D"/>
                 </a:solidFill>
@@ -6677,7 +6677,7 @@
               <a:t>f'&lt;div class="column"&gt;'</a:t>
             </a:r>
             <a:r>
-              <a:rPr>
+              <a:rPr sz="1200">
                 <a:solidFill>
                   <a:srgbClr val="003B4F"/>
                 </a:solidFill>
@@ -6687,7 +6687,7 @@
             </a:r>
             <a:br/>
             <a:r>
-              <a:rPr>
+              <a:rPr sz="1200">
                 <a:solidFill>
                   <a:srgbClr val="003B4F"/>
                 </a:solidFill>
@@ -6696,7 +6696,7 @@
               <a:t>    plot_population_pyramid_series(df_pop[df_pop[</a:t>
             </a:r>
             <a:r>
-              <a:rPr>
+              <a:rPr sz="1200">
                 <a:solidFill>
                   <a:srgbClr val="20794D"/>
                 </a:solidFill>
@@ -6705,7 +6705,7 @@
               <a:t>"Location"</a:t>
             </a:r>
             <a:r>
-              <a:rPr>
+              <a:rPr sz="1200">
                 <a:solidFill>
                   <a:srgbClr val="003B4F"/>
                 </a:solidFill>
@@ -6714,7 +6714,7 @@
               <a:t>]</a:t>
             </a:r>
             <a:r>
-              <a:rPr>
+              <a:rPr sz="1200">
                 <a:solidFill>
                   <a:srgbClr val="5E5E5E"/>
                 </a:solidFill>
@@ -6723,7 +6723,7 @@
               <a:t>==</a:t>
             </a:r>
             <a:r>
-              <a:rPr>
+              <a:rPr sz="1200">
                 <a:solidFill>
                   <a:srgbClr val="003B4F"/>
                 </a:solidFill>
@@ -6733,7 +6733,7 @@
             </a:r>
             <a:br/>
             <a:r>
-              <a:rPr>
+              <a:rPr sz="1200">
                 <a:solidFill>
                   <a:srgbClr val="003B4F"/>
                 </a:solidFill>
@@ -6742,7 +6742,7 @@
               <a:t>    display(Markdown(</a:t>
             </a:r>
             <a:r>
-              <a:rPr>
+              <a:rPr sz="1200">
                 <a:solidFill>
                   <a:srgbClr val="20794D"/>
                 </a:solidFill>
@@ -6751,7 +6751,7 @@
               <a:t>f'&lt;/div&gt;'</a:t>
             </a:r>
             <a:r>
-              <a:rPr>
+              <a:rPr sz="1200">
                 <a:solidFill>
                   <a:srgbClr val="003B4F"/>
                 </a:solidFill>
@@ -6761,7 +6761,7 @@
             </a:r>
             <a:br/>
             <a:r>
-              <a:rPr>
+              <a:rPr sz="1200">
                 <a:solidFill>
                   <a:srgbClr val="003B4F"/>
                 </a:solidFill>
@@ -6770,7 +6770,7 @@
               <a:t>    display(Markdown(</a:t>
             </a:r>
             <a:r>
-              <a:rPr>
+              <a:rPr sz="1200">
                 <a:solidFill>
                   <a:srgbClr val="20794D"/>
                 </a:solidFill>
@@ -6779,7 +6779,7 @@
               <a:t>f'&lt;/div&gt;'</a:t>
             </a:r>
             <a:r>
-              <a:rPr>
+              <a:rPr sz="1200">
                 <a:solidFill>
                   <a:srgbClr val="003B4F"/>
                 </a:solidFill>
@@ -7602,7 +7602,7 @@
               <a:buNone/>
             </a:pPr>
             <a:r>
-              <a:rPr>
+              <a:rPr sz="1200">
                 <a:solidFill>
                   <a:srgbClr val="AD0000"/>
                 </a:solidFill>
@@ -7612,7 +7612,7 @@
             </a:r>
             <a:br/>
             <a:r>
-              <a:rPr>
+              <a:rPr sz="1200">
                 <a:solidFill>
                   <a:srgbClr val="4758AB"/>
                 </a:solidFill>
@@ -7621,7 +7621,7 @@
               <a:t>title</a:t>
             </a:r>
             <a:r>
-              <a:rPr>
+              <a:rPr sz="1200">
                 <a:solidFill>
                   <a:srgbClr val="003B4F"/>
                 </a:solidFill>
@@ -7630,7 +7630,7 @@
               <a:t>:</a:t>
             </a:r>
             <a:r>
-              <a:rPr>
+              <a:rPr sz="1200">
                 <a:solidFill>
                   <a:srgbClr val="657422"/>
                 </a:solidFill>
@@ -7639,7 +7639,7 @@
               <a:t> </a:t>
             </a:r>
             <a:r>
-              <a:rPr>
+              <a:rPr sz="1200">
                 <a:solidFill>
                   <a:srgbClr val="20794D"/>
                 </a:solidFill>
@@ -7649,7 +7649,7 @@
             </a:r>
             <a:br/>
             <a:r>
-              <a:rPr>
+              <a:rPr sz="1200">
                 <a:solidFill>
                   <a:srgbClr val="4758AB"/>
                 </a:solidFill>
@@ -7658,7 +7658,7 @@
               <a:t>format</a:t>
             </a:r>
             <a:r>
-              <a:rPr>
+              <a:rPr sz="1200">
                 <a:solidFill>
                   <a:srgbClr val="003B4F"/>
                 </a:solidFill>
@@ -7667,7 +7667,7 @@
               <a:t>:</a:t>
             </a:r>
             <a:r>
-              <a:rPr>
+              <a:rPr sz="1200">
                 <a:solidFill>
                   <a:srgbClr val="657422"/>
                 </a:solidFill>
@@ -7677,7 +7677,7 @@
             </a:r>
             <a:br/>
             <a:r>
-              <a:rPr>
+              <a:rPr sz="1200">
                 <a:solidFill>
                   <a:srgbClr val="5E5E5E"/>
                 </a:solidFill>
@@ -7687,7 +7687,7 @@
             </a:r>
             <a:br/>
             <a:r>
-              <a:rPr>
+              <a:rPr sz="1200">
                 <a:solidFill>
                   <a:srgbClr val="5E5E5E"/>
                 </a:solidFill>
@@ -7697,7 +7697,7 @@
             </a:r>
             <a:br/>
             <a:r>
-              <a:rPr>
+              <a:rPr sz="1200">
                 <a:solidFill>
                   <a:srgbClr val="5E5E5E"/>
                 </a:solidFill>
@@ -7707,7 +7707,7 @@
             </a:r>
             <a:br/>
             <a:r>
-              <a:rPr>
+              <a:rPr sz="1200">
                 <a:solidFill>
                   <a:srgbClr val="5E5E5E"/>
                 </a:solidFill>
@@ -7717,7 +7717,7 @@
             </a:r>
             <a:br/>
             <a:r>
-              <a:rPr>
+              <a:rPr sz="1200">
                 <a:solidFill>
                   <a:srgbClr val="5E5E5E"/>
                 </a:solidFill>
@@ -7727,7 +7727,7 @@
             </a:r>
             <a:br/>
             <a:r>
-              <a:rPr>
+              <a:rPr sz="1200">
                 <a:solidFill>
                   <a:srgbClr val="5E5E5E"/>
                 </a:solidFill>
@@ -7737,7 +7737,7 @@
             </a:r>
             <a:br/>
             <a:r>
-              <a:rPr>
+              <a:rPr sz="1200">
                 <a:solidFill>
                   <a:srgbClr val="5E5E5E"/>
                 </a:solidFill>
@@ -7748,7 +7748,7 @@
             <a:br/>
             <a:br/>
             <a:r>
-              <a:rPr>
+              <a:rPr sz="1200">
                 <a:solidFill>
                   <a:srgbClr val="4758AB"/>
                 </a:solidFill>
@@ -7757,7 +7757,7 @@
               <a:t>author</a:t>
             </a:r>
             <a:r>
-              <a:rPr>
+              <a:rPr sz="1200">
                 <a:solidFill>
                   <a:srgbClr val="003B4F"/>
                 </a:solidFill>
@@ -7766,7 +7766,7 @@
               <a:t>:</a:t>
             </a:r>
             <a:r>
-              <a:rPr>
+              <a:rPr sz="1200">
                 <a:solidFill>
                   <a:srgbClr val="657422"/>
                 </a:solidFill>
@@ -7776,7 +7776,7 @@
             </a:r>
             <a:br/>
             <a:r>
-              <a:rPr>
+              <a:rPr sz="1200">
                 <a:solidFill>
                   <a:srgbClr val="4758AB"/>
                 </a:solidFill>
@@ -7785,7 +7785,7 @@
               <a:t>date</a:t>
             </a:r>
             <a:r>
-              <a:rPr>
+              <a:rPr sz="1200">
                 <a:solidFill>
                   <a:srgbClr val="003B4F"/>
                 </a:solidFill>
@@ -7794,7 +7794,7 @@
               <a:t>:</a:t>
             </a:r>
             <a:r>
-              <a:rPr>
+              <a:rPr sz="1200">
                 <a:solidFill>
                   <a:srgbClr val="657422"/>
                 </a:solidFill>
@@ -7804,7 +7804,7 @@
             </a:r>
             <a:br/>
             <a:r>
-              <a:rPr>
+              <a:rPr sz="1200">
                 <a:solidFill>
                   <a:srgbClr val="AD0000"/>
                 </a:solidFill>
@@ -8878,7 +8878,7 @@
           <a:p>
             <a:pPr lvl="1"/>
             <a:r>
-              <a:rPr>
+              <a:rPr sz="1200">
                 <a:latin typeface="Consolas"/>
               </a:rPr>
               <a:t>\usepackage{ifthen}</a:t>
@@ -8887,7 +8887,7 @@
           <a:p>
             <a:pPr lvl="1"/>
             <a:r>
-              <a:rPr>
+              <a:rPr sz="1200">
                 <a:latin typeface="Consolas"/>
               </a:rPr>
               <a:t>@for</a:t>
@@ -8897,7 +8897,7 @@
               <a:t>, </a:t>
             </a:r>
             <a:r>
-              <a:rPr>
+              <a:rPr sz="1200">
                 <a:latin typeface="Consolas"/>
               </a:rPr>
               <a:t>@while</a:t>
@@ -9004,7 +9004,7 @@
               <a:t>Hugo and </a:t>
             </a:r>
             <a:r>
-              <a:rPr>
+              <a:rPr sz="1200">
                 <a:latin typeface="Consolas"/>
               </a:rPr>
               <a:t>blogdown</a:t>
@@ -9021,7 +9021,7 @@
               <a:t>Heavily dependent on R </a:t>
             </a:r>
             <a:r>
-              <a:rPr>
+              <a:rPr sz="1200">
                 <a:latin typeface="Consolas"/>
               </a:rPr>
               <a:t>R</a:t>
@@ -9172,7 +9172,7 @@
               <a:t> use Python through Jupyter notebooks, and one can use </a:t>
             </a:r>
             <a:r>
-              <a:rPr>
+              <a:rPr sz="1200">
                 <a:hlinkClick r:id="rId3"/>
                 <a:latin typeface="Consolas"/>
               </a:rPr>
@@ -9296,7 +9296,7 @@
               <a:t>In Quarto’s </a:t>
             </a:r>
             <a:r>
-              <a:rPr>
+              <a:rPr sz="1200">
                 <a:latin typeface="Consolas"/>
               </a:rPr>
               <a:t>.qmd</a:t>
@@ -9306,7 +9306,7 @@
               <a:t> files, you write Markdown and code, just like </a:t>
             </a:r>
             <a:r>
-              <a:rPr>
+              <a:rPr sz="1200">
                 <a:latin typeface="Consolas"/>
               </a:rPr>
               <a:t>.ipynb</a:t>
@@ -9316,7 +9316,7 @@
               <a:t>. Add some </a:t>
             </a:r>
             <a:r>
-              <a:rPr>
+              <a:rPr sz="1200">
                 <a:latin typeface="Consolas"/>
               </a:rPr>
               <a:t>YAML</a:t>
@@ -9846,299 +9846,4 @@
   </a:objectDefaults>
   <a:extraClrSchemeLst/>
 </a:theme>
-</file>
-
-<file path=ppt/theme/theme2.xml><?xml version="1.0" encoding="utf-8"?>
-<a:theme xmlns:a="http://schemas.openxmlformats.org/drawingml/2006/main" name="Office Theme">
-  <a:themeElements>
-    <a:clrScheme name="Office">
-      <a:dk1>
-        <a:sysClr val="windowText" lastClr="000000"/>
-      </a:dk1>
-      <a:lt1>
-        <a:sysClr val="window" lastClr="FFFFFF"/>
-      </a:lt1>
-      <a:dk2>
-        <a:srgbClr val="44546A"/>
-      </a:dk2>
-      <a:lt2>
-        <a:srgbClr val="E7E6E6"/>
-      </a:lt2>
-      <a:accent1>
-        <a:srgbClr val="4472C4"/>
-      </a:accent1>
-      <a:accent2>
-        <a:srgbClr val="ED7D31"/>
-      </a:accent2>
-      <a:accent3>
-        <a:srgbClr val="A5A5A5"/>
-      </a:accent3>
-      <a:accent4>
-        <a:srgbClr val="FFC000"/>
-      </a:accent4>
-      <a:accent5>
-        <a:srgbClr val="5B9BD5"/>
-      </a:accent5>
-      <a:accent6>
-        <a:srgbClr val="70AD47"/>
-      </a:accent6>
-      <a:hlink>
-        <a:srgbClr val="0563C1"/>
-      </a:hlink>
-      <a:folHlink>
-        <a:srgbClr val="954F72"/>
-      </a:folHlink>
-    </a:clrScheme>
-    <a:fontScheme name="Office">
-      <a:majorFont>
-        <a:latin typeface="Calibri Light" panose="020F0302020204030204"/>
-        <a:ea typeface=""/>
-        <a:cs typeface=""/>
-        <a:font script="Jpan" typeface="游ゴシック Light"/>
-        <a:font script="Hang" typeface="맑은 고딕"/>
-        <a:font script="Hans" typeface="等线 Light"/>
-        <a:font script="Hant" typeface="新細明體"/>
-        <a:font script="Arab" typeface="Times New Roman"/>
-        <a:font script="Hebr" typeface="Times New Roman"/>
-        <a:font script="Thai" typeface="Angsana New"/>
-        <a:font script="Ethi" typeface="Nyala"/>
-        <a:font script="Beng" typeface="Vrinda"/>
-        <a:font script="Gujr" typeface="Shruti"/>
-        <a:font script="Khmr" typeface="MoolBoran"/>
-        <a:font script="Knda" typeface="Tunga"/>
-        <a:font script="Guru" typeface="Raavi"/>
-        <a:font script="Cans" typeface="Euphemia"/>
-        <a:font script="Cher" typeface="Plantagenet Cherokee"/>
-        <a:font script="Yiii" typeface="Microsoft Yi Baiti"/>
-        <a:font script="Tibt" typeface="Microsoft Himalaya"/>
-        <a:font script="Thaa" typeface="MV Boli"/>
-        <a:font script="Deva" typeface="Mangal"/>
-        <a:font script="Telu" typeface="Gautami"/>
-        <a:font script="Taml" typeface="Latha"/>
-        <a:font script="Syrc" typeface="Estrangelo Edessa"/>
-        <a:font script="Orya" typeface="Kalinga"/>
-        <a:font script="Mlym" typeface="Kartika"/>
-        <a:font script="Laoo" typeface="DokChampa"/>
-        <a:font script="Sinh" typeface="Iskoola Pota"/>
-        <a:font script="Mong" typeface="Mongolian Baiti"/>
-        <a:font script="Viet" typeface="Times New Roman"/>
-        <a:font script="Uigh" typeface="Microsoft Uighur"/>
-        <a:font script="Geor" typeface="Sylfaen"/>
-        <a:font script="Armn" typeface="Arial"/>
-        <a:font script="Bugi" typeface="Leelawadee UI"/>
-        <a:font script="Bopo" typeface="Microsoft JhengHei"/>
-        <a:font script="Java" typeface="Javanese Text"/>
-        <a:font script="Lisu" typeface="Segoe UI"/>
-        <a:font script="Mymr" typeface="Myanmar Text"/>
-        <a:font script="Nkoo" typeface="Ebrima"/>
-        <a:font script="Olck" typeface="Nirmala UI"/>
-        <a:font script="Osma" typeface="Ebrima"/>
-        <a:font script="Phag" typeface="Phagspa"/>
-        <a:font script="Syrn" typeface="Estrangelo Edessa"/>
-        <a:font script="Syrj" typeface="Estrangelo Edessa"/>
-        <a:font script="Syre" typeface="Estrangelo Edessa"/>
-        <a:font script="Sora" typeface="Nirmala UI"/>
-        <a:font script="Tale" typeface="Microsoft Tai Le"/>
-        <a:font script="Talu" typeface="Microsoft New Tai Lue"/>
-        <a:font script="Tfng" typeface="Ebrima"/>
-      </a:majorFont>
-      <a:minorFont>
-        <a:latin typeface="Calibri" panose="020F0502020204030204"/>
-        <a:ea typeface=""/>
-        <a:cs typeface=""/>
-        <a:font script="Jpan" typeface="游ゴシック"/>
-        <a:font script="Hang" typeface="맑은 고딕"/>
-        <a:font script="Hans" typeface="等线"/>
-        <a:font script="Hant" typeface="新細明體"/>
-        <a:font script="Arab" typeface="Arial"/>
-        <a:font script="Hebr" typeface="Arial"/>
-        <a:font script="Thai" typeface="Cordia New"/>
-        <a:font script="Ethi" typeface="Nyala"/>
-        <a:font script="Beng" typeface="Vrinda"/>
-        <a:font script="Gujr" typeface="Shruti"/>
-        <a:font script="Khmr" typeface="DaunPenh"/>
-        <a:font script="Knda" typeface="Tunga"/>
-        <a:font script="Guru" typeface="Raavi"/>
-        <a:font script="Cans" typeface="Euphemia"/>
-        <a:font script="Cher" typeface="Plantagenet Cherokee"/>
-        <a:font script="Yiii" typeface="Microsoft Yi Baiti"/>
-        <a:font script="Tibt" typeface="Microsoft Himalaya"/>
-        <a:font script="Thaa" typeface="MV Boli"/>
-        <a:font script="Deva" typeface="Mangal"/>
-        <a:font script="Telu" typeface="Gautami"/>
-        <a:font script="Taml" typeface="Latha"/>
-        <a:font script="Syrc" typeface="Estrangelo Edessa"/>
-        <a:font script="Orya" typeface="Kalinga"/>
-        <a:font script="Mlym" typeface="Kartika"/>
-        <a:font script="Laoo" typeface="DokChampa"/>
-        <a:font script="Sinh" typeface="Iskoola Pota"/>
-        <a:font script="Mong" typeface="Mongolian Baiti"/>
-        <a:font script="Viet" typeface="Arial"/>
-        <a:font script="Uigh" typeface="Microsoft Uighur"/>
-        <a:font script="Geor" typeface="Sylfaen"/>
-        <a:font script="Armn" typeface="Arial"/>
-        <a:font script="Bugi" typeface="Leelawadee UI"/>
-        <a:font script="Bopo" typeface="Microsoft JhengHei"/>
-        <a:font script="Java" typeface="Javanese Text"/>
-        <a:font script="Lisu" typeface="Segoe UI"/>
-        <a:font script="Mymr" typeface="Myanmar Text"/>
-        <a:font script="Nkoo" typeface="Ebrima"/>
-        <a:font script="Olck" typeface="Nirmala UI"/>
-        <a:font script="Osma" typeface="Ebrima"/>
-        <a:font script="Phag" typeface="Phagspa"/>
-        <a:font script="Syrn" typeface="Estrangelo Edessa"/>
-        <a:font script="Syrj" typeface="Estrangelo Edessa"/>
-        <a:font script="Syre" typeface="Estrangelo Edessa"/>
-        <a:font script="Sora" typeface="Nirmala UI"/>
-        <a:font script="Tale" typeface="Microsoft Tai Le"/>
-        <a:font script="Talu" typeface="Microsoft New Tai Lue"/>
-        <a:font script="Tfng" typeface="Ebrima"/>
-      </a:minorFont>
-    </a:fontScheme>
-    <a:fmtScheme name="Office">
-      <a:fillStyleLst>
-        <a:solidFill>
-          <a:schemeClr val="phClr"/>
-        </a:solidFill>
-        <a:gradFill rotWithShape="1">
-          <a:gsLst>
-            <a:gs pos="0">
-              <a:schemeClr val="phClr">
-                <a:lumMod val="110000"/>
-                <a:satMod val="105000"/>
-                <a:tint val="67000"/>
-              </a:schemeClr>
-            </a:gs>
-            <a:gs pos="50000">
-              <a:schemeClr val="phClr">
-                <a:lumMod val="105000"/>
-                <a:satMod val="103000"/>
-                <a:tint val="73000"/>
-              </a:schemeClr>
-            </a:gs>
-            <a:gs pos="100000">
-              <a:schemeClr val="phClr">
-                <a:lumMod val="105000"/>
-                <a:satMod val="109000"/>
-                <a:tint val="81000"/>
-              </a:schemeClr>
-            </a:gs>
-          </a:gsLst>
-          <a:lin ang="5400000" scaled="0"/>
-        </a:gradFill>
-        <a:gradFill rotWithShape="1">
-          <a:gsLst>
-            <a:gs pos="0">
-              <a:schemeClr val="phClr">
-                <a:satMod val="103000"/>
-                <a:lumMod val="102000"/>
-                <a:tint val="94000"/>
-              </a:schemeClr>
-            </a:gs>
-            <a:gs pos="50000">
-              <a:schemeClr val="phClr">
-                <a:satMod val="110000"/>
-                <a:lumMod val="100000"/>
-                <a:shade val="100000"/>
-              </a:schemeClr>
-            </a:gs>
-            <a:gs pos="100000">
-              <a:schemeClr val="phClr">
-                <a:lumMod val="99000"/>
-                <a:satMod val="120000"/>
-                <a:shade val="78000"/>
-              </a:schemeClr>
-            </a:gs>
-          </a:gsLst>
-          <a:lin ang="5400000" scaled="0"/>
-        </a:gradFill>
-      </a:fillStyleLst>
-      <a:lnStyleLst>
-        <a:ln w="6350" cap="flat" cmpd="sng" algn="ctr">
-          <a:solidFill>
-            <a:schemeClr val="phClr"/>
-          </a:solidFill>
-          <a:prstDash val="solid"/>
-          <a:miter lim="800000"/>
-        </a:ln>
-        <a:ln w="12700" cap="flat" cmpd="sng" algn="ctr">
-          <a:solidFill>
-            <a:schemeClr val="phClr"/>
-          </a:solidFill>
-          <a:prstDash val="solid"/>
-          <a:miter lim="800000"/>
-        </a:ln>
-        <a:ln w="19050" cap="flat" cmpd="sng" algn="ctr">
-          <a:solidFill>
-            <a:schemeClr val="phClr"/>
-          </a:solidFill>
-          <a:prstDash val="solid"/>
-          <a:miter lim="800000"/>
-        </a:ln>
-      </a:lnStyleLst>
-      <a:effectStyleLst>
-        <a:effectStyle>
-          <a:effectLst/>
-        </a:effectStyle>
-        <a:effectStyle>
-          <a:effectLst/>
-        </a:effectStyle>
-        <a:effectStyle>
-          <a:effectLst>
-            <a:outerShdw blurRad="57150" dist="19050" dir="5400000" algn="ctr" rotWithShape="0">
-              <a:srgbClr val="000000">
-                <a:alpha val="63000"/>
-              </a:srgbClr>
-            </a:outerShdw>
-          </a:effectLst>
-        </a:effectStyle>
-      </a:effectStyleLst>
-      <a:bgFillStyleLst>
-        <a:solidFill>
-          <a:schemeClr val="phClr"/>
-        </a:solidFill>
-        <a:solidFill>
-          <a:schemeClr val="phClr">
-            <a:tint val="95000"/>
-            <a:satMod val="170000"/>
-          </a:schemeClr>
-        </a:solidFill>
-        <a:gradFill rotWithShape="1">
-          <a:gsLst>
-            <a:gs pos="0">
-              <a:schemeClr val="phClr">
-                <a:tint val="93000"/>
-                <a:satMod val="150000"/>
-                <a:shade val="98000"/>
-                <a:lumMod val="102000"/>
-              </a:schemeClr>
-            </a:gs>
-            <a:gs pos="50000">
-              <a:schemeClr val="phClr">
-                <a:tint val="98000"/>
-                <a:satMod val="130000"/>
-                <a:shade val="90000"/>
-                <a:lumMod val="103000"/>
-              </a:schemeClr>
-            </a:gs>
-            <a:gs pos="100000">
-              <a:schemeClr val="phClr">
-                <a:shade val="63000"/>
-                <a:satMod val="120000"/>
-              </a:schemeClr>
-            </a:gs>
-          </a:gsLst>
-          <a:lin ang="5400000" scaled="0"/>
-        </a:gradFill>
-      </a:bgFillStyleLst>
-    </a:fmtScheme>
-  </a:themeElements>
-  <a:objectDefaults/>
-  <a:extraClrSchemeLst/>
-  <a:extLst>
-    <a:ext uri="{05A4C25C-085E-4340-85A3-A5531E510DB2}">
-      <thm15:themeFamily xmlns:thm15="http://schemas.microsoft.com/office/thememl/2012/main" name="Office Theme" id="{62F939B6-93AF-4DB8-9C6B-D6C7DFDC589F}" vid="{4A3C46E8-61CC-4603-A589-7422A47A8E4A}"/>
-    </a:ext>
-  </a:extLst>
-</a:theme>
 </file>
</xml_diff>

<commit_message>
Work done by Fri Jul  1 13:46:15 PDT 2022
</commit_message>
<xml_diff>
--- a/docs/presentation.pptx
+++ b/docs/presentation.pptx
@@ -4162,7 +4162,7 @@
               <a:t>Whether you use Quarto from </a:t>
             </a:r>
             <a:r>
-              <a:rPr sz="1200">
+              <a:rPr sz="1100">
                 <a:latin typeface="Consolas"/>
               </a:rPr>
               <a:t>.qmd</a:t>
@@ -4172,7 +4172,7 @@
               <a:t>, </a:t>
             </a:r>
             <a:r>
-              <a:rPr sz="1200">
+              <a:rPr sz="1100">
                 <a:latin typeface="Consolas"/>
               </a:rPr>
               <a:t>.ipynb</a:t>
@@ -4182,7 +4182,7 @@
               <a:t>, or </a:t>
             </a:r>
             <a:r>
-              <a:rPr sz="1200">
+              <a:rPr sz="1100">
                 <a:latin typeface="Consolas"/>
               </a:rPr>
               <a:t>.Rmd</a:t>
@@ -4201,7 +4201,7 @@
               <a:t>The YAML configuration determines what’s the output format of your document. A few popular output options are </a:t>
             </a:r>
             <a:r>
-              <a:rPr sz="1200">
+              <a:rPr sz="1100">
                 <a:latin typeface="Consolas"/>
               </a:rPr>
               <a:t>html</a:t>
@@ -4211,7 +4211,7 @@
               <a:t>, </a:t>
             </a:r>
             <a:r>
-              <a:rPr sz="1200">
+              <a:rPr sz="1100">
                 <a:latin typeface="Consolas"/>
               </a:rPr>
               <a:t>pptx</a:t>
@@ -4221,7 +4221,7 @@
               <a:t>, </a:t>
             </a:r>
             <a:r>
-              <a:rPr sz="1200">
+              <a:rPr sz="1100">
                 <a:latin typeface="Consolas"/>
               </a:rPr>
               <a:t>docx</a:t>
@@ -4231,7 +4231,7 @@
               <a:t>, and </a:t>
             </a:r>
             <a:r>
-              <a:rPr sz="1200">
+              <a:rPr sz="1100">
                 <a:latin typeface="Consolas"/>
               </a:rPr>
               <a:t>pdf</a:t>
@@ -4280,7 +4280,7 @@
               <a:buNone/>
             </a:pPr>
             <a:r>
-              <a:rPr sz="1200">
+              <a:rPr sz="1100">
                 <a:solidFill>
                   <a:srgbClr val="AD0000"/>
                 </a:solidFill>
@@ -4290,7 +4290,7 @@
             </a:r>
             <a:br/>
             <a:r>
-              <a:rPr sz="1200">
+              <a:rPr sz="1100">
                 <a:solidFill>
                   <a:srgbClr val="4758AB"/>
                 </a:solidFill>
@@ -4299,7 +4299,7 @@
               <a:t>title</a:t>
             </a:r>
             <a:r>
-              <a:rPr sz="1200">
+              <a:rPr sz="1100">
                 <a:solidFill>
                   <a:srgbClr val="003B4F"/>
                 </a:solidFill>
@@ -4308,7 +4308,7 @@
               <a:t>:</a:t>
             </a:r>
             <a:r>
-              <a:rPr sz="1200">
+              <a:rPr sz="1100">
                 <a:solidFill>
                   <a:srgbClr val="657422"/>
                 </a:solidFill>
@@ -4317,7 +4317,7 @@
               <a:t> </a:t>
             </a:r>
             <a:r>
-              <a:rPr sz="1200">
+              <a:rPr sz="1100">
                 <a:solidFill>
                   <a:srgbClr val="20794D"/>
                 </a:solidFill>
@@ -4327,7 +4327,7 @@
             </a:r>
             <a:br/>
             <a:r>
-              <a:rPr sz="1200">
+              <a:rPr sz="1100">
                 <a:solidFill>
                   <a:srgbClr val="4758AB"/>
                 </a:solidFill>
@@ -4336,7 +4336,7 @@
               <a:t>format</a:t>
             </a:r>
             <a:r>
-              <a:rPr sz="1200">
+              <a:rPr sz="1100">
                 <a:solidFill>
                   <a:srgbClr val="003B4F"/>
                 </a:solidFill>
@@ -4345,7 +4345,7 @@
               <a:t>:</a:t>
             </a:r>
             <a:r>
-              <a:rPr sz="1200">
+              <a:rPr sz="1100">
                 <a:solidFill>
                   <a:srgbClr val="657422"/>
                 </a:solidFill>
@@ -4355,7 +4355,7 @@
             </a:r>
             <a:br/>
             <a:r>
-              <a:rPr sz="1200">
+              <a:rPr sz="1100">
                 <a:solidFill>
                   <a:srgbClr val="657422"/>
                 </a:solidFill>
@@ -4364,7 +4364,7 @@
               <a:t>    </a:t>
             </a:r>
             <a:r>
-              <a:rPr sz="1200">
+              <a:rPr sz="1100">
                 <a:solidFill>
                   <a:srgbClr val="4758AB"/>
                 </a:solidFill>
@@ -4373,7 +4373,7 @@
               <a:t>pptx</a:t>
             </a:r>
             <a:r>
-              <a:rPr sz="1200">
+              <a:rPr sz="1100">
                 <a:solidFill>
                   <a:srgbClr val="003B4F"/>
                 </a:solidFill>
@@ -4383,7 +4383,7 @@
             </a:r>
             <a:br/>
             <a:r>
-              <a:rPr sz="1200">
+              <a:rPr sz="1100">
                 <a:solidFill>
                   <a:srgbClr val="657422"/>
                 </a:solidFill>
@@ -4392,7 +4392,7 @@
               <a:t>        </a:t>
             </a:r>
             <a:r>
-              <a:rPr sz="1200">
+              <a:rPr sz="1100">
                 <a:solidFill>
                   <a:srgbClr val="4758AB"/>
                 </a:solidFill>
@@ -4401,7 +4401,7 @@
               <a:t>reference-doc</a:t>
             </a:r>
             <a:r>
-              <a:rPr sz="1200">
+              <a:rPr sz="1100">
                 <a:solidFill>
                   <a:srgbClr val="003B4F"/>
                 </a:solidFill>
@@ -4410,7 +4410,7 @@
               <a:t>:</a:t>
             </a:r>
             <a:r>
-              <a:rPr sz="1200">
+              <a:rPr sz="1100">
                 <a:solidFill>
                   <a:srgbClr val="657422"/>
                 </a:solidFill>
@@ -4420,7 +4420,7 @@
             </a:r>
             <a:br/>
             <a:r>
-              <a:rPr sz="1200">
+              <a:rPr sz="1100">
                 <a:solidFill>
                   <a:srgbClr val="657422"/>
                 </a:solidFill>
@@ -4429,7 +4429,7 @@
               <a:t>    </a:t>
             </a:r>
             <a:r>
-              <a:rPr sz="1200">
+              <a:rPr sz="1100">
                 <a:solidFill>
                   <a:srgbClr val="4758AB"/>
                 </a:solidFill>
@@ -4438,7 +4438,7 @@
               <a:t>revealjs</a:t>
             </a:r>
             <a:r>
-              <a:rPr sz="1200">
+              <a:rPr sz="1100">
                 <a:solidFill>
                   <a:srgbClr val="003B4F"/>
                 </a:solidFill>
@@ -4448,7 +4448,7 @@
             </a:r>
             <a:br/>
             <a:r>
-              <a:rPr sz="1200">
+              <a:rPr sz="1100">
                 <a:solidFill>
                   <a:srgbClr val="657422"/>
                 </a:solidFill>
@@ -4457,7 +4457,7 @@
               <a:t>        </a:t>
             </a:r>
             <a:r>
-              <a:rPr sz="1200">
+              <a:rPr sz="1100">
                 <a:solidFill>
                   <a:srgbClr val="4758AB"/>
                 </a:solidFill>
@@ -4466,7 +4466,7 @@
               <a:t>incremental</a:t>
             </a:r>
             <a:r>
-              <a:rPr sz="1200">
+              <a:rPr sz="1100">
                 <a:solidFill>
                   <a:srgbClr val="003B4F"/>
                 </a:solidFill>
@@ -4475,7 +4475,7 @@
               <a:t>:</a:t>
             </a:r>
             <a:r>
-              <a:rPr sz="1200">
+              <a:rPr sz="1100">
                 <a:solidFill>
                   <a:srgbClr val="657422"/>
                 </a:solidFill>
@@ -4484,7 +4484,7 @@
               <a:t> </a:t>
             </a:r>
             <a:r>
-              <a:rPr sz="1200">
+              <a:rPr sz="1100">
                 <a:solidFill>
                   <a:srgbClr val="20794D"/>
                 </a:solidFill>
@@ -4494,7 +4494,7 @@
             </a:r>
             <a:br/>
             <a:r>
-              <a:rPr sz="1200">
+              <a:rPr sz="1100">
                 <a:solidFill>
                   <a:srgbClr val="657422"/>
                 </a:solidFill>
@@ -4503,7 +4503,7 @@
               <a:t>        </a:t>
             </a:r>
             <a:r>
-              <a:rPr sz="1200">
+              <a:rPr sz="1100">
                 <a:solidFill>
                   <a:srgbClr val="4758AB"/>
                 </a:solidFill>
@@ -4512,7 +4512,7 @@
               <a:t>theme</a:t>
             </a:r>
             <a:r>
-              <a:rPr sz="1200">
+              <a:rPr sz="1100">
                 <a:solidFill>
                   <a:srgbClr val="003B4F"/>
                 </a:solidFill>
@@ -4521,7 +4521,7 @@
               <a:t>:</a:t>
             </a:r>
             <a:r>
-              <a:rPr sz="1200">
+              <a:rPr sz="1100">
                 <a:solidFill>
                   <a:srgbClr val="657422"/>
                 </a:solidFill>
@@ -4532,7 +4532,7 @@
             <a:br/>
             <a:br/>
             <a:r>
-              <a:rPr sz="1200">
+              <a:rPr sz="1100">
                 <a:solidFill>
                   <a:srgbClr val="4758AB"/>
                 </a:solidFill>
@@ -4541,7 +4541,7 @@
               <a:t>author</a:t>
             </a:r>
             <a:r>
-              <a:rPr sz="1200">
+              <a:rPr sz="1100">
                 <a:solidFill>
                   <a:srgbClr val="003B4F"/>
                 </a:solidFill>
@@ -4550,7 +4550,7 @@
               <a:t>:</a:t>
             </a:r>
             <a:r>
-              <a:rPr sz="1200">
+              <a:rPr sz="1100">
                 <a:solidFill>
                   <a:srgbClr val="657422"/>
                 </a:solidFill>
@@ -4560,7 +4560,7 @@
             </a:r>
             <a:br/>
             <a:r>
-              <a:rPr sz="1200">
+              <a:rPr sz="1100">
                 <a:solidFill>
                   <a:srgbClr val="4758AB"/>
                 </a:solidFill>
@@ -4569,7 +4569,7 @@
               <a:t>date</a:t>
             </a:r>
             <a:r>
-              <a:rPr sz="1200">
+              <a:rPr sz="1100">
                 <a:solidFill>
                   <a:srgbClr val="003B4F"/>
                 </a:solidFill>
@@ -4578,7 +4578,7 @@
               <a:t>:</a:t>
             </a:r>
             <a:r>
-              <a:rPr sz="1200">
+              <a:rPr sz="1100">
                 <a:solidFill>
                   <a:srgbClr val="657422"/>
                 </a:solidFill>
@@ -4588,7 +4588,7 @@
             </a:r>
             <a:br/>
             <a:r>
-              <a:rPr sz="1200">
+              <a:rPr sz="1100">
                 <a:solidFill>
                   <a:srgbClr val="AD0000"/>
                 </a:solidFill>
@@ -4665,7 +4665,7 @@
               <a:buNone/>
             </a:pPr>
             <a:r>
-              <a:rPr sz="1200">
+              <a:rPr sz="1100">
                 <a:solidFill>
                   <a:srgbClr val="4758AB"/>
                 </a:solidFill>
@@ -4676,7 +4676,7 @@
             <a:br/>
             <a:br/>
             <a:r>
-              <a:rPr sz="1200">
+              <a:rPr sz="1100">
                 <a:solidFill>
                   <a:srgbClr val="003B4F"/>
                 </a:solidFill>
@@ -4685,7 +4685,7 @@
               <a:t>Most writing in Quarto is done in </a:t>
             </a:r>
             <a:r>
-              <a:rPr sz="1200">
+              <a:rPr sz="1100">
                 <a:solidFill>
                   <a:srgbClr val="5E5E5E"/>
                 </a:solidFill>
@@ -4694,7 +4694,7 @@
               <a:t>[</a:t>
             </a:r>
             <a:r>
-              <a:rPr sz="1200">
+              <a:rPr sz="1100">
                 <a:solidFill>
                   <a:srgbClr val="003B4F"/>
                 </a:solidFill>
@@ -4703,7 +4703,7 @@
               <a:t>Markdown</a:t>
             </a:r>
             <a:r>
-              <a:rPr sz="1200">
+              <a:rPr sz="1100">
                 <a:solidFill>
                   <a:srgbClr val="5E5E5E"/>
                 </a:solidFill>
@@ -4712,7 +4712,7 @@
               <a:t>]</a:t>
             </a:r>
             <a:r>
-              <a:rPr sz="1200">
+              <a:rPr sz="1100">
                 <a:solidFill>
                   <a:srgbClr val="003B4F"/>
                 </a:solidFill>
@@ -4723,7 +4723,7 @@
             <a:br/>
             <a:br/>
             <a:r>
-              <a:rPr sz="1200">
+              <a:rPr sz="1100">
                 <a:solidFill>
                   <a:srgbClr val="003B4F"/>
                 </a:solidFill>
@@ -4733,7 +4733,7 @@
             </a:r>
             <a:br/>
             <a:r>
-              <a:rPr sz="1200">
+              <a:rPr sz="1100">
                 <a:solidFill>
                   <a:srgbClr val="003B4F"/>
                 </a:solidFill>
@@ -4744,7 +4744,7 @@
             <a:br/>
             <a:br/>
             <a:r>
-              <a:rPr sz="1200">
+              <a:rPr sz="1100">
                 <a:solidFill>
                   <a:srgbClr val="003B4F"/>
                 </a:solidFill>
@@ -4754,7 +4754,7 @@
             </a:r>
             <a:br/>
             <a:r>
-              <a:rPr sz="1200">
+              <a:rPr sz="1100">
                 <a:solidFill>
                   <a:srgbClr val="003B4F"/>
                 </a:solidFill>
@@ -4763,7 +4763,7 @@
               <a:t>diagrams with </a:t>
             </a:r>
             <a:r>
-              <a:rPr sz="1200">
+              <a:rPr sz="1100">
                 <a:solidFill>
                   <a:srgbClr val="5E5E5E"/>
                 </a:solidFill>
@@ -4772,7 +4772,7 @@
               <a:t>`mermaid`</a:t>
             </a:r>
             <a:r>
-              <a:rPr sz="1200">
+              <a:rPr sz="1100">
                 <a:solidFill>
                   <a:srgbClr val="003B4F"/>
                 </a:solidFill>
@@ -4781,7 +4781,7 @@
               <a:t> and </a:t>
             </a:r>
             <a:r>
-              <a:rPr sz="1200">
+              <a:rPr sz="1100">
                 <a:solidFill>
                   <a:srgbClr val="5E5E5E"/>
                 </a:solidFill>
@@ -4790,7 +4790,7 @@
               <a:t>`GraphViz`</a:t>
             </a:r>
             <a:r>
-              <a:rPr sz="1200">
+              <a:rPr sz="1100">
                 <a:solidFill>
                   <a:srgbClr val="003B4F"/>
                 </a:solidFill>
@@ -4800,7 +4800,7 @@
             </a:r>
             <a:br/>
             <a:r>
-              <a:rPr sz="1200">
+              <a:rPr sz="1100">
                 <a:solidFill>
                   <a:srgbClr val="003B4F"/>
                 </a:solidFill>
@@ -4811,7 +4811,7 @@
             <a:br/>
             <a:br/>
             <a:r>
-              <a:rPr sz="1200">
+              <a:rPr sz="1100">
                 <a:solidFill>
                   <a:srgbClr val="003B4F"/>
                 </a:solidFill>
@@ -4821,7 +4821,7 @@
             </a:r>
             <a:br/>
             <a:r>
-              <a:rPr sz="1200">
+              <a:rPr sz="1100">
                 <a:solidFill>
                   <a:srgbClr val="003B4F"/>
                 </a:solidFill>
@@ -4831,7 +4831,7 @@
             </a:r>
             <a:br/>
             <a:r>
-              <a:rPr sz="1200">
+              <a:rPr sz="1100">
                 <a:solidFill>
                   <a:srgbClr val="003B4F"/>
                 </a:solidFill>
@@ -5046,7 +5046,7 @@
             </a:pPr>
             <a:br/>
             <a:r>
-              <a:rPr sz="1200">
+              <a:rPr sz="1100">
                 <a:solidFill>
                   <a:srgbClr val="00769E"/>
                 </a:solidFill>
@@ -5055,7 +5055,7 @@
               <a:t>import</a:t>
             </a:r>
             <a:r>
-              <a:rPr sz="1200">
+              <a:rPr sz="1100">
                 <a:solidFill>
                   <a:srgbClr val="003B4F"/>
                 </a:solidFill>
@@ -5064,7 +5064,7 @@
               <a:t> numpy </a:t>
             </a:r>
             <a:r>
-              <a:rPr sz="1200">
+              <a:rPr sz="1100">
                 <a:solidFill>
                   <a:srgbClr val="00769E"/>
                 </a:solidFill>
@@ -5073,7 +5073,7 @@
               <a:t>as</a:t>
             </a:r>
             <a:r>
-              <a:rPr sz="1200">
+              <a:rPr sz="1100">
                 <a:solidFill>
                   <a:srgbClr val="003B4F"/>
                 </a:solidFill>
@@ -5083,7 +5083,7 @@
             </a:r>
             <a:br/>
             <a:r>
-              <a:rPr sz="1200">
+              <a:rPr sz="1100">
                 <a:solidFill>
                   <a:srgbClr val="00769E"/>
                 </a:solidFill>
@@ -5092,7 +5092,7 @@
               <a:t>import</a:t>
             </a:r>
             <a:r>
-              <a:rPr sz="1200">
+              <a:rPr sz="1100">
                 <a:solidFill>
                   <a:srgbClr val="003B4F"/>
                 </a:solidFill>
@@ -5101,7 +5101,7 @@
               <a:t> matplotlib.pyplot </a:t>
             </a:r>
             <a:r>
-              <a:rPr sz="1200">
+              <a:rPr sz="1100">
                 <a:solidFill>
                   <a:srgbClr val="00769E"/>
                 </a:solidFill>
@@ -5110,7 +5110,7 @@
               <a:t>as</a:t>
             </a:r>
             <a:r>
-              <a:rPr sz="1200">
+              <a:rPr sz="1100">
                 <a:solidFill>
                   <a:srgbClr val="003B4F"/>
                 </a:solidFill>
@@ -5121,7 +5121,7 @@
             <a:br/>
             <a:br/>
             <a:r>
-              <a:rPr sz="1200">
+              <a:rPr sz="1100">
                 <a:solidFill>
                   <a:srgbClr val="003B4F"/>
                 </a:solidFill>
@@ -5130,7 +5130,7 @@
               <a:t>r </a:t>
             </a:r>
             <a:r>
-              <a:rPr sz="1200">
+              <a:rPr sz="1100">
                 <a:solidFill>
                   <a:srgbClr val="5E5E5E"/>
                 </a:solidFill>
@@ -5139,7 +5139,7 @@
               <a:t>=</a:t>
             </a:r>
             <a:r>
-              <a:rPr sz="1200">
+              <a:rPr sz="1100">
                 <a:solidFill>
                   <a:srgbClr val="003B4F"/>
                 </a:solidFill>
@@ -5148,7 +5148,7 @@
               <a:t> np.arange(</a:t>
             </a:r>
             <a:r>
-              <a:rPr sz="1200">
+              <a:rPr sz="1100">
                 <a:solidFill>
                   <a:srgbClr val="AD0000"/>
                 </a:solidFill>
@@ -5157,7 +5157,7 @@
               <a:t>0</a:t>
             </a:r>
             <a:r>
-              <a:rPr sz="1200">
+              <a:rPr sz="1100">
                 <a:solidFill>
                   <a:srgbClr val="003B4F"/>
                 </a:solidFill>
@@ -5166,7 +5166,7 @@
               <a:t>, </a:t>
             </a:r>
             <a:r>
-              <a:rPr sz="1200">
+              <a:rPr sz="1100">
                 <a:solidFill>
                   <a:srgbClr val="AD0000"/>
                 </a:solidFill>
@@ -5175,7 +5175,7 @@
               <a:t>2</a:t>
             </a:r>
             <a:r>
-              <a:rPr sz="1200">
+              <a:rPr sz="1100">
                 <a:solidFill>
                   <a:srgbClr val="003B4F"/>
                 </a:solidFill>
@@ -5184,7 +5184,7 @@
               <a:t>, </a:t>
             </a:r>
             <a:r>
-              <a:rPr sz="1200">
+              <a:rPr sz="1100">
                 <a:solidFill>
                   <a:srgbClr val="AD0000"/>
                 </a:solidFill>
@@ -5193,7 +5193,7 @@
               <a:t>0.01</a:t>
             </a:r>
             <a:r>
-              <a:rPr sz="1200">
+              <a:rPr sz="1100">
                 <a:solidFill>
                   <a:srgbClr val="003B4F"/>
                 </a:solidFill>
@@ -5203,7 +5203,7 @@
             </a:r>
             <a:br/>
             <a:r>
-              <a:rPr sz="1200">
+              <a:rPr sz="1100">
                 <a:solidFill>
                   <a:srgbClr val="003B4F"/>
                 </a:solidFill>
@@ -5212,7 +5212,7 @@
               <a:t>theta </a:t>
             </a:r>
             <a:r>
-              <a:rPr sz="1200">
+              <a:rPr sz="1100">
                 <a:solidFill>
                   <a:srgbClr val="5E5E5E"/>
                 </a:solidFill>
@@ -5221,7 +5221,7 @@
               <a:t>=</a:t>
             </a:r>
             <a:r>
-              <a:rPr sz="1200">
+              <a:rPr sz="1100">
                 <a:solidFill>
                   <a:srgbClr val="003B4F"/>
                 </a:solidFill>
@@ -5230,7 +5230,7 @@
               <a:t> </a:t>
             </a:r>
             <a:r>
-              <a:rPr sz="1200">
+              <a:rPr sz="1100">
                 <a:solidFill>
                   <a:srgbClr val="AD0000"/>
                 </a:solidFill>
@@ -5239,7 +5239,7 @@
               <a:t>2</a:t>
             </a:r>
             <a:r>
-              <a:rPr sz="1200">
+              <a:rPr sz="1100">
                 <a:solidFill>
                   <a:srgbClr val="003B4F"/>
                 </a:solidFill>
@@ -5248,7 +5248,7 @@
               <a:t> </a:t>
             </a:r>
             <a:r>
-              <a:rPr sz="1200">
+              <a:rPr sz="1100">
                 <a:solidFill>
                   <a:srgbClr val="5E5E5E"/>
                 </a:solidFill>
@@ -5257,7 +5257,7 @@
               <a:t>*</a:t>
             </a:r>
             <a:r>
-              <a:rPr sz="1200">
+              <a:rPr sz="1100">
                 <a:solidFill>
                   <a:srgbClr val="003B4F"/>
                 </a:solidFill>
@@ -5266,7 +5266,7 @@
               <a:t> np.pi </a:t>
             </a:r>
             <a:r>
-              <a:rPr sz="1200">
+              <a:rPr sz="1100">
                 <a:solidFill>
                   <a:srgbClr val="5E5E5E"/>
                 </a:solidFill>
@@ -5275,7 +5275,7 @@
               <a:t>*</a:t>
             </a:r>
             <a:r>
-              <a:rPr sz="1200">
+              <a:rPr sz="1100">
                 <a:solidFill>
                   <a:srgbClr val="003B4F"/>
                 </a:solidFill>
@@ -5285,7 +5285,7 @@
             </a:r>
             <a:br/>
             <a:r>
-              <a:rPr sz="1200">
+              <a:rPr sz="1100">
                 <a:solidFill>
                   <a:srgbClr val="003B4F"/>
                 </a:solidFill>
@@ -5294,7 +5294,7 @@
               <a:t>fig, ax </a:t>
             </a:r>
             <a:r>
-              <a:rPr sz="1200">
+              <a:rPr sz="1100">
                 <a:solidFill>
                   <a:srgbClr val="5E5E5E"/>
                 </a:solidFill>
@@ -5303,7 +5303,7 @@
               <a:t>=</a:t>
             </a:r>
             <a:r>
-              <a:rPr sz="1200">
+              <a:rPr sz="1100">
                 <a:solidFill>
                   <a:srgbClr val="003B4F"/>
                 </a:solidFill>
@@ -5312,7 +5312,7 @@
               <a:t> plt.subplots(subplot_kw</a:t>
             </a:r>
             <a:r>
-              <a:rPr sz="1200">
+              <a:rPr sz="1100">
                 <a:solidFill>
                   <a:srgbClr val="5E5E5E"/>
                 </a:solidFill>
@@ -5322,7 +5322,7 @@
             </a:r>
             <a:br/>
             <a:r>
-              <a:rPr sz="1200">
+              <a:rPr sz="1100">
                 <a:solidFill>
                   <a:srgbClr val="003B4F"/>
                 </a:solidFill>
@@ -5331,7 +5331,7 @@
               <a:t>                {</a:t>
             </a:r>
             <a:r>
-              <a:rPr sz="1200">
+              <a:rPr sz="1100">
                 <a:solidFill>
                   <a:srgbClr val="20794D"/>
                 </a:solidFill>
@@ -5340,7 +5340,7 @@
               <a:t>'projection'</a:t>
             </a:r>
             <a:r>
-              <a:rPr sz="1200">
+              <a:rPr sz="1100">
                 <a:solidFill>
                   <a:srgbClr val="003B4F"/>
                 </a:solidFill>
@@ -5349,7 +5349,7 @@
               <a:t>: </a:t>
             </a:r>
             <a:r>
-              <a:rPr sz="1200">
+              <a:rPr sz="1100">
                 <a:solidFill>
                   <a:srgbClr val="20794D"/>
                 </a:solidFill>
@@ -5358,7 +5358,7 @@
               <a:t>'polar'</a:t>
             </a:r>
             <a:r>
-              <a:rPr sz="1200">
+              <a:rPr sz="1100">
                 <a:solidFill>
                   <a:srgbClr val="003B4F"/>
                 </a:solidFill>
@@ -5368,7 +5368,7 @@
             </a:r>
             <a:br/>
             <a:r>
-              <a:rPr sz="1200">
+              <a:rPr sz="1100">
                 <a:solidFill>
                   <a:srgbClr val="003B4F"/>
                 </a:solidFill>
@@ -5378,7 +5378,7 @@
             </a:r>
             <a:br/>
             <a:r>
-              <a:rPr sz="1200">
+              <a:rPr sz="1100">
                 <a:solidFill>
                   <a:srgbClr val="003B4F"/>
                 </a:solidFill>
@@ -5387,7 +5387,7 @@
               <a:t>ax.set_rticks([</a:t>
             </a:r>
             <a:r>
-              <a:rPr sz="1200">
+              <a:rPr sz="1100">
                 <a:solidFill>
                   <a:srgbClr val="AD0000"/>
                 </a:solidFill>
@@ -5396,7 +5396,7 @@
               <a:t>0.5</a:t>
             </a:r>
             <a:r>
-              <a:rPr sz="1200">
+              <a:rPr sz="1100">
                 <a:solidFill>
                   <a:srgbClr val="003B4F"/>
                 </a:solidFill>
@@ -5405,7 +5405,7 @@
               <a:t>, </a:t>
             </a:r>
             <a:r>
-              <a:rPr sz="1200">
+              <a:rPr sz="1100">
                 <a:solidFill>
                   <a:srgbClr val="AD0000"/>
                 </a:solidFill>
@@ -5414,7 +5414,7 @@
               <a:t>1</a:t>
             </a:r>
             <a:r>
-              <a:rPr sz="1200">
+              <a:rPr sz="1100">
                 <a:solidFill>
                   <a:srgbClr val="003B4F"/>
                 </a:solidFill>
@@ -5423,7 +5423,7 @@
               <a:t>, </a:t>
             </a:r>
             <a:r>
-              <a:rPr sz="1200">
+              <a:rPr sz="1100">
                 <a:solidFill>
                   <a:srgbClr val="AD0000"/>
                 </a:solidFill>
@@ -5432,7 +5432,7 @@
               <a:t>1.5</a:t>
             </a:r>
             <a:r>
-              <a:rPr sz="1200">
+              <a:rPr sz="1100">
                 <a:solidFill>
                   <a:srgbClr val="003B4F"/>
                 </a:solidFill>
@@ -5441,7 +5441,7 @@
               <a:t>, </a:t>
             </a:r>
             <a:r>
-              <a:rPr sz="1200">
+              <a:rPr sz="1100">
                 <a:solidFill>
                   <a:srgbClr val="AD0000"/>
                 </a:solidFill>
@@ -5450,7 +5450,7 @@
               <a:t>2</a:t>
             </a:r>
             <a:r>
-              <a:rPr sz="1200">
+              <a:rPr sz="1100">
                 <a:solidFill>
                   <a:srgbClr val="003B4F"/>
                 </a:solidFill>
@@ -5460,7 +5460,7 @@
             </a:r>
             <a:br/>
             <a:r>
-              <a:rPr sz="1200">
+              <a:rPr sz="1100">
                 <a:solidFill>
                   <a:srgbClr val="003B4F"/>
                 </a:solidFill>
@@ -5469,7 +5469,7 @@
               <a:t>ax.grid(</a:t>
             </a:r>
             <a:r>
-              <a:rPr sz="1200">
+              <a:rPr sz="1100">
                 <a:solidFill>
                   <a:srgbClr val="111111"/>
                 </a:solidFill>
@@ -5478,7 +5478,7 @@
               <a:t>True</a:t>
             </a:r>
             <a:r>
-              <a:rPr sz="1200">
+              <a:rPr sz="1100">
                 <a:solidFill>
                   <a:srgbClr val="003B4F"/>
                 </a:solidFill>
@@ -5488,7 +5488,7 @@
             </a:r>
             <a:br/>
             <a:r>
-              <a:rPr sz="1200">
+              <a:rPr sz="1100">
                 <a:solidFill>
                   <a:srgbClr val="003B4F"/>
                 </a:solidFill>
@@ -5647,7 +5647,7 @@
               <a:buNone/>
             </a:pPr>
             <a:r>
-              <a:rPr sz="1200">
+              <a:rPr sz="1100">
                 <a:solidFill>
                   <a:srgbClr val="003B4F"/>
                 </a:solidFill>
@@ -5657,7 +5657,7 @@
             </a:r>
             <a:br/>
             <a:r>
-              <a:rPr sz="1200">
+              <a:rPr sz="1100">
                 <a:solidFill>
                   <a:srgbClr val="003B4F"/>
                 </a:solidFill>
@@ -5666,7 +5666,7 @@
               <a:t>with </a:t>
             </a:r>
             <a:r>
-              <a:rPr sz="1200">
+              <a:rPr sz="1100">
                 <a:solidFill>
                   <a:srgbClr val="5E5E5E"/>
                 </a:solidFill>
@@ -5675,7 +5675,7 @@
               <a:t>`#`</a:t>
             </a:r>
             <a:r>
-              <a:rPr sz="1200">
+              <a:rPr sz="1100">
                 <a:solidFill>
                   <a:srgbClr val="003B4F"/>
                 </a:solidFill>
@@ -5684,7 +5684,7 @@
               <a:t>, titles with </a:t>
             </a:r>
             <a:r>
-              <a:rPr sz="1200">
+              <a:rPr sz="1100">
                 <a:solidFill>
                   <a:srgbClr val="5E5E5E"/>
                 </a:solidFill>
@@ -5693,7 +5693,7 @@
               <a:t>`##`</a:t>
             </a:r>
             <a:r>
-              <a:rPr sz="1200">
+              <a:rPr sz="1100">
                 <a:solidFill>
                   <a:srgbClr val="003B4F"/>
                 </a:solidFill>
@@ -5703,7 +5703,7 @@
             </a:r>
             <a:br/>
             <a:r>
-              <a:rPr sz="1200">
+              <a:rPr sz="1100">
                 <a:solidFill>
                   <a:srgbClr val="003B4F"/>
                 </a:solidFill>
@@ -5712,7 +5712,7 @@
               <a:t>with </a:t>
             </a:r>
             <a:r>
-              <a:rPr sz="1200">
+              <a:rPr sz="1100">
                 <a:solidFill>
                   <a:srgbClr val="5E5E5E"/>
                 </a:solidFill>
@@ -5721,7 +5721,7 @@
               <a:t>`-`</a:t>
             </a:r>
             <a:r>
-              <a:rPr sz="1200">
+              <a:rPr sz="1100">
                 <a:solidFill>
                   <a:srgbClr val="003B4F"/>
                 </a:solidFill>
@@ -5732,7 +5732,7 @@
             <a:br/>
             <a:br/>
             <a:r>
-              <a:rPr sz="1200">
+              <a:rPr sz="1100">
                 <a:solidFill>
                   <a:srgbClr val="003B4F"/>
                 </a:solidFill>
@@ -5743,7 +5743,7 @@
             <a:br/>
             <a:br/>
             <a:r>
-              <a:rPr sz="1200">
+              <a:rPr sz="1100">
                 <a:solidFill>
                   <a:srgbClr val="4758AB"/>
                 </a:solidFill>
@@ -5754,7 +5754,7 @@
             <a:br/>
             <a:br/>
             <a:r>
-              <a:rPr sz="1200">
+              <a:rPr sz="1100">
                 <a:solidFill>
                   <a:srgbClr val="20794D"/>
                 </a:solidFill>
@@ -5763,7 +5763,7 @@
               <a:t>- </a:t>
             </a:r>
             <a:r>
-              <a:rPr sz="1200">
+              <a:rPr sz="1100">
                 <a:solidFill>
                   <a:srgbClr val="003B4F"/>
                 </a:solidFill>
@@ -5773,7 +5773,7 @@
             </a:r>
             <a:br/>
             <a:r>
-              <a:rPr sz="1200">
+              <a:rPr sz="1100">
                 <a:solidFill>
                   <a:srgbClr val="20794D"/>
                 </a:solidFill>
@@ -5782,7 +5782,7 @@
               <a:t>    - </a:t>
             </a:r>
             <a:r>
-              <a:rPr sz="1200">
+              <a:rPr sz="1100">
                 <a:solidFill>
                   <a:srgbClr val="003B4F"/>
                 </a:solidFill>
@@ -5792,7 +5792,7 @@
             </a:r>
             <a:br/>
             <a:r>
-              <a:rPr sz="1200">
+              <a:rPr sz="1100">
                 <a:solidFill>
                   <a:srgbClr val="20794D"/>
                 </a:solidFill>
@@ -5801,7 +5801,7 @@
               <a:t>    - </a:t>
             </a:r>
             <a:r>
-              <a:rPr sz="1200">
+              <a:rPr sz="1100">
                 <a:solidFill>
                   <a:srgbClr val="003B4F"/>
                 </a:solidFill>
@@ -5811,7 +5811,7 @@
             </a:r>
             <a:br/>
             <a:r>
-              <a:rPr sz="1200">
+              <a:rPr sz="1100">
                 <a:solidFill>
                   <a:srgbClr val="20794D"/>
                 </a:solidFill>
@@ -5820,7 +5820,7 @@
               <a:t>    - </a:t>
             </a:r>
             <a:r>
-              <a:rPr sz="1200">
+              <a:rPr sz="1100">
                 <a:solidFill>
                   <a:srgbClr val="003B4F"/>
                 </a:solidFill>
@@ -5830,7 +5830,7 @@
             </a:r>
             <a:br/>
             <a:r>
-              <a:rPr sz="1200">
+              <a:rPr sz="1100">
                 <a:solidFill>
                   <a:srgbClr val="20794D"/>
                 </a:solidFill>
@@ -5839,7 +5839,7 @@
               <a:t>    - </a:t>
             </a:r>
             <a:r>
-              <a:rPr sz="1200">
+              <a:rPr sz="1100">
                 <a:solidFill>
                   <a:srgbClr val="003B4F"/>
                 </a:solidFill>
@@ -5849,7 +5849,7 @@
             </a:r>
             <a:br/>
             <a:r>
-              <a:rPr sz="1200">
+              <a:rPr sz="1100">
                 <a:solidFill>
                   <a:srgbClr val="20794D"/>
                 </a:solidFill>
@@ -5858,7 +5858,7 @@
               <a:t>    - </a:t>
             </a:r>
             <a:r>
-              <a:rPr sz="1200">
+              <a:rPr sz="1100">
                 <a:solidFill>
                   <a:srgbClr val="003B4F"/>
                 </a:solidFill>
@@ -5892,7 +5892,7 @@
               <a:t>To create slides, you create sections with </a:t>
             </a:r>
             <a:r>
-              <a:rPr sz="1200">
+              <a:rPr sz="1100">
                 <a:latin typeface="Consolas"/>
               </a:rPr>
               <a:t>#</a:t>
@@ -5902,7 +5902,7 @@
               <a:t>, titles with </a:t>
             </a:r>
             <a:r>
-              <a:rPr sz="1200">
+              <a:rPr sz="1100">
                 <a:latin typeface="Consolas"/>
               </a:rPr>
               <a:t>##</a:t>
@@ -5912,7 +5912,7 @@
               <a:t>, and bullets with </a:t>
             </a:r>
             <a:r>
-              <a:rPr sz="1200">
+              <a:rPr sz="1100">
                 <a:latin typeface="Consolas"/>
               </a:rPr>
               <a:t>-</a:t>
@@ -6071,7 +6071,7 @@
               <a:buNone/>
             </a:pPr>
             <a:r>
-              <a:rPr sz="1200">
+              <a:rPr sz="1100">
                 <a:solidFill>
                   <a:srgbClr val="003B4F"/>
                 </a:solidFill>
@@ -6080,7 +6080,7 @@
               <a:t>df_dr </a:t>
             </a:r>
             <a:r>
-              <a:rPr sz="1200">
+              <a:rPr sz="1100">
                 <a:solidFill>
                   <a:srgbClr val="5E5E5E"/>
                 </a:solidFill>
@@ -6089,7 +6089,7 @@
               <a:t>=</a:t>
             </a:r>
             <a:r>
-              <a:rPr sz="1200">
+              <a:rPr sz="1100">
                 <a:solidFill>
                   <a:srgbClr val="003B4F"/>
                 </a:solidFill>
@@ -6098,7 +6098,7 @@
               <a:t> pd.read_csv(</a:t>
             </a:r>
             <a:r>
-              <a:rPr sz="1200">
+              <a:rPr sz="1100">
                 <a:solidFill>
                   <a:srgbClr val="20794D"/>
                 </a:solidFill>
@@ -6107,7 +6107,7 @@
               <a:t>"data/dr.csv.gz"</a:t>
             </a:r>
             <a:r>
-              <a:rPr sz="1200">
+              <a:rPr sz="1100">
                 <a:solidFill>
                   <a:srgbClr val="003B4F"/>
                 </a:solidFill>
@@ -6116,7 +6116,7 @@
               <a:t>, compression</a:t>
             </a:r>
             <a:r>
-              <a:rPr sz="1200">
+              <a:rPr sz="1100">
                 <a:solidFill>
                   <a:srgbClr val="5E5E5E"/>
                 </a:solidFill>
@@ -6125,7 +6125,7 @@
               <a:t>=</a:t>
             </a:r>
             <a:r>
-              <a:rPr sz="1200">
+              <a:rPr sz="1100">
                 <a:solidFill>
                   <a:srgbClr val="20794D"/>
                 </a:solidFill>
@@ -6134,7 +6134,7 @@
               <a:t>"gzip"</a:t>
             </a:r>
             <a:r>
-              <a:rPr sz="1200">
+              <a:rPr sz="1100">
                 <a:solidFill>
                   <a:srgbClr val="003B4F"/>
                 </a:solidFill>
@@ -6144,7 +6144,7 @@
             </a:r>
             <a:br/>
             <a:r>
-              <a:rPr sz="1200">
+              <a:rPr sz="1100">
                 <a:solidFill>
                   <a:srgbClr val="003B4F"/>
                 </a:solidFill>
@@ -6153,7 +6153,7 @@
               <a:t>df_pop </a:t>
             </a:r>
             <a:r>
-              <a:rPr sz="1200">
+              <a:rPr sz="1100">
                 <a:solidFill>
                   <a:srgbClr val="5E5E5E"/>
                 </a:solidFill>
@@ -6162,7 +6162,7 @@
               <a:t>=</a:t>
             </a:r>
             <a:r>
-              <a:rPr sz="1200">
+              <a:rPr sz="1100">
                 <a:solidFill>
                   <a:srgbClr val="003B4F"/>
                 </a:solidFill>
@@ -6171,7 +6171,7 @@
               <a:t> pd.read_csv(</a:t>
             </a:r>
             <a:r>
-              <a:rPr sz="1200">
+              <a:rPr sz="1100">
                 <a:solidFill>
                   <a:srgbClr val="20794D"/>
                 </a:solidFill>
@@ -6180,7 +6180,7 @@
               <a:t>"data/pop_brackets.csv.gz"</a:t>
             </a:r>
             <a:r>
-              <a:rPr sz="1200">
+              <a:rPr sz="1100">
                 <a:solidFill>
                   <a:srgbClr val="003B4F"/>
                 </a:solidFill>
@@ -6189,7 +6189,7 @@
               <a:t>, compression</a:t>
             </a:r>
             <a:r>
-              <a:rPr sz="1200">
+              <a:rPr sz="1100">
                 <a:solidFill>
                   <a:srgbClr val="5E5E5E"/>
                 </a:solidFill>
@@ -6198,7 +6198,7 @@
               <a:t>=</a:t>
             </a:r>
             <a:r>
-              <a:rPr sz="1200">
+              <a:rPr sz="1100">
                 <a:solidFill>
                   <a:srgbClr val="20794D"/>
                 </a:solidFill>
@@ -6207,7 +6207,7 @@
               <a:t>"gzip"</a:t>
             </a:r>
             <a:r>
-              <a:rPr sz="1200">
+              <a:rPr sz="1100">
                 <a:solidFill>
                   <a:srgbClr val="003B4F"/>
                 </a:solidFill>
@@ -6218,7 +6218,7 @@
             <a:br/>
             <a:br/>
             <a:r>
-              <a:rPr sz="1200">
+              <a:rPr sz="1100">
                 <a:solidFill>
                   <a:srgbClr val="003B4F"/>
                 </a:solidFill>
@@ -6227,7 +6227,7 @@
               <a:t>years </a:t>
             </a:r>
             <a:r>
-              <a:rPr sz="1200">
+              <a:rPr sz="1100">
                 <a:solidFill>
                   <a:srgbClr val="5E5E5E"/>
                 </a:solidFill>
@@ -6236,7 +6236,7 @@
               <a:t>=</a:t>
             </a:r>
             <a:r>
-              <a:rPr sz="1200">
+              <a:rPr sz="1100">
                 <a:solidFill>
                   <a:srgbClr val="003B4F"/>
                 </a:solidFill>
@@ -6245,7 +6245,7 @@
               <a:t> [</a:t>
             </a:r>
             <a:r>
-              <a:rPr sz="1200">
+              <a:rPr sz="1100">
                 <a:solidFill>
                   <a:srgbClr val="AD0000"/>
                 </a:solidFill>
@@ -6254,7 +6254,7 @@
               <a:t>2000</a:t>
             </a:r>
             <a:r>
-              <a:rPr sz="1200">
+              <a:rPr sz="1100">
                 <a:solidFill>
                   <a:srgbClr val="003B4F"/>
                 </a:solidFill>
@@ -6263,7 +6263,7 @@
               <a:t>, </a:t>
             </a:r>
             <a:r>
-              <a:rPr sz="1200">
+              <a:rPr sz="1100">
                 <a:solidFill>
                   <a:srgbClr val="AD0000"/>
                 </a:solidFill>
@@ -6272,7 +6272,7 @@
               <a:t>2025</a:t>
             </a:r>
             <a:r>
-              <a:rPr sz="1200">
+              <a:rPr sz="1100">
                 <a:solidFill>
                   <a:srgbClr val="003B4F"/>
                 </a:solidFill>
@@ -6281,7 +6281,7 @@
               <a:t>, </a:t>
             </a:r>
             <a:r>
-              <a:rPr sz="1200">
+              <a:rPr sz="1100">
                 <a:solidFill>
                   <a:srgbClr val="AD0000"/>
                 </a:solidFill>
@@ -6290,7 +6290,7 @@
               <a:t>2050</a:t>
             </a:r>
             <a:r>
-              <a:rPr sz="1200">
+              <a:rPr sz="1100">
                 <a:solidFill>
                   <a:srgbClr val="003B4F"/>
                 </a:solidFill>
@@ -6299,7 +6299,7 @@
               <a:t>, </a:t>
             </a:r>
             <a:r>
-              <a:rPr sz="1200">
+              <a:rPr sz="1100">
                 <a:solidFill>
                   <a:srgbClr val="AD0000"/>
                 </a:solidFill>
@@ -6308,7 +6308,7 @@
               <a:t>2075</a:t>
             </a:r>
             <a:r>
-              <a:rPr sz="1200">
+              <a:rPr sz="1100">
                 <a:solidFill>
                   <a:srgbClr val="003B4F"/>
                 </a:solidFill>
@@ -6317,7 +6317,7 @@
               <a:t>, </a:t>
             </a:r>
             <a:r>
-              <a:rPr sz="1200">
+              <a:rPr sz="1100">
                 <a:solidFill>
                   <a:srgbClr val="AD0000"/>
                 </a:solidFill>
@@ -6326,7 +6326,7 @@
               <a:t>2100</a:t>
             </a:r>
             <a:r>
-              <a:rPr sz="1200">
+              <a:rPr sz="1100">
                 <a:solidFill>
                   <a:srgbClr val="003B4F"/>
                 </a:solidFill>
@@ -6336,7 +6336,7 @@
             </a:r>
             <a:br/>
             <a:r>
-              <a:rPr sz="1200">
+              <a:rPr sz="1100">
                 <a:solidFill>
                   <a:srgbClr val="003B4F"/>
                 </a:solidFill>
@@ -6345,7 +6345,7 @@
               <a:t>regions </a:t>
             </a:r>
             <a:r>
-              <a:rPr sz="1200">
+              <a:rPr sz="1100">
                 <a:solidFill>
                   <a:srgbClr val="5E5E5E"/>
                 </a:solidFill>
@@ -6354,7 +6354,7 @@
               <a:t>=</a:t>
             </a:r>
             <a:r>
-              <a:rPr sz="1200">
+              <a:rPr sz="1100">
                 <a:solidFill>
                   <a:srgbClr val="003B4F"/>
                 </a:solidFill>
@@ -6363,7 +6363,7 @@
               <a:t> [</a:t>
             </a:r>
             <a:r>
-              <a:rPr sz="1200">
+              <a:rPr sz="1100">
                 <a:solidFill>
                   <a:srgbClr val="20794D"/>
                 </a:solidFill>
@@ -6372,7 +6372,7 @@
               <a:t>"Belgium"</a:t>
             </a:r>
             <a:r>
-              <a:rPr sz="1200">
+              <a:rPr sz="1100">
                 <a:solidFill>
                   <a:srgbClr val="003B4F"/>
                 </a:solidFill>
@@ -6381,7 +6381,7 @@
               <a:t>, </a:t>
             </a:r>
             <a:r>
-              <a:rPr sz="1200">
+              <a:rPr sz="1100">
                 <a:solidFill>
                   <a:srgbClr val="20794D"/>
                 </a:solidFill>
@@ -6390,7 +6390,7 @@
               <a:t>"China"</a:t>
             </a:r>
             <a:r>
-              <a:rPr sz="1200">
+              <a:rPr sz="1100">
                 <a:solidFill>
                   <a:srgbClr val="003B4F"/>
                 </a:solidFill>
@@ -6399,7 +6399,7 @@
               <a:t>, </a:t>
             </a:r>
             <a:r>
-              <a:rPr sz="1200">
+              <a:rPr sz="1100">
                 <a:solidFill>
                   <a:srgbClr val="20794D"/>
                 </a:solidFill>
@@ -6408,7 +6408,7 @@
               <a:t>"Brazil"</a:t>
             </a:r>
             <a:r>
-              <a:rPr sz="1200">
+              <a:rPr sz="1100">
                 <a:solidFill>
                   <a:srgbClr val="003B4F"/>
                 </a:solidFill>
@@ -6417,7 +6417,7 @@
               <a:t>, </a:t>
             </a:r>
             <a:r>
-              <a:rPr sz="1200">
+              <a:rPr sz="1100">
                 <a:solidFill>
                   <a:srgbClr val="20794D"/>
                 </a:solidFill>
@@ -6426,7 +6426,7 @@
               <a:t>"India"</a:t>
             </a:r>
             <a:r>
-              <a:rPr sz="1200">
+              <a:rPr sz="1100">
                 <a:solidFill>
                   <a:srgbClr val="003B4F"/>
                 </a:solidFill>
@@ -6435,7 +6435,7 @@
               <a:t>, </a:t>
             </a:r>
             <a:r>
-              <a:rPr sz="1200">
+              <a:rPr sz="1100">
                 <a:solidFill>
                   <a:srgbClr val="20794D"/>
                 </a:solidFill>
@@ -6444,7 +6444,7 @@
               <a:t>"Japan"</a:t>
             </a:r>
             <a:r>
-              <a:rPr sz="1200">
+              <a:rPr sz="1100">
                 <a:solidFill>
                   <a:srgbClr val="003B4F"/>
                 </a:solidFill>
@@ -6453,7 +6453,7 @@
               <a:t>, </a:t>
             </a:r>
             <a:r>
-              <a:rPr sz="1200">
+              <a:rPr sz="1100">
                 <a:solidFill>
                   <a:srgbClr val="20794D"/>
                 </a:solidFill>
@@ -6462,7 +6462,7 @@
               <a:t>"Nigeria"</a:t>
             </a:r>
             <a:r>
-              <a:rPr sz="1200">
+              <a:rPr sz="1100">
                 <a:solidFill>
                   <a:srgbClr val="003B4F"/>
                 </a:solidFill>
@@ -6473,7 +6473,7 @@
             <a:br/>
             <a:br/>
             <a:r>
-              <a:rPr sz="1200">
+              <a:rPr sz="1100">
                 <a:solidFill>
                   <a:srgbClr val="003B4F"/>
                 </a:solidFill>
@@ -6483,7 +6483,7 @@
             </a:r>
             <a:br/>
             <a:r>
-              <a:rPr sz="1200">
+              <a:rPr sz="1100">
                 <a:solidFill>
                   <a:srgbClr val="003B4F"/>
                 </a:solidFill>
@@ -6492,7 +6492,7 @@
               <a:t>    display(Markdown(</a:t>
             </a:r>
             <a:r>
-              <a:rPr sz="1200">
+              <a:rPr sz="1100">
                 <a:solidFill>
                   <a:srgbClr val="20794D"/>
                 </a:solidFill>
@@ -6501,7 +6501,7 @@
               <a:t>f"## Age and Population Pyramids for </a:t>
             </a:r>
             <a:r>
-              <a:rPr sz="1200">
+              <a:rPr sz="1100">
                 <a:solidFill>
                   <a:srgbClr val="5E5E5E"/>
                 </a:solidFill>
@@ -6510,7 +6510,7 @@
               <a:t>{</a:t>
             </a:r>
             <a:r>
-              <a:rPr sz="1200">
+              <a:rPr sz="1100">
                 <a:solidFill>
                   <a:srgbClr val="003B4F"/>
                 </a:solidFill>
@@ -6519,7 +6519,7 @@
               <a:t>name</a:t>
             </a:r>
             <a:r>
-              <a:rPr sz="1200">
+              <a:rPr sz="1100">
                 <a:solidFill>
                   <a:srgbClr val="5E5E5E"/>
                 </a:solidFill>
@@ -6528,7 +6528,7 @@
               <a:t>}</a:t>
             </a:r>
             <a:r>
-              <a:rPr sz="1200">
+              <a:rPr sz="1100">
                 <a:solidFill>
                   <a:srgbClr val="20794D"/>
                 </a:solidFill>
@@ -6537,7 +6537,7 @@
               <a:t>"</a:t>
             </a:r>
             <a:r>
-              <a:rPr sz="1200">
+              <a:rPr sz="1100">
                 <a:solidFill>
                   <a:srgbClr val="003B4F"/>
                 </a:solidFill>
@@ -6547,7 +6547,7 @@
             </a:r>
             <a:br/>
             <a:r>
-              <a:rPr sz="1200">
+              <a:rPr sz="1100">
                 <a:solidFill>
                   <a:srgbClr val="003B4F"/>
                 </a:solidFill>
@@ -6556,7 +6556,7 @@
               <a:t>    display(Markdown(</a:t>
             </a:r>
             <a:r>
-              <a:rPr sz="1200">
+              <a:rPr sz="1100">
                 <a:solidFill>
                   <a:srgbClr val="20794D"/>
                 </a:solidFill>
@@ -6565,7 +6565,7 @@
               <a:t>f'&lt;div class="columns"&gt;'</a:t>
             </a:r>
             <a:r>
-              <a:rPr sz="1200">
+              <a:rPr sz="1100">
                 <a:solidFill>
                   <a:srgbClr val="003B4F"/>
                 </a:solidFill>
@@ -6575,7 +6575,7 @@
             </a:r>
             <a:br/>
             <a:r>
-              <a:rPr sz="1200">
+              <a:rPr sz="1100">
                 <a:solidFill>
                   <a:srgbClr val="003B4F"/>
                 </a:solidFill>
@@ -6584,7 +6584,7 @@
               <a:t>    display(Markdown(</a:t>
             </a:r>
             <a:r>
-              <a:rPr sz="1200">
+              <a:rPr sz="1100">
                 <a:solidFill>
                   <a:srgbClr val="20794D"/>
                 </a:solidFill>
@@ -6593,7 +6593,7 @@
               <a:t>f'&lt;div class="column"&gt;'</a:t>
             </a:r>
             <a:r>
-              <a:rPr sz="1200">
+              <a:rPr sz="1100">
                 <a:solidFill>
                   <a:srgbClr val="003B4F"/>
                 </a:solidFill>
@@ -6603,7 +6603,7 @@
             </a:r>
             <a:br/>
             <a:r>
-              <a:rPr sz="1200">
+              <a:rPr sz="1100">
                 <a:solidFill>
                   <a:srgbClr val="003B4F"/>
                 </a:solidFill>
@@ -6612,7 +6612,7 @@
               <a:t>    plot_dependency_ratio(df_dr[df_dr.Location </a:t>
             </a:r>
             <a:r>
-              <a:rPr sz="1200">
+              <a:rPr sz="1100">
                 <a:solidFill>
                   <a:srgbClr val="5E5E5E"/>
                 </a:solidFill>
@@ -6621,7 +6621,7 @@
               <a:t>==</a:t>
             </a:r>
             <a:r>
-              <a:rPr sz="1200">
+              <a:rPr sz="1100">
                 <a:solidFill>
                   <a:srgbClr val="003B4F"/>
                 </a:solidFill>
@@ -6631,7 +6631,7 @@
             </a:r>
             <a:br/>
             <a:r>
-              <a:rPr sz="1200">
+              <a:rPr sz="1100">
                 <a:solidFill>
                   <a:srgbClr val="003B4F"/>
                 </a:solidFill>
@@ -6640,7 +6640,7 @@
               <a:t>    display(Markdown(</a:t>
             </a:r>
             <a:r>
-              <a:rPr sz="1200">
+              <a:rPr sz="1100">
                 <a:solidFill>
                   <a:srgbClr val="20794D"/>
                 </a:solidFill>
@@ -6649,7 +6649,7 @@
               <a:t>f'&lt;/div&gt;'</a:t>
             </a:r>
             <a:r>
-              <a:rPr sz="1200">
+              <a:rPr sz="1100">
                 <a:solidFill>
                   <a:srgbClr val="003B4F"/>
                 </a:solidFill>
@@ -6659,7 +6659,7 @@
             </a:r>
             <a:br/>
             <a:r>
-              <a:rPr sz="1200">
+              <a:rPr sz="1100">
                 <a:solidFill>
                   <a:srgbClr val="003B4F"/>
                 </a:solidFill>
@@ -6668,7 +6668,7 @@
               <a:t>    display(Markdown(</a:t>
             </a:r>
             <a:r>
-              <a:rPr sz="1200">
+              <a:rPr sz="1100">
                 <a:solidFill>
                   <a:srgbClr val="20794D"/>
                 </a:solidFill>
@@ -6677,7 +6677,7 @@
               <a:t>f'&lt;div class="column"&gt;'</a:t>
             </a:r>
             <a:r>
-              <a:rPr sz="1200">
+              <a:rPr sz="1100">
                 <a:solidFill>
                   <a:srgbClr val="003B4F"/>
                 </a:solidFill>
@@ -6687,7 +6687,7 @@
             </a:r>
             <a:br/>
             <a:r>
-              <a:rPr sz="1200">
+              <a:rPr sz="1100">
                 <a:solidFill>
                   <a:srgbClr val="003B4F"/>
                 </a:solidFill>
@@ -6696,7 +6696,7 @@
               <a:t>    plot_population_pyramid_series(df_pop[df_pop[</a:t>
             </a:r>
             <a:r>
-              <a:rPr sz="1200">
+              <a:rPr sz="1100">
                 <a:solidFill>
                   <a:srgbClr val="20794D"/>
                 </a:solidFill>
@@ -6705,7 +6705,7 @@
               <a:t>"Location"</a:t>
             </a:r>
             <a:r>
-              <a:rPr sz="1200">
+              <a:rPr sz="1100">
                 <a:solidFill>
                   <a:srgbClr val="003B4F"/>
                 </a:solidFill>
@@ -6714,7 +6714,7 @@
               <a:t>]</a:t>
             </a:r>
             <a:r>
-              <a:rPr sz="1200">
+              <a:rPr sz="1100">
                 <a:solidFill>
                   <a:srgbClr val="5E5E5E"/>
                 </a:solidFill>
@@ -6723,7 +6723,7 @@
               <a:t>==</a:t>
             </a:r>
             <a:r>
-              <a:rPr sz="1200">
+              <a:rPr sz="1100">
                 <a:solidFill>
                   <a:srgbClr val="003B4F"/>
                 </a:solidFill>
@@ -6733,7 +6733,7 @@
             </a:r>
             <a:br/>
             <a:r>
-              <a:rPr sz="1200">
+              <a:rPr sz="1100">
                 <a:solidFill>
                   <a:srgbClr val="003B4F"/>
                 </a:solidFill>
@@ -6742,7 +6742,7 @@
               <a:t>    display(Markdown(</a:t>
             </a:r>
             <a:r>
-              <a:rPr sz="1200">
+              <a:rPr sz="1100">
                 <a:solidFill>
                   <a:srgbClr val="20794D"/>
                 </a:solidFill>
@@ -6751,7 +6751,7 @@
               <a:t>f'&lt;/div&gt;'</a:t>
             </a:r>
             <a:r>
-              <a:rPr sz="1200">
+              <a:rPr sz="1100">
                 <a:solidFill>
                   <a:srgbClr val="003B4F"/>
                 </a:solidFill>
@@ -6761,7 +6761,7 @@
             </a:r>
             <a:br/>
             <a:r>
-              <a:rPr sz="1200">
+              <a:rPr sz="1100">
                 <a:solidFill>
                   <a:srgbClr val="003B4F"/>
                 </a:solidFill>
@@ -6770,7 +6770,7 @@
               <a:t>    display(Markdown(</a:t>
             </a:r>
             <a:r>
-              <a:rPr sz="1200">
+              <a:rPr sz="1100">
                 <a:solidFill>
                   <a:srgbClr val="20794D"/>
                 </a:solidFill>
@@ -6779,7 +6779,7 @@
               <a:t>f'&lt;/div&gt;'</a:t>
             </a:r>
             <a:r>
-              <a:rPr sz="1200">
+              <a:rPr sz="1100">
                 <a:solidFill>
                   <a:srgbClr val="003B4F"/>
                 </a:solidFill>
@@ -7602,7 +7602,7 @@
               <a:buNone/>
             </a:pPr>
             <a:r>
-              <a:rPr sz="1200">
+              <a:rPr sz="1100">
                 <a:solidFill>
                   <a:srgbClr val="AD0000"/>
                 </a:solidFill>
@@ -7612,7 +7612,7 @@
             </a:r>
             <a:br/>
             <a:r>
-              <a:rPr sz="1200">
+              <a:rPr sz="1100">
                 <a:solidFill>
                   <a:srgbClr val="4758AB"/>
                 </a:solidFill>
@@ -7621,7 +7621,7 @@
               <a:t>title</a:t>
             </a:r>
             <a:r>
-              <a:rPr sz="1200">
+              <a:rPr sz="1100">
                 <a:solidFill>
                   <a:srgbClr val="003B4F"/>
                 </a:solidFill>
@@ -7630,7 +7630,7 @@
               <a:t>:</a:t>
             </a:r>
             <a:r>
-              <a:rPr sz="1200">
+              <a:rPr sz="1100">
                 <a:solidFill>
                   <a:srgbClr val="657422"/>
                 </a:solidFill>
@@ -7639,7 +7639,7 @@
               <a:t> </a:t>
             </a:r>
             <a:r>
-              <a:rPr sz="1200">
+              <a:rPr sz="1100">
                 <a:solidFill>
                   <a:srgbClr val="20794D"/>
                 </a:solidFill>
@@ -7649,7 +7649,7 @@
             </a:r>
             <a:br/>
             <a:r>
-              <a:rPr sz="1200">
+              <a:rPr sz="1100">
                 <a:solidFill>
                   <a:srgbClr val="4758AB"/>
                 </a:solidFill>
@@ -7658,7 +7658,7 @@
               <a:t>format</a:t>
             </a:r>
             <a:r>
-              <a:rPr sz="1200">
+              <a:rPr sz="1100">
                 <a:solidFill>
                   <a:srgbClr val="003B4F"/>
                 </a:solidFill>
@@ -7667,7 +7667,7 @@
               <a:t>:</a:t>
             </a:r>
             <a:r>
-              <a:rPr sz="1200">
+              <a:rPr sz="1100">
                 <a:solidFill>
                   <a:srgbClr val="657422"/>
                 </a:solidFill>
@@ -7677,7 +7677,7 @@
             </a:r>
             <a:br/>
             <a:r>
-              <a:rPr sz="1200">
+              <a:rPr sz="1100">
                 <a:solidFill>
                   <a:srgbClr val="5E5E5E"/>
                 </a:solidFill>
@@ -7687,7 +7687,7 @@
             </a:r>
             <a:br/>
             <a:r>
-              <a:rPr sz="1200">
+              <a:rPr sz="1100">
                 <a:solidFill>
                   <a:srgbClr val="5E5E5E"/>
                 </a:solidFill>
@@ -7697,7 +7697,7 @@
             </a:r>
             <a:br/>
             <a:r>
-              <a:rPr sz="1200">
+              <a:rPr sz="1100">
                 <a:solidFill>
                   <a:srgbClr val="5E5E5E"/>
                 </a:solidFill>
@@ -7707,7 +7707,7 @@
             </a:r>
             <a:br/>
             <a:r>
-              <a:rPr sz="1200">
+              <a:rPr sz="1100">
                 <a:solidFill>
                   <a:srgbClr val="5E5E5E"/>
                 </a:solidFill>
@@ -7717,7 +7717,7 @@
             </a:r>
             <a:br/>
             <a:r>
-              <a:rPr sz="1200">
+              <a:rPr sz="1100">
                 <a:solidFill>
                   <a:srgbClr val="5E5E5E"/>
                 </a:solidFill>
@@ -7727,7 +7727,7 @@
             </a:r>
             <a:br/>
             <a:r>
-              <a:rPr sz="1200">
+              <a:rPr sz="1100">
                 <a:solidFill>
                   <a:srgbClr val="5E5E5E"/>
                 </a:solidFill>
@@ -7737,7 +7737,7 @@
             </a:r>
             <a:br/>
             <a:r>
-              <a:rPr sz="1200">
+              <a:rPr sz="1100">
                 <a:solidFill>
                   <a:srgbClr val="5E5E5E"/>
                 </a:solidFill>
@@ -7748,7 +7748,7 @@
             <a:br/>
             <a:br/>
             <a:r>
-              <a:rPr sz="1200">
+              <a:rPr sz="1100">
                 <a:solidFill>
                   <a:srgbClr val="4758AB"/>
                 </a:solidFill>
@@ -7757,7 +7757,7 @@
               <a:t>author</a:t>
             </a:r>
             <a:r>
-              <a:rPr sz="1200">
+              <a:rPr sz="1100">
                 <a:solidFill>
                   <a:srgbClr val="003B4F"/>
                 </a:solidFill>
@@ -7766,7 +7766,7 @@
               <a:t>:</a:t>
             </a:r>
             <a:r>
-              <a:rPr sz="1200">
+              <a:rPr sz="1100">
                 <a:solidFill>
                   <a:srgbClr val="657422"/>
                 </a:solidFill>
@@ -7776,7 +7776,7 @@
             </a:r>
             <a:br/>
             <a:r>
-              <a:rPr sz="1200">
+              <a:rPr sz="1100">
                 <a:solidFill>
                   <a:srgbClr val="4758AB"/>
                 </a:solidFill>
@@ -7785,7 +7785,7 @@
               <a:t>date</a:t>
             </a:r>
             <a:r>
-              <a:rPr sz="1200">
+              <a:rPr sz="1100">
                 <a:solidFill>
                   <a:srgbClr val="003B4F"/>
                 </a:solidFill>
@@ -7794,7 +7794,7 @@
               <a:t>:</a:t>
             </a:r>
             <a:r>
-              <a:rPr sz="1200">
+              <a:rPr sz="1100">
                 <a:solidFill>
                   <a:srgbClr val="657422"/>
                 </a:solidFill>
@@ -7804,7 +7804,7 @@
             </a:r>
             <a:br/>
             <a:r>
-              <a:rPr sz="1200">
+              <a:rPr sz="1100">
                 <a:solidFill>
                   <a:srgbClr val="AD0000"/>
                 </a:solidFill>
@@ -8878,7 +8878,7 @@
           <a:p>
             <a:pPr lvl="1"/>
             <a:r>
-              <a:rPr sz="1200">
+              <a:rPr sz="1100">
                 <a:latin typeface="Consolas"/>
               </a:rPr>
               <a:t>\usepackage{ifthen}</a:t>
@@ -8887,7 +8887,7 @@
           <a:p>
             <a:pPr lvl="1"/>
             <a:r>
-              <a:rPr sz="1200">
+              <a:rPr sz="1100">
                 <a:latin typeface="Consolas"/>
               </a:rPr>
               <a:t>@for</a:t>
@@ -8897,7 +8897,7 @@
               <a:t>, </a:t>
             </a:r>
             <a:r>
-              <a:rPr sz="1200">
+              <a:rPr sz="1100">
                 <a:latin typeface="Consolas"/>
               </a:rPr>
               <a:t>@while</a:t>
@@ -9004,7 +9004,7 @@
               <a:t>Hugo and </a:t>
             </a:r>
             <a:r>
-              <a:rPr sz="1200">
+              <a:rPr sz="1100">
                 <a:latin typeface="Consolas"/>
               </a:rPr>
               <a:t>blogdown</a:t>
@@ -9021,7 +9021,7 @@
               <a:t>Heavily dependent on R </a:t>
             </a:r>
             <a:r>
-              <a:rPr sz="1200">
+              <a:rPr sz="1100">
                 <a:latin typeface="Consolas"/>
               </a:rPr>
               <a:t>R</a:t>
@@ -9172,7 +9172,7 @@
               <a:t> use Python through Jupyter notebooks, and one can use </a:t>
             </a:r>
             <a:r>
-              <a:rPr sz="1200">
+              <a:rPr sz="1100">
                 <a:hlinkClick r:id="rId3"/>
                 <a:latin typeface="Consolas"/>
               </a:rPr>
@@ -9296,7 +9296,7 @@
               <a:t>In Quarto’s </a:t>
             </a:r>
             <a:r>
-              <a:rPr sz="1200">
+              <a:rPr sz="1100">
                 <a:latin typeface="Consolas"/>
               </a:rPr>
               <a:t>.qmd</a:t>
@@ -9306,7 +9306,7 @@
               <a:t> files, you write Markdown and code, just like </a:t>
             </a:r>
             <a:r>
-              <a:rPr sz="1200">
+              <a:rPr sz="1100">
                 <a:latin typeface="Consolas"/>
               </a:rPr>
               <a:t>.ipynb</a:t>
@@ -9316,7 +9316,7 @@
               <a:t>. Add some </a:t>
             </a:r>
             <a:r>
-              <a:rPr sz="1200">
+              <a:rPr sz="1100">
                 <a:latin typeface="Consolas"/>
               </a:rPr>
               <a:t>YAML</a:t>

</xml_diff>